<commit_message>
Improve deployment and simulator
</commit_message>
<xml_diff>
--- a/docs/diagrams.pptx
+++ b/docs/diagrams.pptx
@@ -276,7 +276,7 @@
               <a:pPr>
                 <a:defRPr/>
               </a:pPr>
-              <a:t>8/23/19</a:t>
+              <a:t>8/26/19</a:t>
             </a:fld>
             <a:endParaRPr lang="en-US" dirty="0"/>
           </a:p>
@@ -8989,7 +8989,7 @@
             <a:effectLst/>
             <a:extLst>
               <a:ext uri="{C572A759-6A51-4108-AA02-DFA0A04FC94B}">
-                <ma14:wrappingTextBoxFlag xmlns="" xmlns:ma14="http://schemas.microsoft.com/office/mac/drawingml/2011/main" val="1"/>
+                <ma14:wrappingTextBoxFlag xmlns:ma14="http://schemas.microsoft.com/office/mac/drawingml/2011/main" xmlns="" val="1"/>
               </a:ext>
             </a:extLst>
           </p:spPr>
@@ -11119,7 +11119,7 @@
             <a:effectLst/>
             <a:extLst>
               <a:ext uri="{C572A759-6A51-4108-AA02-DFA0A04FC94B}">
-                <ma14:wrappingTextBoxFlag xmlns="" xmlns:ma14="http://schemas.microsoft.com/office/mac/drawingml/2011/main" val="1"/>
+                <ma14:wrappingTextBoxFlag xmlns:ma14="http://schemas.microsoft.com/office/mac/drawingml/2011/main" xmlns="" val="1"/>
               </a:ext>
             </a:extLst>
           </p:spPr>
@@ -16443,6 +16443,36 @@
           </a:p>
         </p:txBody>
       </p:sp>
+      <p:pic>
+        <p:nvPicPr>
+          <p:cNvPr id="12" name="Picture 11">
+            <a:extLst>
+              <a:ext uri="{FF2B5EF4-FFF2-40B4-BE49-F238E27FC236}">
+                <a16:creationId xmlns:a16="http://schemas.microsoft.com/office/drawing/2014/main" id="{78143322-85CF-C948-BB84-C013BE625A7D}"/>
+              </a:ext>
+            </a:extLst>
+          </p:cNvPr>
+          <p:cNvPicPr>
+            <a:picLocks noChangeAspect="1"/>
+          </p:cNvPicPr>
+          <p:nvPr/>
+        </p:nvPicPr>
+        <p:blipFill>
+          <a:blip r:embed="rId3"/>
+          <a:stretch>
+            <a:fillRect/>
+          </a:stretch>
+        </p:blipFill>
+        <p:spPr>
+          <a:xfrm>
+            <a:off x="2304341" y="4137249"/>
+            <a:ext cx="1010735" cy="680699"/>
+          </a:xfrm>
+          <a:prstGeom prst="rect">
+            <a:avLst/>
+          </a:prstGeom>
+        </p:spPr>
+      </p:pic>
     </p:spTree>
     <p:extLst>
       <p:ext uri="{BB962C8B-B14F-4D97-AF65-F5344CB8AC3E}">

</xml_diff>

<commit_message>
update consumer and simulator
</commit_message>
<xml_diff>
--- a/docs/diagrams.pptx
+++ b/docs/diagrams.pptx
@@ -6923,8 +6923,8 @@
         </p:nvSpPr>
         <p:spPr>
           <a:xfrm>
-            <a:off x="930245" y="2834579"/>
-            <a:ext cx="630301" cy="912814"/>
+            <a:off x="920954" y="2929836"/>
+            <a:ext cx="668773" cy="707694"/>
           </a:xfrm>
           <a:prstGeom prst="rect">
             <a:avLst/>
@@ -6938,13 +6938,9 @@
           <a:lstStyle/>
           <a:p>
             <a:r>
-              <a:rPr lang="en-US" sz="1333" dirty="0" err="1"/>
-              <a:t>mqtt</a:t>
-            </a:r>
-            <a:endParaRPr lang="en-US" sz="1333" dirty="0"/>
-          </a:p>
-          <a:p>
-            <a:endParaRPr lang="en-US" sz="1333" dirty="0"/>
+              <a:rPr lang="en-US" sz="1333" dirty="0"/>
+              <a:t>MQTT</a:t>
+            </a:r>
           </a:p>
           <a:p>
             <a:endParaRPr lang="en-US" sz="1333" dirty="0"/>
@@ -8471,45 +8467,7 @@
                 <a:ea typeface="+mn-ea"/>
                 <a:cs typeface="+mn-cs"/>
               </a:rPr>
-              <a:t>Order </a:t>
-            </a:r>
-            <a:r>
-              <a:rPr kumimoji="0" lang="en-US" sz="1200" b="0" i="0" u="none" strike="noStrike" kern="1200" cap="none" spc="0" normalizeH="0" baseline="0" noProof="0" dirty="0" err="1">
-                <a:ln>
-                  <a:noFill/>
-                </a:ln>
-                <a:solidFill>
-                  <a:srgbClr val="5596E6">
-                    <a:lumMod val="50000"/>
-                  </a:srgbClr>
-                </a:solidFill>
-                <a:effectLst/>
-                <a:uLnTx/>
-                <a:uFillTx/>
-                <a:latin typeface="Arial"/>
-                <a:ea typeface="+mn-ea"/>
-                <a:cs typeface="+mn-cs"/>
-              </a:rPr>
-              <a:t>Mgt</a:t>
-            </a:r>
-            <a:r>
-              <a:rPr kumimoji="0" lang="en-US" sz="1200" b="0" i="0" u="none" strike="noStrike" kern="1200" cap="none" spc="0" normalizeH="0" baseline="0" noProof="0" dirty="0">
-                <a:ln>
-                  <a:noFill/>
-                </a:ln>
-                <a:solidFill>
-                  <a:srgbClr val="5596E6">
-                    <a:lumMod val="50000"/>
-                  </a:srgbClr>
-                </a:solidFill>
-                <a:effectLst/>
-                <a:uLnTx/>
-                <a:uFillTx/>
-                <a:latin typeface="Arial"/>
-                <a:ea typeface="+mn-ea"/>
-                <a:cs typeface="+mn-cs"/>
-              </a:rPr>
-              <a:t> MS</a:t>
+              <a:t>Order Mgt MS</a:t>
             </a:r>
           </a:p>
         </p:txBody>
@@ -8641,45 +8599,7 @@
                 <a:ea typeface="+mn-ea"/>
                 <a:cs typeface="+mn-cs"/>
               </a:rPr>
-              <a:t> </a:t>
-            </a:r>
-            <a:r>
-              <a:rPr kumimoji="0" lang="en-US" sz="1200" b="0" i="0" u="none" strike="noStrike" kern="1200" cap="none" spc="0" normalizeH="0" baseline="0" noProof="0" dirty="0" err="1">
-                <a:ln>
-                  <a:noFill/>
-                </a:ln>
-                <a:solidFill>
-                  <a:srgbClr val="5596E6">
-                    <a:lumMod val="50000"/>
-                  </a:srgbClr>
-                </a:solidFill>
-                <a:effectLst/>
-                <a:uLnTx/>
-                <a:uFillTx/>
-                <a:latin typeface="Arial"/>
-                <a:ea typeface="+mn-ea"/>
-                <a:cs typeface="+mn-cs"/>
-              </a:rPr>
-              <a:t>Mgt</a:t>
-            </a:r>
-            <a:r>
-              <a:rPr kumimoji="0" lang="en-US" sz="1200" b="0" i="0" u="none" strike="noStrike" kern="1200" cap="none" spc="0" normalizeH="0" baseline="0" noProof="0" dirty="0">
-                <a:ln>
-                  <a:noFill/>
-                </a:ln>
-                <a:solidFill>
-                  <a:srgbClr val="5596E6">
-                    <a:lumMod val="50000"/>
-                  </a:srgbClr>
-                </a:solidFill>
-                <a:effectLst/>
-                <a:uLnTx/>
-                <a:uFillTx/>
-                <a:latin typeface="Arial"/>
-                <a:ea typeface="+mn-ea"/>
-                <a:cs typeface="+mn-cs"/>
-              </a:rPr>
-              <a:t> MS</a:t>
+              <a:t> Mgt MS</a:t>
             </a:r>
           </a:p>
         </p:txBody>
@@ -11638,7 +11558,7 @@
           <a:lstStyle/>
           <a:p>
             <a:r>
-              <a:rPr lang="en-US" sz="1050" dirty="0" err="1">
+              <a:rPr lang="en-US" sz="1050" dirty="0">
                 <a:solidFill>
                   <a:schemeClr val="tx1">
                     <a:lumMod val="50000"/>
@@ -11647,13 +11567,6 @@
               </a:rPr>
               <a:t>voyageEvt</a:t>
             </a:r>
-            <a:endParaRPr lang="en-US" sz="1050" dirty="0">
-              <a:solidFill>
-                <a:schemeClr val="tx1">
-                  <a:lumMod val="50000"/>
-                </a:schemeClr>
-              </a:solidFill>
-            </a:endParaRPr>
           </a:p>
         </p:txBody>
       </p:sp>
@@ -13752,7 +13665,7 @@
               <a:defRPr/>
             </a:pPr>
             <a:r>
-              <a:rPr lang="en-US" sz="1351" kern="0" dirty="0" err="1">
+              <a:rPr lang="en-US" sz="1351" kern="0" dirty="0">
                 <a:solidFill>
                   <a:srgbClr val="C8D2D2">
                     <a:lumMod val="25000"/>
@@ -13761,13 +13674,6 @@
               </a:rPr>
               <a:t>containerMetrics</a:t>
             </a:r>
-            <a:endParaRPr lang="en-US" sz="1351" kern="0" dirty="0">
-              <a:solidFill>
-                <a:srgbClr val="C8D2D2">
-                  <a:lumMod val="25000"/>
-                </a:srgbClr>
-              </a:solidFill>
-            </a:endParaRPr>
           </a:p>
         </p:txBody>
       </p:sp>
@@ -14261,22 +14167,13 @@
               </a:spcAft>
             </a:pPr>
             <a:r>
-              <a:rPr lang="en-US" sz="1333" dirty="0" err="1">
-                <a:solidFill>
-                  <a:prstClr val="white"/>
-                </a:solidFill>
-                <a:latin typeface="Arial"/>
-              </a:rPr>
-              <a:t>Reefeer</a:t>
-            </a:r>
-            <a:r>
               <a:rPr lang="en-US" sz="1333" dirty="0">
                 <a:solidFill>
                   <a:prstClr val="white"/>
                 </a:solidFill>
                 <a:latin typeface="Arial"/>
               </a:rPr>
-              <a:t> Simulator</a:t>
+              <a:t>Reefer Simulator</a:t>
             </a:r>
           </a:p>
         </p:txBody>
@@ -17309,7 +17206,7 @@
           <a:lstStyle/>
           <a:p>
             <a:r>
-              <a:rPr lang="en-US" dirty="0" err="1">
+              <a:rPr lang="en-US" dirty="0">
                 <a:solidFill>
                   <a:schemeClr val="accent1">
                     <a:lumMod val="25000"/>
@@ -17318,13 +17215,6 @@
               </a:rPr>
               <a:t>containerMetrics</a:t>
             </a:r>
-            <a:endParaRPr lang="en-US" dirty="0">
-              <a:solidFill>
-                <a:schemeClr val="accent1">
-                  <a:lumMod val="25000"/>
-                </a:schemeClr>
-              </a:solidFill>
-            </a:endParaRPr>
           </a:p>
         </p:txBody>
       </p:sp>

</xml_diff>

<commit_message>
work on simultor to persist to mongo
</commit_message>
<xml_diff>
--- a/docs/diagrams.pptx
+++ b/docs/diagrams.pptx
@@ -277,7 +277,7 @@
               <a:pPr>
                 <a:defRPr/>
               </a:pPr>
-              <a:t>11/13/19</a:t>
+              <a:t>11/26/19</a:t>
             </a:fld>
             <a:endParaRPr lang="en-US" dirty="0"/>
           </a:p>
@@ -10453,7 +10453,7 @@
             <a:effectLst/>
             <a:extLst>
               <a:ext uri="{C572A759-6A51-4108-AA02-DFA0A04FC94B}">
-                <ma14:wrappingTextBoxFlag xmlns:ma14="http://schemas.microsoft.com/office/mac/drawingml/2011/main" xmlns="" val="1"/>
+                <ma14:wrappingTextBoxFlag xmlns="" xmlns:ma14="http://schemas.microsoft.com/office/mac/drawingml/2011/main" val="1"/>
               </a:ext>
             </a:extLst>
           </p:spPr>
@@ -12583,7 +12583,7 @@
             <a:effectLst/>
             <a:extLst>
               <a:ext uri="{C572A759-6A51-4108-AA02-DFA0A04FC94B}">
-                <ma14:wrappingTextBoxFlag xmlns:ma14="http://schemas.microsoft.com/office/mac/drawingml/2011/main" xmlns="" val="1"/>
+                <ma14:wrappingTextBoxFlag xmlns="" xmlns:ma14="http://schemas.microsoft.com/office/mac/drawingml/2011/main" val="1"/>
               </a:ext>
             </a:extLst>
           </p:spPr>
@@ -17561,7 +17561,7 @@
           <a:p>
             <a:r>
               <a:rPr lang="en-US" sz="2400" dirty="0"/>
-              <a:t>Event Stream As Event Store for ML</a:t>
+              <a:t>Event Stream to long term Event Store for ML</a:t>
             </a:r>
           </a:p>
         </p:txBody>
@@ -17647,7 +17647,7 @@
                   <a:schemeClr val="tx1"/>
                 </a:solidFill>
               </a:rPr>
-              <a:t>ML Environment</a:t>
+              <a:t>Machine Learning Environment</a:t>
             </a:r>
           </a:p>
         </p:txBody>
@@ -17737,6 +17737,16 @@
               <a:lumMod val="75000"/>
             </a:schemeClr>
           </a:solidFill>
+          <a:ln>
+            <a:noFill/>
+          </a:ln>
+          <a:effectLst>
+            <a:outerShdw blurRad="50800" dist="38100" dir="5400000" algn="t" rotWithShape="0">
+              <a:prstClr val="black">
+                <a:alpha val="40000"/>
+              </a:prstClr>
+            </a:outerShdw>
+          </a:effectLst>
         </p:spPr>
         <p:style>
           <a:lnRef idx="2">
@@ -17761,17 +17771,237 @@
             <a:pPr algn="ctr"/>
             <a:r>
               <a:rPr lang="en-US" sz="1400" dirty="0"/>
-              <a:t>Simulator</a:t>
+              <a:t>SimulatorTool</a:t>
+            </a:r>
+          </a:p>
+        </p:txBody>
+      </p:sp>
+      <p:cxnSp>
+        <p:nvCxnSpPr>
+          <p:cNvPr id="46" name="Elbow Connector 45">
+            <a:extLst>
+              <a:ext uri="{FF2B5EF4-FFF2-40B4-BE49-F238E27FC236}">
+                <a16:creationId xmlns:a16="http://schemas.microsoft.com/office/drawing/2014/main" id="{B815F1F6-8EC9-A547-951A-6A6BA26A1B3E}"/>
+              </a:ext>
+            </a:extLst>
+          </p:cNvPr>
+          <p:cNvCxnSpPr>
+            <a:cxnSpLocks/>
+            <a:stCxn id="9" idx="3"/>
+            <a:endCxn id="59" idx="1"/>
+          </p:cNvCxnSpPr>
+          <p:nvPr/>
+        </p:nvCxnSpPr>
+        <p:spPr>
+          <a:xfrm>
+            <a:off x="2465614" y="2073727"/>
+            <a:ext cx="2093194" cy="516747"/>
+          </a:xfrm>
+          <a:prstGeom prst="bentConnector2">
+            <a:avLst/>
+          </a:prstGeom>
+          <a:ln w="12700">
+            <a:solidFill>
+              <a:schemeClr val="accent6"/>
+            </a:solidFill>
+            <a:tailEnd type="triangle"/>
+          </a:ln>
+          <a:effectLst/>
+        </p:spPr>
+        <p:style>
+          <a:lnRef idx="2">
+            <a:schemeClr val="accent1"/>
+          </a:lnRef>
+          <a:fillRef idx="0">
+            <a:schemeClr val="accent1"/>
+          </a:fillRef>
+          <a:effectRef idx="1">
+            <a:schemeClr val="accent1"/>
+          </a:effectRef>
+          <a:fontRef idx="minor">
+            <a:schemeClr val="tx1"/>
+          </a:fontRef>
+        </p:style>
+      </p:cxnSp>
+      <p:cxnSp>
+        <p:nvCxnSpPr>
+          <p:cNvPr id="71" name="Elbow Connector 70">
+            <a:extLst>
+              <a:ext uri="{FF2B5EF4-FFF2-40B4-BE49-F238E27FC236}">
+                <a16:creationId xmlns:a16="http://schemas.microsoft.com/office/drawing/2014/main" id="{9B3950A4-1025-DB48-B886-5945ADD35206}"/>
+              </a:ext>
+            </a:extLst>
+          </p:cNvPr>
+          <p:cNvCxnSpPr>
+            <a:cxnSpLocks/>
+            <a:stCxn id="45" idx="1"/>
+            <a:endCxn id="59" idx="4"/>
+          </p:cNvCxnSpPr>
+          <p:nvPr/>
+        </p:nvCxnSpPr>
+        <p:spPr>
+          <a:xfrm rot="10800000" flipV="1">
+            <a:off x="5157329" y="2100404"/>
+            <a:ext cx="1320870" cy="837862"/>
+          </a:xfrm>
+          <a:prstGeom prst="bentConnector3">
+            <a:avLst>
+              <a:gd name="adj1" fmla="val 50000"/>
+            </a:avLst>
+          </a:prstGeom>
+          <a:ln w="12700">
+            <a:solidFill>
+              <a:srgbClr val="7030A0"/>
+            </a:solidFill>
+            <a:headEnd type="triangle"/>
+            <a:tailEnd type="none"/>
+          </a:ln>
+          <a:effectLst/>
+        </p:spPr>
+        <p:style>
+          <a:lnRef idx="2">
+            <a:schemeClr val="accent1"/>
+          </a:lnRef>
+          <a:fillRef idx="0">
+            <a:schemeClr val="accent1"/>
+          </a:fillRef>
+          <a:effectRef idx="1">
+            <a:schemeClr val="accent1"/>
+          </a:effectRef>
+          <a:fontRef idx="minor">
+            <a:schemeClr val="tx1"/>
+          </a:fontRef>
+        </p:style>
+      </p:cxnSp>
+      <p:sp>
+        <p:nvSpPr>
+          <p:cNvPr id="45" name="Rounded Rectangle 44">
+            <a:extLst>
+              <a:ext uri="{FF2B5EF4-FFF2-40B4-BE49-F238E27FC236}">
+                <a16:creationId xmlns:a16="http://schemas.microsoft.com/office/drawing/2014/main" id="{F495E1A9-5EC6-5446-ACF5-3911A287BB83}"/>
+              </a:ext>
+            </a:extLst>
+          </p:cNvPr>
+          <p:cNvSpPr/>
+          <p:nvPr/>
+        </p:nvSpPr>
+        <p:spPr>
+          <a:xfrm>
+            <a:off x="6478199" y="1913633"/>
+            <a:ext cx="1749097" cy="373542"/>
+          </a:xfrm>
+          <a:prstGeom prst="roundRect">
+            <a:avLst>
+              <a:gd name="adj" fmla="val 9717"/>
+            </a:avLst>
+          </a:prstGeom>
+          <a:noFill/>
+          <a:ln w="12700">
+            <a:solidFill>
+              <a:schemeClr val="tx2">
+                <a:lumMod val="50000"/>
+              </a:schemeClr>
+            </a:solidFill>
+          </a:ln>
+          <a:effectLst/>
+        </p:spPr>
+        <p:style>
+          <a:lnRef idx="1">
+            <a:schemeClr val="dk1"/>
+          </a:lnRef>
+          <a:fillRef idx="2">
+            <a:schemeClr val="dk1"/>
+          </a:fillRef>
+          <a:effectRef idx="1">
+            <a:schemeClr val="dk1"/>
+          </a:effectRef>
+          <a:fontRef idx="minor">
+            <a:schemeClr val="dk1"/>
+          </a:fontRef>
+        </p:style>
+        <p:txBody>
+          <a:bodyPr rot="0" spcFirstLastPara="0" vertOverflow="overflow" horzOverflow="overflow" vert="horz" wrap="square" lIns="0" tIns="0" rIns="0" bIns="0" numCol="1" spcCol="0" rtlCol="0" fromWordArt="0" anchor="t" anchorCtr="0" forceAA="0" compatLnSpc="1">
+            <a:prstTxWarp prst="textNoShape">
+              <a:avLst/>
+            </a:prstTxWarp>
+            <a:noAutofit/>
+          </a:bodyPr>
+          <a:lstStyle/>
+          <a:p>
+            <a:r>
+              <a:rPr lang="en-US" sz="1200" baseline="0" dirty="0">
+                <a:solidFill>
+                  <a:schemeClr val="tx1"/>
+                </a:solidFill>
+                <a:latin typeface="IBM Plex Sans" panose="020B0503050203000203" pitchFamily="34" charset="77"/>
+                <a:cs typeface="Arial"/>
+              </a:rPr>
+              <a:t>Pandas DF</a:t>
+            </a:r>
+          </a:p>
+        </p:txBody>
+      </p:sp>
+      <p:sp>
+        <p:nvSpPr>
+          <p:cNvPr id="59" name="Can 58">
+            <a:extLst>
+              <a:ext uri="{FF2B5EF4-FFF2-40B4-BE49-F238E27FC236}">
+                <a16:creationId xmlns:a16="http://schemas.microsoft.com/office/drawing/2014/main" id="{BF8D5F17-7886-6A49-A326-AB3283F367DA}"/>
+              </a:ext>
+            </a:extLst>
+          </p:cNvPr>
+          <p:cNvSpPr/>
+          <p:nvPr/>
+        </p:nvSpPr>
+        <p:spPr>
+          <a:xfrm>
+            <a:off x="3960287" y="2590474"/>
+            <a:ext cx="1197042" cy="695584"/>
+          </a:xfrm>
+          <a:prstGeom prst="can">
+            <a:avLst/>
+          </a:prstGeom>
+          <a:solidFill>
+            <a:srgbClr val="009643"/>
+          </a:solidFill>
+          <a:ln>
+            <a:noFill/>
+          </a:ln>
+        </p:spPr>
+        <p:style>
+          <a:lnRef idx="2">
+            <a:schemeClr val="accent1">
+              <a:shade val="50000"/>
+            </a:schemeClr>
+          </a:lnRef>
+          <a:fillRef idx="1">
+            <a:schemeClr val="accent1"/>
+          </a:fillRef>
+          <a:effectRef idx="0">
+            <a:schemeClr val="accent1"/>
+          </a:effectRef>
+          <a:fontRef idx="minor">
+            <a:schemeClr val="lt1"/>
+          </a:fontRef>
+        </p:style>
+        <p:txBody>
+          <a:bodyPr rtlCol="0" anchor="ctr"/>
+          <a:lstStyle/>
+          <a:p>
+            <a:pPr algn="ctr"/>
+            <a:r>
+              <a:rPr lang="en-US" sz="1000" dirty="0"/>
+              <a:t>Reefer telemetries</a:t>
             </a:r>
           </a:p>
         </p:txBody>
       </p:sp>
       <p:pic>
         <p:nvPicPr>
-          <p:cNvPr id="25" name="Picture 40">
+          <p:cNvPr id="3" name="Picture 2">
             <a:extLst>
               <a:ext uri="{FF2B5EF4-FFF2-40B4-BE49-F238E27FC236}">
-                <a16:creationId xmlns:a16="http://schemas.microsoft.com/office/drawing/2014/main" id="{6CF0C2DA-CD62-0F4A-B6D7-15B98EF785FA}"/>
+                <a16:creationId xmlns:a16="http://schemas.microsoft.com/office/drawing/2014/main" id="{528193D1-A620-354F-B6D2-B217C3C404BA}"/>
               </a:ext>
             </a:extLst>
           </p:cNvPr>
@@ -17781,7 +18011,780 @@
           <p:nvPr/>
         </p:nvPicPr>
         <p:blipFill>
-          <a:blip r:embed="rId2">
+          <a:blip r:embed="rId2"/>
+          <a:stretch>
+            <a:fillRect/>
+          </a:stretch>
+        </p:blipFill>
+        <p:spPr>
+          <a:xfrm>
+            <a:off x="3707408" y="2785869"/>
+            <a:ext cx="296333" cy="643355"/>
+          </a:xfrm>
+          <a:prstGeom prst="rect">
+            <a:avLst/>
+          </a:prstGeom>
+        </p:spPr>
+      </p:pic>
+      <p:sp>
+        <p:nvSpPr>
+          <p:cNvPr id="14" name="Rectangle 13">
+            <a:extLst>
+              <a:ext uri="{FF2B5EF4-FFF2-40B4-BE49-F238E27FC236}">
+                <a16:creationId xmlns:a16="http://schemas.microsoft.com/office/drawing/2014/main" id="{FF73E72E-4933-814D-B024-C5BBC14F304D}"/>
+              </a:ext>
+            </a:extLst>
+          </p:cNvPr>
+          <p:cNvSpPr/>
+          <p:nvPr/>
+        </p:nvSpPr>
+        <p:spPr>
+          <a:xfrm>
+            <a:off x="523723" y="3653298"/>
+            <a:ext cx="2008413" cy="1655634"/>
+          </a:xfrm>
+          <a:prstGeom prst="rect">
+            <a:avLst/>
+          </a:prstGeom>
+          <a:noFill/>
+          <a:ln>
+            <a:solidFill>
+              <a:schemeClr val="accent3"/>
+            </a:solidFill>
+            <a:prstDash val="dash"/>
+          </a:ln>
+        </p:spPr>
+        <p:style>
+          <a:lnRef idx="2">
+            <a:schemeClr val="accent1">
+              <a:shade val="50000"/>
+            </a:schemeClr>
+          </a:lnRef>
+          <a:fillRef idx="1">
+            <a:schemeClr val="accent1"/>
+          </a:fillRef>
+          <a:effectRef idx="0">
+            <a:schemeClr val="accent1"/>
+          </a:effectRef>
+          <a:fontRef idx="minor">
+            <a:schemeClr val="lt1"/>
+          </a:fontRef>
+        </p:style>
+        <p:txBody>
+          <a:bodyPr rtlCol="0" anchor="b"/>
+          <a:lstStyle/>
+          <a:p>
+            <a:pPr algn="ctr"/>
+            <a:r>
+              <a:rPr lang="en-US" sz="1200" dirty="0">
+                <a:solidFill>
+                  <a:schemeClr val="tx1"/>
+                </a:solidFill>
+              </a:rPr>
+              <a:t>Python</a:t>
+            </a:r>
+          </a:p>
+        </p:txBody>
+      </p:sp>
+      <p:sp>
+        <p:nvSpPr>
+          <p:cNvPr id="15" name="Rectangle 14">
+            <a:extLst>
+              <a:ext uri="{FF2B5EF4-FFF2-40B4-BE49-F238E27FC236}">
+                <a16:creationId xmlns:a16="http://schemas.microsoft.com/office/drawing/2014/main" id="{8990AB5A-91EB-9947-B9EF-04353E549FFC}"/>
+              </a:ext>
+            </a:extLst>
+          </p:cNvPr>
+          <p:cNvSpPr/>
+          <p:nvPr/>
+        </p:nvSpPr>
+        <p:spPr>
+          <a:xfrm>
+            <a:off x="643465" y="3987193"/>
+            <a:ext cx="1703614" cy="914400"/>
+          </a:xfrm>
+          <a:prstGeom prst="rect">
+            <a:avLst/>
+          </a:prstGeom>
+          <a:solidFill>
+            <a:schemeClr val="accent5">
+              <a:lumMod val="75000"/>
+            </a:schemeClr>
+          </a:solidFill>
+          <a:ln>
+            <a:noFill/>
+          </a:ln>
+          <a:effectLst>
+            <a:outerShdw blurRad="50800" dist="38100" dir="5400000" algn="t" rotWithShape="0">
+              <a:prstClr val="black">
+                <a:alpha val="40000"/>
+              </a:prstClr>
+            </a:outerShdw>
+          </a:effectLst>
+        </p:spPr>
+        <p:style>
+          <a:lnRef idx="2">
+            <a:schemeClr val="accent1">
+              <a:shade val="50000"/>
+            </a:schemeClr>
+          </a:lnRef>
+          <a:fillRef idx="1">
+            <a:schemeClr val="accent1"/>
+          </a:fillRef>
+          <a:effectRef idx="0">
+            <a:schemeClr val="accent1"/>
+          </a:effectRef>
+          <a:fontRef idx="minor">
+            <a:schemeClr val="lt1"/>
+          </a:fontRef>
+        </p:style>
+        <p:txBody>
+          <a:bodyPr rtlCol="0" anchor="ctr"/>
+          <a:lstStyle/>
+          <a:p>
+            <a:pPr algn="ctr"/>
+            <a:r>
+              <a:rPr lang="en-US" sz="1400" dirty="0"/>
+              <a:t>SimulatorApp</a:t>
+            </a:r>
+          </a:p>
+        </p:txBody>
+      </p:sp>
+      <p:sp>
+        <p:nvSpPr>
+          <p:cNvPr id="16" name="Rounded Rectangle 15">
+            <a:extLst>
+              <a:ext uri="{FF2B5EF4-FFF2-40B4-BE49-F238E27FC236}">
+                <a16:creationId xmlns:a16="http://schemas.microsoft.com/office/drawing/2014/main" id="{604B1EAE-7B06-B644-84B2-A465850BFF11}"/>
+              </a:ext>
+            </a:extLst>
+          </p:cNvPr>
+          <p:cNvSpPr/>
+          <p:nvPr/>
+        </p:nvSpPr>
+        <p:spPr bwMode="auto">
+          <a:xfrm>
+            <a:off x="3749127" y="4437992"/>
+            <a:ext cx="245561" cy="731512"/>
+          </a:xfrm>
+          <a:prstGeom prst="roundRect">
+            <a:avLst/>
+          </a:prstGeom>
+          <a:solidFill>
+            <a:schemeClr val="bg2"/>
+          </a:solidFill>
+          <a:ln>
+            <a:solidFill>
+              <a:schemeClr val="bg1"/>
+            </a:solidFill>
+            <a:prstDash val="solid"/>
+            <a:headEnd type="none" w="med" len="med"/>
+            <a:tailEnd type="none" w="med" len="med"/>
+          </a:ln>
+          <a:effectLst/>
+        </p:spPr>
+        <p:style>
+          <a:lnRef idx="1">
+            <a:schemeClr val="accent5"/>
+          </a:lnRef>
+          <a:fillRef idx="3">
+            <a:schemeClr val="accent5"/>
+          </a:fillRef>
+          <a:effectRef idx="2">
+            <a:schemeClr val="accent5"/>
+          </a:effectRef>
+          <a:fontRef idx="minor">
+            <a:schemeClr val="lt1"/>
+          </a:fontRef>
+        </p:style>
+        <p:txBody>
+          <a:bodyPr vert="horz" wrap="square" lIns="0" tIns="0" rIns="0" bIns="0" numCol="1" rtlCol="0" anchor="ctr" anchorCtr="0" compatLnSpc="1">
+            <a:prstTxWarp prst="textNoShape">
+              <a:avLst/>
+            </a:prstTxWarp>
+            <a:noAutofit/>
+          </a:bodyPr>
+          <a:lstStyle/>
+          <a:p>
+            <a:pPr algn="ctr" defTabSz="1219170" fontAlgn="base">
+              <a:lnSpc>
+                <a:spcPct val="90000"/>
+              </a:lnSpc>
+              <a:spcBef>
+                <a:spcPct val="0"/>
+              </a:spcBef>
+              <a:spcAft>
+                <a:spcPct val="0"/>
+              </a:spcAft>
+            </a:pPr>
+            <a:r>
+              <a:rPr lang="en-US" sz="1200" dirty="0">
+                <a:solidFill>
+                  <a:schemeClr val="bg1"/>
+                </a:solidFill>
+              </a:rPr>
+              <a:t>0</a:t>
+            </a:r>
+            <a:endParaRPr lang="en-US" sz="667" dirty="0">
+              <a:solidFill>
+                <a:schemeClr val="bg1"/>
+              </a:solidFill>
+            </a:endParaRPr>
+          </a:p>
+        </p:txBody>
+      </p:sp>
+      <p:sp>
+        <p:nvSpPr>
+          <p:cNvPr id="17" name="Rounded Rectangle 16">
+            <a:extLst>
+              <a:ext uri="{FF2B5EF4-FFF2-40B4-BE49-F238E27FC236}">
+                <a16:creationId xmlns:a16="http://schemas.microsoft.com/office/drawing/2014/main" id="{BF94AF6A-6ED9-F648-AF73-AD2F2BF0087D}"/>
+              </a:ext>
+            </a:extLst>
+          </p:cNvPr>
+          <p:cNvSpPr/>
+          <p:nvPr/>
+        </p:nvSpPr>
+        <p:spPr bwMode="auto">
+          <a:xfrm>
+            <a:off x="3992964" y="4437992"/>
+            <a:ext cx="245561" cy="731512"/>
+          </a:xfrm>
+          <a:prstGeom prst="roundRect">
+            <a:avLst/>
+          </a:prstGeom>
+          <a:solidFill>
+            <a:schemeClr val="bg2"/>
+          </a:solidFill>
+          <a:ln>
+            <a:solidFill>
+              <a:schemeClr val="bg1"/>
+            </a:solidFill>
+            <a:prstDash val="solid"/>
+            <a:headEnd type="none" w="med" len="med"/>
+            <a:tailEnd type="none" w="med" len="med"/>
+          </a:ln>
+          <a:effectLst/>
+        </p:spPr>
+        <p:style>
+          <a:lnRef idx="1">
+            <a:schemeClr val="accent5"/>
+          </a:lnRef>
+          <a:fillRef idx="3">
+            <a:schemeClr val="accent5"/>
+          </a:fillRef>
+          <a:effectRef idx="2">
+            <a:schemeClr val="accent5"/>
+          </a:effectRef>
+          <a:fontRef idx="minor">
+            <a:schemeClr val="lt1"/>
+          </a:fontRef>
+        </p:style>
+        <p:txBody>
+          <a:bodyPr vert="horz" wrap="square" lIns="0" tIns="0" rIns="0" bIns="0" numCol="1" rtlCol="0" anchor="ctr" anchorCtr="0" compatLnSpc="1">
+            <a:prstTxWarp prst="textNoShape">
+              <a:avLst/>
+            </a:prstTxWarp>
+            <a:noAutofit/>
+          </a:bodyPr>
+          <a:lstStyle/>
+          <a:p>
+            <a:pPr algn="ctr" defTabSz="1219170" fontAlgn="base">
+              <a:lnSpc>
+                <a:spcPct val="90000"/>
+              </a:lnSpc>
+              <a:spcBef>
+                <a:spcPct val="0"/>
+              </a:spcBef>
+              <a:spcAft>
+                <a:spcPct val="0"/>
+              </a:spcAft>
+            </a:pPr>
+            <a:r>
+              <a:rPr lang="en-US" sz="1200" dirty="0">
+                <a:solidFill>
+                  <a:schemeClr val="bg1"/>
+                </a:solidFill>
+              </a:rPr>
+              <a:t>1</a:t>
+            </a:r>
+            <a:endParaRPr lang="en-US" sz="667" dirty="0">
+              <a:solidFill>
+                <a:schemeClr val="bg1"/>
+              </a:solidFill>
+            </a:endParaRPr>
+          </a:p>
+        </p:txBody>
+      </p:sp>
+      <p:sp>
+        <p:nvSpPr>
+          <p:cNvPr id="18" name="Rounded Rectangle 17">
+            <a:extLst>
+              <a:ext uri="{FF2B5EF4-FFF2-40B4-BE49-F238E27FC236}">
+                <a16:creationId xmlns:a16="http://schemas.microsoft.com/office/drawing/2014/main" id="{574D615E-85EA-C844-A2A9-FE6056949B8A}"/>
+              </a:ext>
+            </a:extLst>
+          </p:cNvPr>
+          <p:cNvSpPr/>
+          <p:nvPr/>
+        </p:nvSpPr>
+        <p:spPr bwMode="auto">
+          <a:xfrm>
+            <a:off x="4238526" y="4437992"/>
+            <a:ext cx="245561" cy="731512"/>
+          </a:xfrm>
+          <a:prstGeom prst="roundRect">
+            <a:avLst/>
+          </a:prstGeom>
+          <a:solidFill>
+            <a:schemeClr val="bg2"/>
+          </a:solidFill>
+          <a:ln>
+            <a:solidFill>
+              <a:schemeClr val="bg1"/>
+            </a:solidFill>
+            <a:prstDash val="solid"/>
+            <a:headEnd type="none" w="med" len="med"/>
+            <a:tailEnd type="none" w="med" len="med"/>
+          </a:ln>
+          <a:effectLst/>
+        </p:spPr>
+        <p:style>
+          <a:lnRef idx="1">
+            <a:schemeClr val="accent5"/>
+          </a:lnRef>
+          <a:fillRef idx="3">
+            <a:schemeClr val="accent5"/>
+          </a:fillRef>
+          <a:effectRef idx="2">
+            <a:schemeClr val="accent5"/>
+          </a:effectRef>
+          <a:fontRef idx="minor">
+            <a:schemeClr val="lt1"/>
+          </a:fontRef>
+        </p:style>
+        <p:txBody>
+          <a:bodyPr vert="horz" wrap="square" lIns="0" tIns="0" rIns="0" bIns="0" numCol="1" rtlCol="0" anchor="ctr" anchorCtr="0" compatLnSpc="1">
+            <a:prstTxWarp prst="textNoShape">
+              <a:avLst/>
+            </a:prstTxWarp>
+            <a:noAutofit/>
+          </a:bodyPr>
+          <a:lstStyle/>
+          <a:p>
+            <a:pPr algn="ctr" defTabSz="1219170" fontAlgn="base">
+              <a:lnSpc>
+                <a:spcPct val="90000"/>
+              </a:lnSpc>
+              <a:spcBef>
+                <a:spcPct val="0"/>
+              </a:spcBef>
+              <a:spcAft>
+                <a:spcPct val="0"/>
+              </a:spcAft>
+            </a:pPr>
+            <a:r>
+              <a:rPr lang="en-US" sz="1200" dirty="0">
+                <a:solidFill>
+                  <a:schemeClr val="bg1"/>
+                </a:solidFill>
+              </a:rPr>
+              <a:t>2</a:t>
+            </a:r>
+            <a:endParaRPr lang="en-US" sz="667" dirty="0">
+              <a:solidFill>
+                <a:schemeClr val="bg1"/>
+              </a:solidFill>
+            </a:endParaRPr>
+          </a:p>
+        </p:txBody>
+      </p:sp>
+      <p:sp>
+        <p:nvSpPr>
+          <p:cNvPr id="19" name="Rounded Rectangle 18">
+            <a:extLst>
+              <a:ext uri="{FF2B5EF4-FFF2-40B4-BE49-F238E27FC236}">
+                <a16:creationId xmlns:a16="http://schemas.microsoft.com/office/drawing/2014/main" id="{C7A32DE1-AA62-0542-95A5-93C4C6EFD0D3}"/>
+              </a:ext>
+            </a:extLst>
+          </p:cNvPr>
+          <p:cNvSpPr/>
+          <p:nvPr/>
+        </p:nvSpPr>
+        <p:spPr bwMode="auto">
+          <a:xfrm>
+            <a:off x="4482363" y="4437992"/>
+            <a:ext cx="245561" cy="731512"/>
+          </a:xfrm>
+          <a:prstGeom prst="roundRect">
+            <a:avLst/>
+          </a:prstGeom>
+          <a:solidFill>
+            <a:schemeClr val="bg2"/>
+          </a:solidFill>
+          <a:ln>
+            <a:solidFill>
+              <a:schemeClr val="bg1"/>
+            </a:solidFill>
+            <a:prstDash val="solid"/>
+            <a:headEnd type="none" w="med" len="med"/>
+            <a:tailEnd type="none" w="med" len="med"/>
+          </a:ln>
+          <a:effectLst/>
+        </p:spPr>
+        <p:style>
+          <a:lnRef idx="1">
+            <a:schemeClr val="accent5"/>
+          </a:lnRef>
+          <a:fillRef idx="3">
+            <a:schemeClr val="accent5"/>
+          </a:fillRef>
+          <a:effectRef idx="2">
+            <a:schemeClr val="accent5"/>
+          </a:effectRef>
+          <a:fontRef idx="minor">
+            <a:schemeClr val="lt1"/>
+          </a:fontRef>
+        </p:style>
+        <p:txBody>
+          <a:bodyPr vert="horz" wrap="square" lIns="0" tIns="0" rIns="0" bIns="0" numCol="1" rtlCol="0" anchor="ctr" anchorCtr="0" compatLnSpc="1">
+            <a:prstTxWarp prst="textNoShape">
+              <a:avLst/>
+            </a:prstTxWarp>
+            <a:noAutofit/>
+          </a:bodyPr>
+          <a:lstStyle/>
+          <a:p>
+            <a:pPr algn="ctr" defTabSz="1219170" fontAlgn="base">
+              <a:lnSpc>
+                <a:spcPct val="90000"/>
+              </a:lnSpc>
+              <a:spcBef>
+                <a:spcPct val="0"/>
+              </a:spcBef>
+              <a:spcAft>
+                <a:spcPct val="0"/>
+              </a:spcAft>
+            </a:pPr>
+            <a:r>
+              <a:rPr lang="en-US" sz="1200" dirty="0">
+                <a:solidFill>
+                  <a:schemeClr val="bg1"/>
+                </a:solidFill>
+              </a:rPr>
+              <a:t>3</a:t>
+            </a:r>
+            <a:endParaRPr lang="en-US" sz="667" dirty="0">
+              <a:solidFill>
+                <a:schemeClr val="bg1"/>
+              </a:solidFill>
+            </a:endParaRPr>
+          </a:p>
+        </p:txBody>
+      </p:sp>
+      <p:sp>
+        <p:nvSpPr>
+          <p:cNvPr id="20" name="Rounded Rectangle 19">
+            <a:extLst>
+              <a:ext uri="{FF2B5EF4-FFF2-40B4-BE49-F238E27FC236}">
+                <a16:creationId xmlns:a16="http://schemas.microsoft.com/office/drawing/2014/main" id="{65250C98-3EF7-D84C-9241-0ACC98F9DB15}"/>
+              </a:ext>
+            </a:extLst>
+          </p:cNvPr>
+          <p:cNvSpPr/>
+          <p:nvPr/>
+        </p:nvSpPr>
+        <p:spPr bwMode="auto">
+          <a:xfrm>
+            <a:off x="4727924" y="4437992"/>
+            <a:ext cx="245561" cy="731512"/>
+          </a:xfrm>
+          <a:prstGeom prst="roundRect">
+            <a:avLst/>
+          </a:prstGeom>
+          <a:solidFill>
+            <a:schemeClr val="bg2"/>
+          </a:solidFill>
+          <a:ln>
+            <a:solidFill>
+              <a:schemeClr val="bg1"/>
+            </a:solidFill>
+            <a:prstDash val="solid"/>
+            <a:headEnd type="none" w="med" len="med"/>
+            <a:tailEnd type="none" w="med" len="med"/>
+          </a:ln>
+          <a:effectLst/>
+        </p:spPr>
+        <p:style>
+          <a:lnRef idx="1">
+            <a:schemeClr val="accent5"/>
+          </a:lnRef>
+          <a:fillRef idx="3">
+            <a:schemeClr val="accent5"/>
+          </a:fillRef>
+          <a:effectRef idx="2">
+            <a:schemeClr val="accent5"/>
+          </a:effectRef>
+          <a:fontRef idx="minor">
+            <a:schemeClr val="lt1"/>
+          </a:fontRef>
+        </p:style>
+        <p:txBody>
+          <a:bodyPr vert="horz" wrap="square" lIns="0" tIns="0" rIns="0" bIns="0" numCol="1" rtlCol="0" anchor="ctr" anchorCtr="0" compatLnSpc="1">
+            <a:prstTxWarp prst="textNoShape">
+              <a:avLst/>
+            </a:prstTxWarp>
+            <a:noAutofit/>
+          </a:bodyPr>
+          <a:lstStyle/>
+          <a:p>
+            <a:pPr algn="ctr" defTabSz="1219170" fontAlgn="base">
+              <a:lnSpc>
+                <a:spcPct val="90000"/>
+              </a:lnSpc>
+              <a:spcBef>
+                <a:spcPct val="0"/>
+              </a:spcBef>
+              <a:spcAft>
+                <a:spcPct val="0"/>
+              </a:spcAft>
+            </a:pPr>
+            <a:r>
+              <a:rPr lang="en-US" sz="1200" dirty="0">
+                <a:solidFill>
+                  <a:schemeClr val="bg1"/>
+                </a:solidFill>
+              </a:rPr>
+              <a:t>4</a:t>
+            </a:r>
+            <a:endParaRPr lang="en-US" sz="667" dirty="0">
+              <a:solidFill>
+                <a:schemeClr val="bg1"/>
+              </a:solidFill>
+            </a:endParaRPr>
+          </a:p>
+        </p:txBody>
+      </p:sp>
+      <p:sp>
+        <p:nvSpPr>
+          <p:cNvPr id="21" name="Rounded Rectangle 20">
+            <a:extLst>
+              <a:ext uri="{FF2B5EF4-FFF2-40B4-BE49-F238E27FC236}">
+                <a16:creationId xmlns:a16="http://schemas.microsoft.com/office/drawing/2014/main" id="{349815D9-A544-C740-A98E-A4307CE7F984}"/>
+              </a:ext>
+            </a:extLst>
+          </p:cNvPr>
+          <p:cNvSpPr/>
+          <p:nvPr/>
+        </p:nvSpPr>
+        <p:spPr bwMode="auto">
+          <a:xfrm>
+            <a:off x="4958720" y="4437992"/>
+            <a:ext cx="245561" cy="731512"/>
+          </a:xfrm>
+          <a:prstGeom prst="roundRect">
+            <a:avLst/>
+          </a:prstGeom>
+          <a:solidFill>
+            <a:schemeClr val="bg2"/>
+          </a:solidFill>
+          <a:ln>
+            <a:solidFill>
+              <a:schemeClr val="bg1"/>
+            </a:solidFill>
+            <a:prstDash val="solid"/>
+            <a:headEnd type="none" w="med" len="med"/>
+            <a:tailEnd type="none" w="med" len="med"/>
+          </a:ln>
+          <a:effectLst/>
+        </p:spPr>
+        <p:style>
+          <a:lnRef idx="1">
+            <a:schemeClr val="accent5"/>
+          </a:lnRef>
+          <a:fillRef idx="3">
+            <a:schemeClr val="accent5"/>
+          </a:fillRef>
+          <a:effectRef idx="2">
+            <a:schemeClr val="accent5"/>
+          </a:effectRef>
+          <a:fontRef idx="minor">
+            <a:schemeClr val="lt1"/>
+          </a:fontRef>
+        </p:style>
+        <p:txBody>
+          <a:bodyPr vert="horz" wrap="square" lIns="0" tIns="0" rIns="0" bIns="0" numCol="1" rtlCol="0" anchor="ctr" anchorCtr="0" compatLnSpc="1">
+            <a:prstTxWarp prst="textNoShape">
+              <a:avLst/>
+            </a:prstTxWarp>
+            <a:noAutofit/>
+          </a:bodyPr>
+          <a:lstStyle/>
+          <a:p>
+            <a:pPr algn="ctr" defTabSz="1219170" fontAlgn="base">
+              <a:lnSpc>
+                <a:spcPct val="90000"/>
+              </a:lnSpc>
+              <a:spcBef>
+                <a:spcPct val="0"/>
+              </a:spcBef>
+              <a:spcAft>
+                <a:spcPct val="0"/>
+              </a:spcAft>
+            </a:pPr>
+            <a:r>
+              <a:rPr lang="en-US" sz="1200" dirty="0">
+                <a:solidFill>
+                  <a:schemeClr val="bg1"/>
+                </a:solidFill>
+              </a:rPr>
+              <a:t>5</a:t>
+            </a:r>
+            <a:endParaRPr lang="en-US" sz="667" dirty="0">
+              <a:solidFill>
+                <a:schemeClr val="bg1"/>
+              </a:solidFill>
+            </a:endParaRPr>
+          </a:p>
+        </p:txBody>
+      </p:sp>
+      <p:sp>
+        <p:nvSpPr>
+          <p:cNvPr id="22" name="AutoShape 4">
+            <a:extLst>
+              <a:ext uri="{FF2B5EF4-FFF2-40B4-BE49-F238E27FC236}">
+                <a16:creationId xmlns:a16="http://schemas.microsoft.com/office/drawing/2014/main" id="{D20B6BF8-2A57-924F-AB42-129B1DC6DBE6}"/>
+              </a:ext>
+            </a:extLst>
+          </p:cNvPr>
+          <p:cNvSpPr>
+            <a:spLocks noChangeArrowheads="1"/>
+          </p:cNvSpPr>
+          <p:nvPr/>
+        </p:nvSpPr>
+        <p:spPr bwMode="auto">
+          <a:xfrm>
+            <a:off x="2881464" y="4145695"/>
+            <a:ext cx="3513917" cy="1348479"/>
+          </a:xfrm>
+          <a:prstGeom prst="roundRect">
+            <a:avLst>
+              <a:gd name="adj" fmla="val 7117"/>
+            </a:avLst>
+          </a:prstGeom>
+          <a:noFill/>
+          <a:ln w="12700">
+            <a:solidFill>
+              <a:schemeClr val="accent3"/>
+            </a:solidFill>
+            <a:prstDash val="dash"/>
+            <a:round/>
+            <a:headEnd/>
+            <a:tailEnd/>
+          </a:ln>
+        </p:spPr>
+        <p:txBody>
+          <a:bodyPr lIns="0" tIns="0" rIns="0" bIns="0" anchor="b" anchorCtr="1"/>
+          <a:lstStyle/>
+          <a:p>
+            <a:pPr algn="ctr"/>
+            <a:endParaRPr lang="en-US" sz="1333" dirty="0"/>
+          </a:p>
+        </p:txBody>
+      </p:sp>
+      <p:sp>
+        <p:nvSpPr>
+          <p:cNvPr id="23" name="TextBox 22">
+            <a:extLst>
+              <a:ext uri="{FF2B5EF4-FFF2-40B4-BE49-F238E27FC236}">
+                <a16:creationId xmlns:a16="http://schemas.microsoft.com/office/drawing/2014/main" id="{87606592-A07A-924B-B639-76FB8A14520F}"/>
+              </a:ext>
+            </a:extLst>
+          </p:cNvPr>
+          <p:cNvSpPr txBox="1"/>
+          <p:nvPr/>
+        </p:nvSpPr>
+        <p:spPr>
+          <a:xfrm>
+            <a:off x="3682530" y="5209508"/>
+            <a:ext cx="1369862" cy="276999"/>
+          </a:xfrm>
+          <a:prstGeom prst="rect">
+            <a:avLst/>
+          </a:prstGeom>
+          <a:noFill/>
+        </p:spPr>
+        <p:txBody>
+          <a:bodyPr wrap="none" rtlCol="0">
+            <a:spAutoFit/>
+          </a:bodyPr>
+          <a:lstStyle/>
+          <a:p>
+            <a:r>
+              <a:rPr lang="en-US" sz="1200" dirty="0">
+                <a:solidFill>
+                  <a:schemeClr val="accent1">
+                    <a:lumMod val="25000"/>
+                  </a:schemeClr>
+                </a:solidFill>
+              </a:rPr>
+              <a:t>reeferTelemetries</a:t>
+            </a:r>
+          </a:p>
+        </p:txBody>
+      </p:sp>
+      <p:pic>
+        <p:nvPicPr>
+          <p:cNvPr id="24" name="Picture 23">
+            <a:extLst>
+              <a:ext uri="{FF2B5EF4-FFF2-40B4-BE49-F238E27FC236}">
+                <a16:creationId xmlns:a16="http://schemas.microsoft.com/office/drawing/2014/main" id="{B400E287-8B40-BE4C-B680-D40ED448B4E5}"/>
+              </a:ext>
+            </a:extLst>
+          </p:cNvPr>
+          <p:cNvPicPr>
+            <a:picLocks noChangeAspect="1"/>
+          </p:cNvPicPr>
+          <p:nvPr/>
+        </p:nvPicPr>
+        <p:blipFill>
+          <a:blip r:embed="rId3">
+            <a:extLst>
+              <a:ext uri="{28A0092B-C50C-407E-A947-70E740481C1C}">
+                <a14:useLocalDpi xmlns:a14="http://schemas.microsoft.com/office/drawing/2010/main" val="0"/>
+              </a:ext>
+            </a:extLst>
+          </a:blip>
+          <a:stretch>
+            <a:fillRect/>
+          </a:stretch>
+        </p:blipFill>
+        <p:spPr>
+          <a:xfrm>
+            <a:off x="2713993" y="5032053"/>
+            <a:ext cx="523018" cy="690721"/>
+          </a:xfrm>
+          <a:prstGeom prst="rect">
+            <a:avLst/>
+          </a:prstGeom>
+        </p:spPr>
+      </p:pic>
+      <p:pic>
+        <p:nvPicPr>
+          <p:cNvPr id="27" name="Picture 40">
+            <a:extLst>
+              <a:ext uri="{FF2B5EF4-FFF2-40B4-BE49-F238E27FC236}">
+                <a16:creationId xmlns:a16="http://schemas.microsoft.com/office/drawing/2014/main" id="{82D37B93-A674-6248-A0F6-C3053BF17E01}"/>
+              </a:ext>
+            </a:extLst>
+          </p:cNvPr>
+          <p:cNvPicPr>
+            <a:picLocks noChangeAspect="1"/>
+          </p:cNvPicPr>
+          <p:nvPr/>
+        </p:nvPicPr>
+        <p:blipFill>
+          <a:blip r:embed="rId4">
             <a:extLst>
               <a:ext uri="{28A0092B-C50C-407E-A947-70E740481C1C}">
                 <a14:useLocalDpi xmlns:a14="http://schemas.microsoft.com/office/drawing/2010/main" val="0"/>
@@ -17795,7 +18798,7 @@
         </p:blipFill>
         <p:spPr bwMode="auto">
           <a:xfrm>
-            <a:off x="116601" y="2734597"/>
+            <a:off x="-13004" y="5016111"/>
             <a:ext cx="1099134" cy="407338"/>
           </a:xfrm>
           <a:prstGeom prst="rect">
@@ -17828,29 +18831,32 @@
       </p:pic>
       <p:cxnSp>
         <p:nvCxnSpPr>
-          <p:cNvPr id="46" name="Elbow Connector 45">
+          <p:cNvPr id="28" name="Elbow Connector 27">
             <a:extLst>
               <a:ext uri="{FF2B5EF4-FFF2-40B4-BE49-F238E27FC236}">
-                <a16:creationId xmlns:a16="http://schemas.microsoft.com/office/drawing/2014/main" id="{B815F1F6-8EC9-A547-951A-6A6BA26A1B3E}"/>
+                <a16:creationId xmlns:a16="http://schemas.microsoft.com/office/drawing/2014/main" id="{C8FBC103-4DDC-FD42-8D32-2C65F09E2B19}"/>
               </a:ext>
             </a:extLst>
           </p:cNvPr>
           <p:cNvCxnSpPr>
             <a:cxnSpLocks/>
-            <a:stCxn id="9" idx="3"/>
-            <a:endCxn id="59" idx="1"/>
+            <a:stCxn id="15" idx="3"/>
+            <a:endCxn id="21" idx="2"/>
           </p:cNvCxnSpPr>
           <p:nvPr/>
         </p:nvCxnSpPr>
         <p:spPr>
           <a:xfrm>
-            <a:off x="2465614" y="2073727"/>
-            <a:ext cx="2093194" cy="516747"/>
-          </a:xfrm>
-          <a:prstGeom prst="bentConnector2">
-            <a:avLst/>
-          </a:prstGeom>
-          <a:ln>
+            <a:off x="2347079" y="4444393"/>
+            <a:ext cx="2734422" cy="725111"/>
+          </a:xfrm>
+          <a:prstGeom prst="bentConnector4">
+            <a:avLst>
+              <a:gd name="adj1" fmla="val 37228"/>
+              <a:gd name="adj2" fmla="val 243619"/>
+            </a:avLst>
+          </a:prstGeom>
+          <a:ln w="12700">
             <a:solidFill>
               <a:schemeClr val="accent6"/>
             </a:solidFill>
@@ -17875,33 +18881,33 @@
       </p:cxnSp>
       <p:cxnSp>
         <p:nvCxnSpPr>
-          <p:cNvPr id="71" name="Elbow Connector 70">
+          <p:cNvPr id="33" name="Elbow Connector 32">
             <a:extLst>
               <a:ext uri="{FF2B5EF4-FFF2-40B4-BE49-F238E27FC236}">
-                <a16:creationId xmlns:a16="http://schemas.microsoft.com/office/drawing/2014/main" id="{9B3950A4-1025-DB48-B886-5945ADD35206}"/>
+                <a16:creationId xmlns:a16="http://schemas.microsoft.com/office/drawing/2014/main" id="{A018039D-49E7-3C49-94D4-1BE530DE331F}"/>
               </a:ext>
             </a:extLst>
           </p:cNvPr>
           <p:cNvCxnSpPr>
             <a:cxnSpLocks/>
-            <a:stCxn id="45" idx="1"/>
-            <a:endCxn id="59" idx="4"/>
+            <a:stCxn id="20" idx="0"/>
+            <a:endCxn id="59" idx="3"/>
           </p:cNvCxnSpPr>
           <p:nvPr/>
         </p:nvCxnSpPr>
         <p:spPr>
-          <a:xfrm rot="10800000" flipV="1">
-            <a:off x="5157329" y="2100404"/>
-            <a:ext cx="1320870" cy="837862"/>
+          <a:xfrm rot="16200000" flipV="1">
+            <a:off x="4128790" y="3716076"/>
+            <a:ext cx="1151934" cy="291897"/>
           </a:xfrm>
           <a:prstGeom prst="bentConnector3">
             <a:avLst>
               <a:gd name="adj1" fmla="val 50000"/>
             </a:avLst>
           </a:prstGeom>
-          <a:ln>
+          <a:ln w="12700">
             <a:solidFill>
-              <a:srgbClr val="7030A0"/>
+              <a:srgbClr val="009643"/>
             </a:solidFill>
             <a:tailEnd type="triangle"/>
           </a:ln>
@@ -17924,10 +18930,10 @@
       </p:cxnSp>
       <p:sp>
         <p:nvSpPr>
-          <p:cNvPr id="45" name="Rounded Rectangle 44">
+          <p:cNvPr id="32" name="Rectangle 31">
             <a:extLst>
               <a:ext uri="{FF2B5EF4-FFF2-40B4-BE49-F238E27FC236}">
-                <a16:creationId xmlns:a16="http://schemas.microsoft.com/office/drawing/2014/main" id="{F495E1A9-5EC6-5446-ACF5-3911A287BB83}"/>
+                <a16:creationId xmlns:a16="http://schemas.microsoft.com/office/drawing/2014/main" id="{80B1BE04-8E41-6B41-9861-E9BB4FE73060}"/>
               </a:ext>
             </a:extLst>
           </p:cNvPr>
@@ -17936,108 +18942,10 @@
         </p:nvSpPr>
         <p:spPr>
           <a:xfrm>
-            <a:off x="6478199" y="1913633"/>
-            <a:ext cx="1749097" cy="373542"/>
-          </a:xfrm>
-          <a:prstGeom prst="roundRect">
-            <a:avLst>
-              <a:gd name="adj" fmla="val 9717"/>
-            </a:avLst>
-          </a:prstGeom>
-          <a:noFill/>
-          <a:ln w="12700">
-            <a:solidFill>
-              <a:schemeClr val="tx2">
-                <a:lumMod val="50000"/>
-              </a:schemeClr>
-            </a:solidFill>
-          </a:ln>
-          <a:effectLst/>
-        </p:spPr>
-        <p:style>
-          <a:lnRef idx="1">
-            <a:schemeClr val="dk1"/>
-          </a:lnRef>
-          <a:fillRef idx="2">
-            <a:schemeClr val="dk1"/>
-          </a:fillRef>
-          <a:effectRef idx="1">
-            <a:schemeClr val="dk1"/>
-          </a:effectRef>
-          <a:fontRef idx="minor">
-            <a:schemeClr val="dk1"/>
-          </a:fontRef>
-        </p:style>
-        <p:txBody>
-          <a:bodyPr rot="0" spcFirstLastPara="0" vertOverflow="overflow" horzOverflow="overflow" vert="horz" wrap="square" lIns="0" tIns="0" rIns="0" bIns="0" numCol="1" spcCol="0" rtlCol="0" fromWordArt="0" anchor="t" anchorCtr="0" forceAA="0" compatLnSpc="1">
-            <a:prstTxWarp prst="textNoShape">
-              <a:avLst/>
-            </a:prstTxWarp>
-            <a:noAutofit/>
-          </a:bodyPr>
-          <a:lstStyle/>
-          <a:p>
-            <a:r>
-              <a:rPr lang="en-US" sz="1200" baseline="0" dirty="0">
-                <a:solidFill>
-                  <a:schemeClr val="tx1"/>
-                </a:solidFill>
-                <a:latin typeface="IBM Plex Sans" panose="020B0503050203000203" pitchFamily="34" charset="77"/>
-                <a:cs typeface="Arial"/>
-              </a:rPr>
-              <a:t>Pandas DF</a:t>
-            </a:r>
-          </a:p>
-        </p:txBody>
-      </p:sp>
-      <p:pic>
-        <p:nvPicPr>
-          <p:cNvPr id="13" name="Picture 12">
-            <a:extLst>
-              <a:ext uri="{FF2B5EF4-FFF2-40B4-BE49-F238E27FC236}">
-                <a16:creationId xmlns:a16="http://schemas.microsoft.com/office/drawing/2014/main" id="{B81AAF60-BF23-E149-AC44-3DFB94494F2F}"/>
-              </a:ext>
-            </a:extLst>
-          </p:cNvPr>
-          <p:cNvPicPr>
-            <a:picLocks noChangeAspect="1"/>
-          </p:cNvPicPr>
-          <p:nvPr/>
-        </p:nvPicPr>
-        <p:blipFill>
-          <a:blip r:embed="rId3"/>
-          <a:stretch>
-            <a:fillRect/>
-          </a:stretch>
-        </p:blipFill>
-        <p:spPr>
-          <a:xfrm>
-            <a:off x="3492393" y="3041219"/>
-            <a:ext cx="638156" cy="680700"/>
+            <a:off x="3779270" y="3571943"/>
+            <a:ext cx="1651745" cy="415825"/>
           </a:xfrm>
           <a:prstGeom prst="rect">
-            <a:avLst/>
-          </a:prstGeom>
-        </p:spPr>
-      </p:pic>
-      <p:sp>
-        <p:nvSpPr>
-          <p:cNvPr id="59" name="Can 58">
-            <a:extLst>
-              <a:ext uri="{FF2B5EF4-FFF2-40B4-BE49-F238E27FC236}">
-                <a16:creationId xmlns:a16="http://schemas.microsoft.com/office/drawing/2014/main" id="{BF8D5F17-7886-6A49-A326-AB3283F367DA}"/>
-              </a:ext>
-            </a:extLst>
-          </p:cNvPr>
-          <p:cNvSpPr/>
-          <p:nvPr/>
-        </p:nvSpPr>
-        <p:spPr>
-          <a:xfrm>
-            <a:off x="3960287" y="2590474"/>
-            <a:ext cx="1197042" cy="695584"/>
-          </a:xfrm>
-          <a:prstGeom prst="can">
             <a:avLst/>
           </a:prstGeom>
           <a:solidFill>
@@ -18048,6 +18956,13 @@
           <a:ln>
             <a:noFill/>
           </a:ln>
+          <a:effectLst>
+            <a:outerShdw blurRad="50800" dist="38100" dir="5400000" algn="t" rotWithShape="0">
+              <a:prstClr val="black">
+                <a:alpha val="40000"/>
+              </a:prstClr>
+            </a:outerShdw>
+          </a:effectLst>
         </p:spPr>
         <p:style>
           <a:lnRef idx="2">
@@ -18071,8 +18986,315 @@
           <a:p>
             <a:pPr algn="ctr"/>
             <a:r>
+              <a:rPr lang="en-US" sz="1200" dirty="0"/>
+              <a:t>Long term persist stream</a:t>
+            </a:r>
+          </a:p>
+        </p:txBody>
+      </p:sp>
+      <p:sp>
+        <p:nvSpPr>
+          <p:cNvPr id="36" name="Can 35">
+            <a:extLst>
+              <a:ext uri="{FF2B5EF4-FFF2-40B4-BE49-F238E27FC236}">
+                <a16:creationId xmlns:a16="http://schemas.microsoft.com/office/drawing/2014/main" id="{838848AC-1D94-3D4E-9D79-D790EC064067}"/>
+              </a:ext>
+            </a:extLst>
+          </p:cNvPr>
+          <p:cNvSpPr/>
+          <p:nvPr/>
+        </p:nvSpPr>
+        <p:spPr>
+          <a:xfrm>
+            <a:off x="7108359" y="3489256"/>
+            <a:ext cx="895875" cy="695584"/>
+          </a:xfrm>
+          <a:prstGeom prst="can">
+            <a:avLst/>
+          </a:prstGeom>
+          <a:solidFill>
+            <a:schemeClr val="accent5">
+              <a:lumMod val="75000"/>
+            </a:schemeClr>
+          </a:solidFill>
+          <a:ln>
+            <a:noFill/>
+          </a:ln>
+        </p:spPr>
+        <p:style>
+          <a:lnRef idx="2">
+            <a:schemeClr val="accent1">
+              <a:shade val="50000"/>
+            </a:schemeClr>
+          </a:lnRef>
+          <a:fillRef idx="1">
+            <a:schemeClr val="accent1"/>
+          </a:fillRef>
+          <a:effectRef idx="0">
+            <a:schemeClr val="accent1"/>
+          </a:effectRef>
+          <a:fontRef idx="minor">
+            <a:schemeClr val="lt1"/>
+          </a:fontRef>
+        </p:style>
+        <p:txBody>
+          <a:bodyPr rtlCol="0" anchor="ctr"/>
+          <a:lstStyle/>
+          <a:p>
+            <a:pPr algn="ctr"/>
+            <a:r>
               <a:rPr lang="en-US" sz="1000" dirty="0"/>
-              <a:t>Reefer telemetries</a:t>
+              <a:t>Reefers Inventory</a:t>
+            </a:r>
+          </a:p>
+        </p:txBody>
+      </p:sp>
+      <p:sp>
+        <p:nvSpPr>
+          <p:cNvPr id="37" name="Can 36">
+            <a:extLst>
+              <a:ext uri="{FF2B5EF4-FFF2-40B4-BE49-F238E27FC236}">
+                <a16:creationId xmlns:a16="http://schemas.microsoft.com/office/drawing/2014/main" id="{8940F223-93A3-4947-A9E2-589C2FC0914F}"/>
+              </a:ext>
+            </a:extLst>
+          </p:cNvPr>
+          <p:cNvSpPr/>
+          <p:nvPr/>
+        </p:nvSpPr>
+        <p:spPr>
+          <a:xfrm>
+            <a:off x="8116630" y="3489256"/>
+            <a:ext cx="895875" cy="695584"/>
+          </a:xfrm>
+          <a:prstGeom prst="can">
+            <a:avLst/>
+          </a:prstGeom>
+          <a:solidFill>
+            <a:schemeClr val="accent5">
+              <a:lumMod val="75000"/>
+            </a:schemeClr>
+          </a:solidFill>
+          <a:ln>
+            <a:noFill/>
+          </a:ln>
+        </p:spPr>
+        <p:style>
+          <a:lnRef idx="2">
+            <a:schemeClr val="accent1">
+              <a:shade val="50000"/>
+            </a:schemeClr>
+          </a:lnRef>
+          <a:fillRef idx="1">
+            <a:schemeClr val="accent1"/>
+          </a:fillRef>
+          <a:effectRef idx="0">
+            <a:schemeClr val="accent1"/>
+          </a:effectRef>
+          <a:fontRef idx="minor">
+            <a:schemeClr val="lt1"/>
+          </a:fontRef>
+        </p:style>
+        <p:txBody>
+          <a:bodyPr rtlCol="0" anchor="ctr"/>
+          <a:lstStyle/>
+          <a:p>
+            <a:pPr algn="ctr"/>
+            <a:r>
+              <a:rPr lang="en-US" sz="1000" dirty="0"/>
+              <a:t>Products</a:t>
+            </a:r>
+          </a:p>
+        </p:txBody>
+      </p:sp>
+      <p:pic>
+        <p:nvPicPr>
+          <p:cNvPr id="38" name="Picture 37">
+            <a:extLst>
+              <a:ext uri="{FF2B5EF4-FFF2-40B4-BE49-F238E27FC236}">
+                <a16:creationId xmlns:a16="http://schemas.microsoft.com/office/drawing/2014/main" id="{3E12A240-C94D-F342-A515-AC9667796B7B}"/>
+              </a:ext>
+            </a:extLst>
+          </p:cNvPr>
+          <p:cNvPicPr>
+            <a:picLocks noChangeAspect="1"/>
+          </p:cNvPicPr>
+          <p:nvPr/>
+        </p:nvPicPr>
+        <p:blipFill>
+          <a:blip r:embed="rId5"/>
+          <a:stretch>
+            <a:fillRect/>
+          </a:stretch>
+        </p:blipFill>
+        <p:spPr>
+          <a:xfrm>
+            <a:off x="8941639" y="3913511"/>
+            <a:ext cx="638156" cy="680700"/>
+          </a:xfrm>
+          <a:prstGeom prst="rect">
+            <a:avLst/>
+          </a:prstGeom>
+        </p:spPr>
+      </p:pic>
+      <p:cxnSp>
+        <p:nvCxnSpPr>
+          <p:cNvPr id="39" name="Elbow Connector 38">
+            <a:extLst>
+              <a:ext uri="{FF2B5EF4-FFF2-40B4-BE49-F238E27FC236}">
+                <a16:creationId xmlns:a16="http://schemas.microsoft.com/office/drawing/2014/main" id="{2ADAE8E9-E8A0-C04F-AD33-82E1C5F42DB8}"/>
+              </a:ext>
+            </a:extLst>
+          </p:cNvPr>
+          <p:cNvCxnSpPr>
+            <a:cxnSpLocks/>
+            <a:stCxn id="45" idx="2"/>
+          </p:cNvCxnSpPr>
+          <p:nvPr/>
+        </p:nvCxnSpPr>
+        <p:spPr>
+          <a:xfrm rot="16200000" flipH="1">
+            <a:off x="7119144" y="2520778"/>
+            <a:ext cx="1151867" cy="684659"/>
+          </a:xfrm>
+          <a:prstGeom prst="bentConnector3">
+            <a:avLst>
+              <a:gd name="adj1" fmla="val 50000"/>
+            </a:avLst>
+          </a:prstGeom>
+          <a:ln w="12700">
+            <a:solidFill>
+              <a:srgbClr val="7030A0"/>
+            </a:solidFill>
+            <a:headEnd type="triangle"/>
+            <a:tailEnd type="none"/>
+          </a:ln>
+          <a:effectLst/>
+        </p:spPr>
+        <p:style>
+          <a:lnRef idx="2">
+            <a:schemeClr val="accent1"/>
+          </a:lnRef>
+          <a:fillRef idx="0">
+            <a:schemeClr val="accent1"/>
+          </a:fillRef>
+          <a:effectRef idx="1">
+            <a:schemeClr val="accent1"/>
+          </a:effectRef>
+          <a:fontRef idx="minor">
+            <a:schemeClr val="tx1"/>
+          </a:fontRef>
+        </p:style>
+      </p:cxnSp>
+      <p:sp>
+        <p:nvSpPr>
+          <p:cNvPr id="42" name="Oval 41">
+            <a:extLst>
+              <a:ext uri="{FF2B5EF4-FFF2-40B4-BE49-F238E27FC236}">
+                <a16:creationId xmlns:a16="http://schemas.microsoft.com/office/drawing/2014/main" id="{EF41234A-880A-8244-AA87-8EE3CA4327BE}"/>
+              </a:ext>
+            </a:extLst>
+          </p:cNvPr>
+          <p:cNvSpPr/>
+          <p:nvPr/>
+        </p:nvSpPr>
+        <p:spPr>
+          <a:xfrm>
+            <a:off x="246098" y="1544377"/>
+            <a:ext cx="290465" cy="369256"/>
+          </a:xfrm>
+          <a:prstGeom prst="ellipse">
+            <a:avLst/>
+          </a:prstGeom>
+          <a:solidFill>
+            <a:schemeClr val="tx2">
+              <a:lumMod val="75000"/>
+            </a:schemeClr>
+          </a:solidFill>
+          <a:ln>
+            <a:noFill/>
+          </a:ln>
+        </p:spPr>
+        <p:style>
+          <a:lnRef idx="2">
+            <a:schemeClr val="accent1">
+              <a:shade val="50000"/>
+            </a:schemeClr>
+          </a:lnRef>
+          <a:fillRef idx="1">
+            <a:schemeClr val="accent1"/>
+          </a:fillRef>
+          <a:effectRef idx="0">
+            <a:schemeClr val="accent1"/>
+          </a:effectRef>
+          <a:fontRef idx="minor">
+            <a:schemeClr val="lt1"/>
+          </a:fontRef>
+        </p:style>
+        <p:txBody>
+          <a:bodyPr rtlCol="0" anchor="ctr"/>
+          <a:lstStyle/>
+          <a:p>
+            <a:pPr algn="ctr"/>
+            <a:r>
+              <a:rPr lang="en-US" sz="1400" dirty="0"/>
+              <a:t>1</a:t>
+            </a:r>
+          </a:p>
+        </p:txBody>
+      </p:sp>
+      <p:sp>
+        <p:nvSpPr>
+          <p:cNvPr id="43" name="Oval 42">
+            <a:extLst>
+              <a:ext uri="{FF2B5EF4-FFF2-40B4-BE49-F238E27FC236}">
+                <a16:creationId xmlns:a16="http://schemas.microsoft.com/office/drawing/2014/main" id="{18795C1C-9E4F-AA4C-9D51-61F797DA92E3}"/>
+              </a:ext>
+            </a:extLst>
+          </p:cNvPr>
+          <p:cNvSpPr/>
+          <p:nvPr/>
+        </p:nvSpPr>
+        <p:spPr>
+          <a:xfrm>
+            <a:off x="795665" y="5454503"/>
+            <a:ext cx="290465" cy="369256"/>
+          </a:xfrm>
+          <a:prstGeom prst="ellipse">
+            <a:avLst/>
+          </a:prstGeom>
+          <a:solidFill>
+            <a:schemeClr val="tx2">
+              <a:lumMod val="75000"/>
+            </a:schemeClr>
+          </a:solidFill>
+          <a:ln>
+            <a:noFill/>
+          </a:ln>
+        </p:spPr>
+        <p:style>
+          <a:lnRef idx="2">
+            <a:schemeClr val="accent1">
+              <a:shade val="50000"/>
+            </a:schemeClr>
+          </a:lnRef>
+          <a:fillRef idx="1">
+            <a:schemeClr val="accent1"/>
+          </a:fillRef>
+          <a:effectRef idx="0">
+            <a:schemeClr val="accent1"/>
+          </a:effectRef>
+          <a:fontRef idx="minor">
+            <a:schemeClr val="lt1"/>
+          </a:fontRef>
+        </p:style>
+        <p:txBody>
+          <a:bodyPr rtlCol="0" anchor="ctr"/>
+          <a:lstStyle/>
+          <a:p>
+            <a:pPr algn="ctr"/>
+            <a:r>
+              <a:rPr lang="en-US" sz="1400" dirty="0"/>
+              <a:t>2</a:t>
             </a:r>
           </a:p>
         </p:txBody>
@@ -19424,6 +20646,36 @@
           </a:p>
         </p:txBody>
       </p:sp>
+      <p:pic>
+        <p:nvPicPr>
+          <p:cNvPr id="26" name="Picture 25">
+            <a:extLst>
+              <a:ext uri="{FF2B5EF4-FFF2-40B4-BE49-F238E27FC236}">
+                <a16:creationId xmlns:a16="http://schemas.microsoft.com/office/drawing/2014/main" id="{509913A5-E445-C54D-8C8A-64EA88153B4B}"/>
+              </a:ext>
+            </a:extLst>
+          </p:cNvPr>
+          <p:cNvPicPr>
+            <a:picLocks noChangeAspect="1"/>
+          </p:cNvPicPr>
+          <p:nvPr/>
+        </p:nvPicPr>
+        <p:blipFill>
+          <a:blip r:embed="rId4"/>
+          <a:stretch>
+            <a:fillRect/>
+          </a:stretch>
+        </p:blipFill>
+        <p:spPr>
+          <a:xfrm>
+            <a:off x="8048469" y="4322790"/>
+            <a:ext cx="638156" cy="680700"/>
+          </a:xfrm>
+          <a:prstGeom prst="rect">
+            <a:avLst/>
+          </a:prstGeom>
+        </p:spPr>
+      </p:pic>
     </p:spTree>
     <p:extLst>
       <p:ext uri="{BB962C8B-B14F-4D97-AF65-F5344CB8AC3E}">

</xml_diff>

<commit_message>
first drop for scoring with microprofile
</commit_message>
<xml_diff>
--- a/docs/diagrams.pptx
+++ b/docs/diagrams.pptx
@@ -6,18 +6,19 @@
     <p:sldMasterId id="2147484308" r:id="rId2"/>
   </p:sldMasterIdLst>
   <p:notesMasterIdLst>
-    <p:notesMasterId r:id="rId12"/>
+    <p:notesMasterId r:id="rId13"/>
   </p:notesMasterIdLst>
   <p:sldIdLst>
     <p:sldId id="141168470" r:id="rId3"/>
     <p:sldId id="141168471" r:id="rId4"/>
     <p:sldId id="141168473" r:id="rId5"/>
     <p:sldId id="141168474" r:id="rId6"/>
-    <p:sldId id="2783" r:id="rId7"/>
-    <p:sldId id="2801" r:id="rId8"/>
-    <p:sldId id="141168472" r:id="rId9"/>
-    <p:sldId id="2799" r:id="rId10"/>
-    <p:sldId id="2800" r:id="rId11"/>
+    <p:sldId id="141168475" r:id="rId7"/>
+    <p:sldId id="2783" r:id="rId8"/>
+    <p:sldId id="2801" r:id="rId9"/>
+    <p:sldId id="141168472" r:id="rId10"/>
+    <p:sldId id="2799" r:id="rId11"/>
+    <p:sldId id="2800" r:id="rId12"/>
   </p:sldIdLst>
   <p:sldSz cx="12192000" cy="6858000"/>
   <p:notesSz cx="7086600" cy="9372600"/>
@@ -280,7 +281,7 @@
               <a:pPr>
                 <a:defRPr/>
               </a:pPr>
-              <a:t>12/11/19</a:t>
+              <a:t>12/17/19</a:t>
             </a:fld>
             <a:endParaRPr lang="en-US" dirty="0"/>
           </a:p>
@@ -647,20 +648,12 @@
           <a:lstStyle/>
           <a:p>
             <a:r>
+              <a:rPr lang="en-US" dirty="0" err="1"/>
+              <a:t>Appsody</a:t>
+            </a:r>
+            <a:r>
               <a:rPr lang="en-US" dirty="0"/>
-              <a:t>Map geographic</a:t>
-            </a:r>
-          </a:p>
-          <a:p>
-            <a:r>
-              <a:rPr lang="en-US" dirty="0"/>
-              <a:t>Multiple ships </a:t>
-            </a:r>
-          </a:p>
-          <a:p>
-            <a:r>
-              <a:rPr lang="en-US" dirty="0"/>
-              <a:t>Ship</a:t>
+              <a:t> has different components working together to simplify developing cloud native app deployable on Kubernetes.</a:t>
             </a:r>
           </a:p>
         </p:txBody>
@@ -680,78 +673,24 @@
           <a:bodyPr/>
           <a:lstStyle/>
           <a:p>
-            <a:pPr marL="0" marR="0" lvl="0" indent="0" algn="r" defTabSz="914400" rtl="0" eaLnBrk="1" fontAlgn="base" latinLnBrk="0" hangingPunct="1">
-              <a:lnSpc>
-                <a:spcPct val="100000"/>
-              </a:lnSpc>
-              <a:spcBef>
-                <a:spcPct val="0"/>
-              </a:spcBef>
-              <a:spcAft>
-                <a:spcPct val="0"/>
-              </a:spcAft>
-              <a:buClrTx/>
-              <a:buSzTx/>
-              <a:buFontTx/>
-              <a:buNone/>
-              <a:tabLst/>
+            <a:pPr>
               <a:defRPr/>
             </a:pPr>
-            <a:fld id="{3E588AFF-6FEE-DA49-9FEF-8507A408CA7C}" type="slidenum">
-              <a:rPr kumimoji="0" lang="en-US" sz="1200" b="0" i="0" u="none" strike="noStrike" kern="1200" cap="none" spc="0" normalizeH="0" baseline="0" noProof="0" smtClean="0">
-                <a:ln>
-                  <a:noFill/>
-                </a:ln>
-                <a:solidFill>
-                  <a:prstClr val="black"/>
-                </a:solidFill>
-                <a:effectLst/>
-                <a:uLnTx/>
-                <a:uFillTx/>
-                <a:latin typeface="Calibri" panose="020F0502020204030204" pitchFamily="34" charset="0"/>
-                <a:ea typeface="+mn-ea"/>
-                <a:cs typeface="Arial" panose="020B0604020202020204" pitchFamily="34" charset="0"/>
-              </a:rPr>
-              <a:pPr marL="0" marR="0" lvl="0" indent="0" algn="r" defTabSz="914400" rtl="0" eaLnBrk="1" fontAlgn="base" latinLnBrk="0" hangingPunct="1">
-                <a:lnSpc>
-                  <a:spcPct val="100000"/>
-                </a:lnSpc>
-                <a:spcBef>
-                  <a:spcPct val="0"/>
-                </a:spcBef>
-                <a:spcAft>
-                  <a:spcPct val="0"/>
-                </a:spcAft>
-                <a:buClrTx/>
-                <a:buSzTx/>
-                <a:buFontTx/>
-                <a:buNone/>
-                <a:tabLst/>
+            <a:fld id="{06AAAE1B-F6B9-4FCD-B9AB-4A0AD0AFAC97}" type="slidenum">
+              <a:rPr lang="en-US" altLang="en-US" smtClean="0"/>
+              <a:pPr>
                 <a:defRPr/>
               </a:pPr>
               <a:t>5</a:t>
             </a:fld>
-            <a:endParaRPr kumimoji="0" lang="en-US" sz="1200" b="0" i="0" u="none" strike="noStrike" kern="1200" cap="none" spc="0" normalizeH="0" baseline="0" noProof="0">
-              <a:ln>
-                <a:noFill/>
-              </a:ln>
-              <a:solidFill>
-                <a:prstClr val="black"/>
-              </a:solidFill>
-              <a:effectLst/>
-              <a:uLnTx/>
-              <a:uFillTx/>
-              <a:latin typeface="Calibri" panose="020F0502020204030204" pitchFamily="34" charset="0"/>
-              <a:ea typeface="+mn-ea"/>
-              <a:cs typeface="Arial" panose="020B0604020202020204" pitchFamily="34" charset="0"/>
-            </a:endParaRPr>
+            <a:endParaRPr lang="en-US" altLang="en-US" dirty="0"/>
           </a:p>
         </p:txBody>
       </p:sp>
     </p:spTree>
     <p:extLst>
       <p:ext uri="{BB962C8B-B14F-4D97-AF65-F5344CB8AC3E}">
-        <p14:creationId xmlns:p14="http://schemas.microsoft.com/office/powerpoint/2010/main" val="2035668542"/>
+        <p14:creationId xmlns:p14="http://schemas.microsoft.com/office/powerpoint/2010/main" val="2621778659"/>
       </p:ext>
     </p:extLst>
   </p:cSld>
@@ -807,13 +746,19 @@
           <a:p>
             <a:r>
               <a:rPr lang="en-US" dirty="0"/>
-              <a:t>What to consider:</a:t>
+              <a:t>Map geographic</a:t>
             </a:r>
           </a:p>
           <a:p>
             <a:r>
               <a:rPr lang="en-US" dirty="0"/>
-              <a:t>- </a:t>
+              <a:t>Multiple ships </a:t>
+            </a:r>
+          </a:p>
+          <a:p>
+            <a:r>
+              <a:rPr lang="en-US" dirty="0"/>
+              <a:t>Ship</a:t>
             </a:r>
           </a:p>
         </p:txBody>
@@ -833,24 +778,78 @@
           <a:bodyPr/>
           <a:lstStyle/>
           <a:p>
-            <a:pPr>
+            <a:pPr marL="0" marR="0" lvl="0" indent="0" algn="r" defTabSz="914400" rtl="0" eaLnBrk="1" fontAlgn="base" latinLnBrk="0" hangingPunct="1">
+              <a:lnSpc>
+                <a:spcPct val="100000"/>
+              </a:lnSpc>
+              <a:spcBef>
+                <a:spcPct val="0"/>
+              </a:spcBef>
+              <a:spcAft>
+                <a:spcPct val="0"/>
+              </a:spcAft>
+              <a:buClrTx/>
+              <a:buSzTx/>
+              <a:buFontTx/>
+              <a:buNone/>
+              <a:tabLst/>
               <a:defRPr/>
             </a:pPr>
-            <a:fld id="{06AAAE1B-F6B9-4FCD-B9AB-4A0AD0AFAC97}" type="slidenum">
-              <a:rPr lang="en-US" altLang="en-US" smtClean="0"/>
-              <a:pPr>
+            <a:fld id="{3E588AFF-6FEE-DA49-9FEF-8507A408CA7C}" type="slidenum">
+              <a:rPr kumimoji="0" lang="en-US" sz="1200" b="0" i="0" u="none" strike="noStrike" kern="1200" cap="none" spc="0" normalizeH="0" baseline="0" noProof="0" smtClean="0">
+                <a:ln>
+                  <a:noFill/>
+                </a:ln>
+                <a:solidFill>
+                  <a:prstClr val="black"/>
+                </a:solidFill>
+                <a:effectLst/>
+                <a:uLnTx/>
+                <a:uFillTx/>
+                <a:latin typeface="Calibri" panose="020F0502020204030204" pitchFamily="34" charset="0"/>
+                <a:ea typeface="+mn-ea"/>
+                <a:cs typeface="Arial" panose="020B0604020202020204" pitchFamily="34" charset="0"/>
+              </a:rPr>
+              <a:pPr marL="0" marR="0" lvl="0" indent="0" algn="r" defTabSz="914400" rtl="0" eaLnBrk="1" fontAlgn="base" latinLnBrk="0" hangingPunct="1">
+                <a:lnSpc>
+                  <a:spcPct val="100000"/>
+                </a:lnSpc>
+                <a:spcBef>
+                  <a:spcPct val="0"/>
+                </a:spcBef>
+                <a:spcAft>
+                  <a:spcPct val="0"/>
+                </a:spcAft>
+                <a:buClrTx/>
+                <a:buSzTx/>
+                <a:buFontTx/>
+                <a:buNone/>
+                <a:tabLst/>
                 <a:defRPr/>
               </a:pPr>
               <a:t>6</a:t>
             </a:fld>
-            <a:endParaRPr lang="en-US" altLang="en-US" dirty="0"/>
+            <a:endParaRPr kumimoji="0" lang="en-US" sz="1200" b="0" i="0" u="none" strike="noStrike" kern="1200" cap="none" spc="0" normalizeH="0" baseline="0" noProof="0">
+              <a:ln>
+                <a:noFill/>
+              </a:ln>
+              <a:solidFill>
+                <a:prstClr val="black"/>
+              </a:solidFill>
+              <a:effectLst/>
+              <a:uLnTx/>
+              <a:uFillTx/>
+              <a:latin typeface="Calibri" panose="020F0502020204030204" pitchFamily="34" charset="0"/>
+              <a:ea typeface="+mn-ea"/>
+              <a:cs typeface="Arial" panose="020B0604020202020204" pitchFamily="34" charset="0"/>
+            </a:endParaRPr>
           </a:p>
         </p:txBody>
       </p:sp>
     </p:spTree>
     <p:extLst>
       <p:ext uri="{BB962C8B-B14F-4D97-AF65-F5344CB8AC3E}">
-        <p14:creationId xmlns:p14="http://schemas.microsoft.com/office/powerpoint/2010/main" val="1347545514"/>
+        <p14:creationId xmlns:p14="http://schemas.microsoft.com/office/powerpoint/2010/main" val="2035668542"/>
       </p:ext>
     </p:extLst>
   </p:cSld>
@@ -941,6 +940,105 @@
                 <a:defRPr/>
               </a:pPr>
               <a:t>7</a:t>
+            </a:fld>
+            <a:endParaRPr lang="en-US" altLang="en-US" dirty="0"/>
+          </a:p>
+        </p:txBody>
+      </p:sp>
+    </p:spTree>
+    <p:extLst>
+      <p:ext uri="{BB962C8B-B14F-4D97-AF65-F5344CB8AC3E}">
+        <p14:creationId xmlns:p14="http://schemas.microsoft.com/office/powerpoint/2010/main" val="1347545514"/>
+      </p:ext>
+    </p:extLst>
+  </p:cSld>
+  <p:clrMapOvr>
+    <a:masterClrMapping/>
+  </p:clrMapOvr>
+</p:notes>
+</file>
+
+<file path=ppt/notesSlides/notesSlide4.xml><?xml version="1.0" encoding="utf-8"?>
+<p:notes xmlns:a="http://schemas.openxmlformats.org/drawingml/2006/main" xmlns:r="http://schemas.openxmlformats.org/officeDocument/2006/relationships" xmlns:p="http://schemas.openxmlformats.org/presentationml/2006/main">
+  <p:cSld>
+    <p:spTree>
+      <p:nvGrpSpPr>
+        <p:cNvPr id="1" name=""/>
+        <p:cNvGrpSpPr/>
+        <p:nvPr/>
+      </p:nvGrpSpPr>
+      <p:grpSpPr>
+        <a:xfrm>
+          <a:off x="0" y="0"/>
+          <a:ext cx="0" cy="0"/>
+          <a:chOff x="0" y="0"/>
+          <a:chExt cx="0" cy="0"/>
+        </a:xfrm>
+      </p:grpSpPr>
+      <p:sp>
+        <p:nvSpPr>
+          <p:cNvPr id="2" name="Slide Image Placeholder 1"/>
+          <p:cNvSpPr>
+            <a:spLocks noGrp="1" noRot="1" noChangeAspect="1"/>
+          </p:cNvSpPr>
+          <p:nvPr>
+            <p:ph type="sldImg"/>
+          </p:nvPr>
+        </p:nvSpPr>
+        <p:spPr/>
+      </p:sp>
+      <p:sp>
+        <p:nvSpPr>
+          <p:cNvPr id="3" name="Notes Placeholder 2"/>
+          <p:cNvSpPr>
+            <a:spLocks noGrp="1"/>
+          </p:cNvSpPr>
+          <p:nvPr>
+            <p:ph type="body" idx="1"/>
+          </p:nvPr>
+        </p:nvSpPr>
+        <p:spPr/>
+        <p:txBody>
+          <a:bodyPr/>
+          <a:lstStyle/>
+          <a:p>
+            <a:r>
+              <a:rPr lang="en-US" dirty="0"/>
+              <a:t>What to consider:</a:t>
+            </a:r>
+          </a:p>
+          <a:p>
+            <a:r>
+              <a:rPr lang="en-US" dirty="0"/>
+              <a:t>- </a:t>
+            </a:r>
+          </a:p>
+        </p:txBody>
+      </p:sp>
+      <p:sp>
+        <p:nvSpPr>
+          <p:cNvPr id="4" name="Slide Number Placeholder 3"/>
+          <p:cNvSpPr>
+            <a:spLocks noGrp="1"/>
+          </p:cNvSpPr>
+          <p:nvPr>
+            <p:ph type="sldNum" sz="quarter" idx="5"/>
+          </p:nvPr>
+        </p:nvSpPr>
+        <p:spPr/>
+        <p:txBody>
+          <a:bodyPr/>
+          <a:lstStyle/>
+          <a:p>
+            <a:pPr>
+              <a:defRPr/>
+            </a:pPr>
+            <a:fld id="{06AAAE1B-F6B9-4FCD-B9AB-4A0AD0AFAC97}" type="slidenum">
+              <a:rPr lang="en-US" altLang="en-US" smtClean="0"/>
+              <a:pPr>
+                <a:defRPr/>
+              </a:pPr>
+              <a:t>8</a:t>
             </a:fld>
             <a:endParaRPr lang="en-US" altLang="en-US" dirty="0"/>
           </a:p>
@@ -8593,6 +8691,1383 @@
 </p:sld>
 </file>
 
+<file path=ppt/slides/slide10.xml><?xml version="1.0" encoding="utf-8"?>
+<p:sld xmlns:a="http://schemas.openxmlformats.org/drawingml/2006/main" xmlns:r="http://schemas.openxmlformats.org/officeDocument/2006/relationships" xmlns:p="http://schemas.openxmlformats.org/presentationml/2006/main">
+  <p:cSld>
+    <p:spTree>
+      <p:nvGrpSpPr>
+        <p:cNvPr id="1" name=""/>
+        <p:cNvGrpSpPr/>
+        <p:nvPr/>
+      </p:nvGrpSpPr>
+      <p:grpSpPr>
+        <a:xfrm>
+          <a:off x="0" y="0"/>
+          <a:ext cx="0" cy="0"/>
+          <a:chOff x="0" y="0"/>
+          <a:chExt cx="0" cy="0"/>
+        </a:xfrm>
+      </p:grpSpPr>
+      <p:sp>
+        <p:nvSpPr>
+          <p:cNvPr id="2" name="Title 1">
+            <a:extLst>
+              <a:ext uri="{FF2B5EF4-FFF2-40B4-BE49-F238E27FC236}">
+                <a16:creationId xmlns:a16="http://schemas.microsoft.com/office/drawing/2014/main" id="{83D72B5A-D2BF-0F41-AB02-0E3504265F76}"/>
+              </a:ext>
+            </a:extLst>
+          </p:cNvPr>
+          <p:cNvSpPr>
+            <a:spLocks noGrp="1"/>
+          </p:cNvSpPr>
+          <p:nvPr>
+            <p:ph type="title"/>
+          </p:nvPr>
+        </p:nvSpPr>
+        <p:spPr>
+          <a:xfrm>
+            <a:off x="288633" y="208582"/>
+            <a:ext cx="10515600" cy="521140"/>
+          </a:xfrm>
+        </p:spPr>
+        <p:txBody>
+          <a:bodyPr>
+            <a:normAutofit/>
+          </a:bodyPr>
+          <a:lstStyle/>
+          <a:p>
+            <a:r>
+              <a:rPr lang="en-US" sz="2400" dirty="0"/>
+              <a:t>Event Stream As Event Store for ML</a:t>
+            </a:r>
+          </a:p>
+        </p:txBody>
+      </p:sp>
+      <p:sp>
+        <p:nvSpPr>
+          <p:cNvPr id="4" name="Slide Number Placeholder 3">
+            <a:extLst>
+              <a:ext uri="{FF2B5EF4-FFF2-40B4-BE49-F238E27FC236}">
+                <a16:creationId xmlns:a16="http://schemas.microsoft.com/office/drawing/2014/main" id="{B1D66A27-027F-EA4A-B9BD-D02849496229}"/>
+              </a:ext>
+            </a:extLst>
+          </p:cNvPr>
+          <p:cNvSpPr>
+            <a:spLocks noGrp="1"/>
+          </p:cNvSpPr>
+          <p:nvPr>
+            <p:ph type="sldNum" sz="quarter" idx="12"/>
+          </p:nvPr>
+        </p:nvSpPr>
+        <p:spPr/>
+        <p:txBody>
+          <a:bodyPr/>
+          <a:lstStyle/>
+          <a:p>
+            <a:fld id="{C565C23E-6D76-459C-BC14-A9049E4EE889}" type="slidenum">
+              <a:rPr lang="en-US" smtClean="0"/>
+              <a:t>10</a:t>
+            </a:fld>
+            <a:endParaRPr lang="en-US"/>
+          </a:p>
+        </p:txBody>
+      </p:sp>
+      <p:sp>
+        <p:nvSpPr>
+          <p:cNvPr id="6" name="Rectangle 5">
+            <a:extLst>
+              <a:ext uri="{FF2B5EF4-FFF2-40B4-BE49-F238E27FC236}">
+                <a16:creationId xmlns:a16="http://schemas.microsoft.com/office/drawing/2014/main" id="{B53C0033-8D9E-604C-9B28-5FDD36C6C800}"/>
+              </a:ext>
+            </a:extLst>
+          </p:cNvPr>
+          <p:cNvSpPr/>
+          <p:nvPr/>
+        </p:nvSpPr>
+        <p:spPr>
+          <a:xfrm>
+            <a:off x="6118016" y="1168380"/>
+            <a:ext cx="3362160" cy="1973555"/>
+          </a:xfrm>
+          <a:prstGeom prst="rect">
+            <a:avLst/>
+          </a:prstGeom>
+          <a:noFill/>
+          <a:ln>
+            <a:prstDash val="dash"/>
+          </a:ln>
+        </p:spPr>
+        <p:style>
+          <a:lnRef idx="2">
+            <a:schemeClr val="accent1">
+              <a:shade val="50000"/>
+            </a:schemeClr>
+          </a:lnRef>
+          <a:fillRef idx="1">
+            <a:schemeClr val="accent1"/>
+          </a:fillRef>
+          <a:effectRef idx="0">
+            <a:schemeClr val="accent1"/>
+          </a:effectRef>
+          <a:fontRef idx="minor">
+            <a:schemeClr val="lt1"/>
+          </a:fontRef>
+        </p:style>
+        <p:txBody>
+          <a:bodyPr rtlCol="0" anchor="b"/>
+          <a:lstStyle/>
+          <a:p>
+            <a:pPr algn="ctr"/>
+            <a:r>
+              <a:rPr lang="en-US" sz="1200" dirty="0">
+                <a:solidFill>
+                  <a:schemeClr val="tx1"/>
+                </a:solidFill>
+              </a:rPr>
+              <a:t>ML Environment</a:t>
+            </a:r>
+          </a:p>
+        </p:txBody>
+      </p:sp>
+      <p:sp>
+        <p:nvSpPr>
+          <p:cNvPr id="8" name="Rectangle 7">
+            <a:extLst>
+              <a:ext uri="{FF2B5EF4-FFF2-40B4-BE49-F238E27FC236}">
+                <a16:creationId xmlns:a16="http://schemas.microsoft.com/office/drawing/2014/main" id="{FB63688E-FF28-D746-AC3D-3D2EFBDE0655}"/>
+              </a:ext>
+            </a:extLst>
+          </p:cNvPr>
+          <p:cNvSpPr/>
+          <p:nvPr/>
+        </p:nvSpPr>
+        <p:spPr>
+          <a:xfrm>
+            <a:off x="642258" y="1282632"/>
+            <a:ext cx="2008413" cy="1655634"/>
+          </a:xfrm>
+          <a:prstGeom prst="rect">
+            <a:avLst/>
+          </a:prstGeom>
+          <a:noFill/>
+          <a:ln>
+            <a:solidFill>
+              <a:schemeClr val="accent3"/>
+            </a:solidFill>
+            <a:prstDash val="dash"/>
+          </a:ln>
+        </p:spPr>
+        <p:style>
+          <a:lnRef idx="2">
+            <a:schemeClr val="accent1">
+              <a:shade val="50000"/>
+            </a:schemeClr>
+          </a:lnRef>
+          <a:fillRef idx="1">
+            <a:schemeClr val="accent1"/>
+          </a:fillRef>
+          <a:effectRef idx="0">
+            <a:schemeClr val="accent1"/>
+          </a:effectRef>
+          <a:fontRef idx="minor">
+            <a:schemeClr val="lt1"/>
+          </a:fontRef>
+        </p:style>
+        <p:txBody>
+          <a:bodyPr rtlCol="0" anchor="b"/>
+          <a:lstStyle/>
+          <a:p>
+            <a:pPr algn="ctr"/>
+            <a:r>
+              <a:rPr lang="en-US" sz="1200" dirty="0">
+                <a:solidFill>
+                  <a:schemeClr val="tx1"/>
+                </a:solidFill>
+              </a:rPr>
+              <a:t>Python</a:t>
+            </a:r>
+          </a:p>
+        </p:txBody>
+      </p:sp>
+      <p:sp>
+        <p:nvSpPr>
+          <p:cNvPr id="9" name="Rectangle 8">
+            <a:extLst>
+              <a:ext uri="{FF2B5EF4-FFF2-40B4-BE49-F238E27FC236}">
+                <a16:creationId xmlns:a16="http://schemas.microsoft.com/office/drawing/2014/main" id="{F1EEF6CD-0322-394A-87BF-5379FE8EE999}"/>
+              </a:ext>
+            </a:extLst>
+          </p:cNvPr>
+          <p:cNvSpPr/>
+          <p:nvPr/>
+        </p:nvSpPr>
+        <p:spPr>
+          <a:xfrm>
+            <a:off x="762000" y="1616527"/>
+            <a:ext cx="1703614" cy="914400"/>
+          </a:xfrm>
+          <a:prstGeom prst="rect">
+            <a:avLst/>
+          </a:prstGeom>
+          <a:solidFill>
+            <a:schemeClr val="accent5">
+              <a:lumMod val="75000"/>
+            </a:schemeClr>
+          </a:solidFill>
+        </p:spPr>
+        <p:style>
+          <a:lnRef idx="2">
+            <a:schemeClr val="accent1">
+              <a:shade val="50000"/>
+            </a:schemeClr>
+          </a:lnRef>
+          <a:fillRef idx="1">
+            <a:schemeClr val="accent1"/>
+          </a:fillRef>
+          <a:effectRef idx="0">
+            <a:schemeClr val="accent1"/>
+          </a:effectRef>
+          <a:fontRef idx="minor">
+            <a:schemeClr val="lt1"/>
+          </a:fontRef>
+        </p:style>
+        <p:txBody>
+          <a:bodyPr rtlCol="0" anchor="ctr"/>
+          <a:lstStyle/>
+          <a:p>
+            <a:pPr algn="ctr"/>
+            <a:r>
+              <a:rPr lang="en-US" sz="1400" dirty="0"/>
+              <a:t>Simulator</a:t>
+            </a:r>
+          </a:p>
+        </p:txBody>
+      </p:sp>
+      <p:sp>
+        <p:nvSpPr>
+          <p:cNvPr id="10" name="Rounded Rectangle 9">
+            <a:extLst>
+              <a:ext uri="{FF2B5EF4-FFF2-40B4-BE49-F238E27FC236}">
+                <a16:creationId xmlns:a16="http://schemas.microsoft.com/office/drawing/2014/main" id="{0BA597E7-00D6-7F44-9C30-03D1F5A01FB4}"/>
+              </a:ext>
+            </a:extLst>
+          </p:cNvPr>
+          <p:cNvSpPr/>
+          <p:nvPr/>
+        </p:nvSpPr>
+        <p:spPr bwMode="auto">
+          <a:xfrm>
+            <a:off x="2766994" y="4217859"/>
+            <a:ext cx="245561" cy="731512"/>
+          </a:xfrm>
+          <a:prstGeom prst="roundRect">
+            <a:avLst/>
+          </a:prstGeom>
+          <a:solidFill>
+            <a:schemeClr val="bg2"/>
+          </a:solidFill>
+          <a:ln>
+            <a:solidFill>
+              <a:schemeClr val="bg1"/>
+            </a:solidFill>
+            <a:prstDash val="solid"/>
+            <a:headEnd type="none" w="med" len="med"/>
+            <a:tailEnd type="none" w="med" len="med"/>
+          </a:ln>
+          <a:effectLst/>
+        </p:spPr>
+        <p:style>
+          <a:lnRef idx="1">
+            <a:schemeClr val="accent5"/>
+          </a:lnRef>
+          <a:fillRef idx="3">
+            <a:schemeClr val="accent5"/>
+          </a:fillRef>
+          <a:effectRef idx="2">
+            <a:schemeClr val="accent5"/>
+          </a:effectRef>
+          <a:fontRef idx="minor">
+            <a:schemeClr val="lt1"/>
+          </a:fontRef>
+        </p:style>
+        <p:txBody>
+          <a:bodyPr vert="horz" wrap="square" lIns="0" tIns="0" rIns="0" bIns="0" numCol="1" rtlCol="0" anchor="ctr" anchorCtr="0" compatLnSpc="1">
+            <a:prstTxWarp prst="textNoShape">
+              <a:avLst/>
+            </a:prstTxWarp>
+            <a:noAutofit/>
+          </a:bodyPr>
+          <a:lstStyle/>
+          <a:p>
+            <a:pPr algn="ctr" defTabSz="1219170" fontAlgn="base">
+              <a:lnSpc>
+                <a:spcPct val="90000"/>
+              </a:lnSpc>
+              <a:spcBef>
+                <a:spcPct val="0"/>
+              </a:spcBef>
+              <a:spcAft>
+                <a:spcPct val="0"/>
+              </a:spcAft>
+            </a:pPr>
+            <a:r>
+              <a:rPr lang="en-US" sz="1200" dirty="0">
+                <a:solidFill>
+                  <a:schemeClr val="bg1"/>
+                </a:solidFill>
+              </a:rPr>
+              <a:t>0</a:t>
+            </a:r>
+            <a:endParaRPr lang="en-US" sz="667" dirty="0">
+              <a:solidFill>
+                <a:schemeClr val="bg1"/>
+              </a:solidFill>
+            </a:endParaRPr>
+          </a:p>
+        </p:txBody>
+      </p:sp>
+      <p:sp>
+        <p:nvSpPr>
+          <p:cNvPr id="11" name="Rounded Rectangle 10">
+            <a:extLst>
+              <a:ext uri="{FF2B5EF4-FFF2-40B4-BE49-F238E27FC236}">
+                <a16:creationId xmlns:a16="http://schemas.microsoft.com/office/drawing/2014/main" id="{3F8CBAEE-0098-D148-A196-E5AD2B6787B8}"/>
+              </a:ext>
+            </a:extLst>
+          </p:cNvPr>
+          <p:cNvSpPr/>
+          <p:nvPr/>
+        </p:nvSpPr>
+        <p:spPr bwMode="auto">
+          <a:xfrm>
+            <a:off x="3010831" y="4217859"/>
+            <a:ext cx="245561" cy="731512"/>
+          </a:xfrm>
+          <a:prstGeom prst="roundRect">
+            <a:avLst/>
+          </a:prstGeom>
+          <a:solidFill>
+            <a:schemeClr val="bg2"/>
+          </a:solidFill>
+          <a:ln>
+            <a:solidFill>
+              <a:schemeClr val="bg1"/>
+            </a:solidFill>
+            <a:prstDash val="solid"/>
+            <a:headEnd type="none" w="med" len="med"/>
+            <a:tailEnd type="none" w="med" len="med"/>
+          </a:ln>
+          <a:effectLst/>
+        </p:spPr>
+        <p:style>
+          <a:lnRef idx="1">
+            <a:schemeClr val="accent5"/>
+          </a:lnRef>
+          <a:fillRef idx="3">
+            <a:schemeClr val="accent5"/>
+          </a:fillRef>
+          <a:effectRef idx="2">
+            <a:schemeClr val="accent5"/>
+          </a:effectRef>
+          <a:fontRef idx="minor">
+            <a:schemeClr val="lt1"/>
+          </a:fontRef>
+        </p:style>
+        <p:txBody>
+          <a:bodyPr vert="horz" wrap="square" lIns="0" tIns="0" rIns="0" bIns="0" numCol="1" rtlCol="0" anchor="ctr" anchorCtr="0" compatLnSpc="1">
+            <a:prstTxWarp prst="textNoShape">
+              <a:avLst/>
+            </a:prstTxWarp>
+            <a:noAutofit/>
+          </a:bodyPr>
+          <a:lstStyle/>
+          <a:p>
+            <a:pPr algn="ctr" defTabSz="1219170" fontAlgn="base">
+              <a:lnSpc>
+                <a:spcPct val="90000"/>
+              </a:lnSpc>
+              <a:spcBef>
+                <a:spcPct val="0"/>
+              </a:spcBef>
+              <a:spcAft>
+                <a:spcPct val="0"/>
+              </a:spcAft>
+            </a:pPr>
+            <a:r>
+              <a:rPr lang="en-US" sz="1200" dirty="0">
+                <a:solidFill>
+                  <a:schemeClr val="bg1"/>
+                </a:solidFill>
+              </a:rPr>
+              <a:t>1</a:t>
+            </a:r>
+            <a:endParaRPr lang="en-US" sz="667" dirty="0">
+              <a:solidFill>
+                <a:schemeClr val="bg1"/>
+              </a:solidFill>
+            </a:endParaRPr>
+          </a:p>
+        </p:txBody>
+      </p:sp>
+      <p:sp>
+        <p:nvSpPr>
+          <p:cNvPr id="12" name="Rounded Rectangle 11">
+            <a:extLst>
+              <a:ext uri="{FF2B5EF4-FFF2-40B4-BE49-F238E27FC236}">
+                <a16:creationId xmlns:a16="http://schemas.microsoft.com/office/drawing/2014/main" id="{F2989703-2F49-5647-B6D8-F7993E04EAE4}"/>
+              </a:ext>
+            </a:extLst>
+          </p:cNvPr>
+          <p:cNvSpPr/>
+          <p:nvPr/>
+        </p:nvSpPr>
+        <p:spPr bwMode="auto">
+          <a:xfrm>
+            <a:off x="3256393" y="4217859"/>
+            <a:ext cx="245561" cy="731512"/>
+          </a:xfrm>
+          <a:prstGeom prst="roundRect">
+            <a:avLst/>
+          </a:prstGeom>
+          <a:solidFill>
+            <a:schemeClr val="bg2"/>
+          </a:solidFill>
+          <a:ln>
+            <a:solidFill>
+              <a:schemeClr val="bg1"/>
+            </a:solidFill>
+            <a:prstDash val="solid"/>
+            <a:headEnd type="none" w="med" len="med"/>
+            <a:tailEnd type="none" w="med" len="med"/>
+          </a:ln>
+          <a:effectLst/>
+        </p:spPr>
+        <p:style>
+          <a:lnRef idx="1">
+            <a:schemeClr val="accent5"/>
+          </a:lnRef>
+          <a:fillRef idx="3">
+            <a:schemeClr val="accent5"/>
+          </a:fillRef>
+          <a:effectRef idx="2">
+            <a:schemeClr val="accent5"/>
+          </a:effectRef>
+          <a:fontRef idx="minor">
+            <a:schemeClr val="lt1"/>
+          </a:fontRef>
+        </p:style>
+        <p:txBody>
+          <a:bodyPr vert="horz" wrap="square" lIns="0" tIns="0" rIns="0" bIns="0" numCol="1" rtlCol="0" anchor="ctr" anchorCtr="0" compatLnSpc="1">
+            <a:prstTxWarp prst="textNoShape">
+              <a:avLst/>
+            </a:prstTxWarp>
+            <a:noAutofit/>
+          </a:bodyPr>
+          <a:lstStyle/>
+          <a:p>
+            <a:pPr algn="ctr" defTabSz="1219170" fontAlgn="base">
+              <a:lnSpc>
+                <a:spcPct val="90000"/>
+              </a:lnSpc>
+              <a:spcBef>
+                <a:spcPct val="0"/>
+              </a:spcBef>
+              <a:spcAft>
+                <a:spcPct val="0"/>
+              </a:spcAft>
+            </a:pPr>
+            <a:r>
+              <a:rPr lang="en-US" sz="1200" dirty="0">
+                <a:solidFill>
+                  <a:schemeClr val="bg1"/>
+                </a:solidFill>
+              </a:rPr>
+              <a:t>2</a:t>
+            </a:r>
+            <a:endParaRPr lang="en-US" sz="667" dirty="0">
+              <a:solidFill>
+                <a:schemeClr val="bg1"/>
+              </a:solidFill>
+            </a:endParaRPr>
+          </a:p>
+        </p:txBody>
+      </p:sp>
+      <p:sp>
+        <p:nvSpPr>
+          <p:cNvPr id="13" name="Rounded Rectangle 12">
+            <a:extLst>
+              <a:ext uri="{FF2B5EF4-FFF2-40B4-BE49-F238E27FC236}">
+                <a16:creationId xmlns:a16="http://schemas.microsoft.com/office/drawing/2014/main" id="{54F04F52-1698-E54E-8D5D-3991A0424611}"/>
+              </a:ext>
+            </a:extLst>
+          </p:cNvPr>
+          <p:cNvSpPr/>
+          <p:nvPr/>
+        </p:nvSpPr>
+        <p:spPr bwMode="auto">
+          <a:xfrm>
+            <a:off x="3500230" y="4217859"/>
+            <a:ext cx="245561" cy="731512"/>
+          </a:xfrm>
+          <a:prstGeom prst="roundRect">
+            <a:avLst/>
+          </a:prstGeom>
+          <a:solidFill>
+            <a:schemeClr val="bg2"/>
+          </a:solidFill>
+          <a:ln>
+            <a:solidFill>
+              <a:schemeClr val="bg1"/>
+            </a:solidFill>
+            <a:prstDash val="solid"/>
+            <a:headEnd type="none" w="med" len="med"/>
+            <a:tailEnd type="none" w="med" len="med"/>
+          </a:ln>
+          <a:effectLst/>
+        </p:spPr>
+        <p:style>
+          <a:lnRef idx="1">
+            <a:schemeClr val="accent5"/>
+          </a:lnRef>
+          <a:fillRef idx="3">
+            <a:schemeClr val="accent5"/>
+          </a:fillRef>
+          <a:effectRef idx="2">
+            <a:schemeClr val="accent5"/>
+          </a:effectRef>
+          <a:fontRef idx="minor">
+            <a:schemeClr val="lt1"/>
+          </a:fontRef>
+        </p:style>
+        <p:txBody>
+          <a:bodyPr vert="horz" wrap="square" lIns="0" tIns="0" rIns="0" bIns="0" numCol="1" rtlCol="0" anchor="ctr" anchorCtr="0" compatLnSpc="1">
+            <a:prstTxWarp prst="textNoShape">
+              <a:avLst/>
+            </a:prstTxWarp>
+            <a:noAutofit/>
+          </a:bodyPr>
+          <a:lstStyle/>
+          <a:p>
+            <a:pPr algn="ctr" defTabSz="1219170" fontAlgn="base">
+              <a:lnSpc>
+                <a:spcPct val="90000"/>
+              </a:lnSpc>
+              <a:spcBef>
+                <a:spcPct val="0"/>
+              </a:spcBef>
+              <a:spcAft>
+                <a:spcPct val="0"/>
+              </a:spcAft>
+            </a:pPr>
+            <a:r>
+              <a:rPr lang="en-US" sz="1200" dirty="0">
+                <a:solidFill>
+                  <a:schemeClr val="bg1"/>
+                </a:solidFill>
+              </a:rPr>
+              <a:t>3</a:t>
+            </a:r>
+            <a:endParaRPr lang="en-US" sz="667" dirty="0">
+              <a:solidFill>
+                <a:schemeClr val="bg1"/>
+              </a:solidFill>
+            </a:endParaRPr>
+          </a:p>
+        </p:txBody>
+      </p:sp>
+      <p:sp>
+        <p:nvSpPr>
+          <p:cNvPr id="14" name="Rounded Rectangle 13">
+            <a:extLst>
+              <a:ext uri="{FF2B5EF4-FFF2-40B4-BE49-F238E27FC236}">
+                <a16:creationId xmlns:a16="http://schemas.microsoft.com/office/drawing/2014/main" id="{3890F22B-7831-CC45-9E84-2F465C403BBE}"/>
+              </a:ext>
+            </a:extLst>
+          </p:cNvPr>
+          <p:cNvSpPr/>
+          <p:nvPr/>
+        </p:nvSpPr>
+        <p:spPr bwMode="auto">
+          <a:xfrm>
+            <a:off x="3745791" y="4217859"/>
+            <a:ext cx="245561" cy="731512"/>
+          </a:xfrm>
+          <a:prstGeom prst="roundRect">
+            <a:avLst/>
+          </a:prstGeom>
+          <a:solidFill>
+            <a:schemeClr val="bg2"/>
+          </a:solidFill>
+          <a:ln>
+            <a:solidFill>
+              <a:schemeClr val="bg1"/>
+            </a:solidFill>
+            <a:prstDash val="solid"/>
+            <a:headEnd type="none" w="med" len="med"/>
+            <a:tailEnd type="none" w="med" len="med"/>
+          </a:ln>
+          <a:effectLst/>
+        </p:spPr>
+        <p:style>
+          <a:lnRef idx="1">
+            <a:schemeClr val="accent5"/>
+          </a:lnRef>
+          <a:fillRef idx="3">
+            <a:schemeClr val="accent5"/>
+          </a:fillRef>
+          <a:effectRef idx="2">
+            <a:schemeClr val="accent5"/>
+          </a:effectRef>
+          <a:fontRef idx="minor">
+            <a:schemeClr val="lt1"/>
+          </a:fontRef>
+        </p:style>
+        <p:txBody>
+          <a:bodyPr vert="horz" wrap="square" lIns="0" tIns="0" rIns="0" bIns="0" numCol="1" rtlCol="0" anchor="ctr" anchorCtr="0" compatLnSpc="1">
+            <a:prstTxWarp prst="textNoShape">
+              <a:avLst/>
+            </a:prstTxWarp>
+            <a:noAutofit/>
+          </a:bodyPr>
+          <a:lstStyle/>
+          <a:p>
+            <a:pPr algn="ctr" defTabSz="1219170" fontAlgn="base">
+              <a:lnSpc>
+                <a:spcPct val="90000"/>
+              </a:lnSpc>
+              <a:spcBef>
+                <a:spcPct val="0"/>
+              </a:spcBef>
+              <a:spcAft>
+                <a:spcPct val="0"/>
+              </a:spcAft>
+            </a:pPr>
+            <a:r>
+              <a:rPr lang="en-US" sz="1200" dirty="0">
+                <a:solidFill>
+                  <a:schemeClr val="bg1"/>
+                </a:solidFill>
+              </a:rPr>
+              <a:t>4</a:t>
+            </a:r>
+            <a:endParaRPr lang="en-US" sz="667" dirty="0">
+              <a:solidFill>
+                <a:schemeClr val="bg1"/>
+              </a:solidFill>
+            </a:endParaRPr>
+          </a:p>
+        </p:txBody>
+      </p:sp>
+      <p:sp>
+        <p:nvSpPr>
+          <p:cNvPr id="15" name="Rounded Rectangle 14">
+            <a:extLst>
+              <a:ext uri="{FF2B5EF4-FFF2-40B4-BE49-F238E27FC236}">
+                <a16:creationId xmlns:a16="http://schemas.microsoft.com/office/drawing/2014/main" id="{EED12008-2192-5048-99A3-CAFBD4DFB3A8}"/>
+              </a:ext>
+            </a:extLst>
+          </p:cNvPr>
+          <p:cNvSpPr/>
+          <p:nvPr/>
+        </p:nvSpPr>
+        <p:spPr bwMode="auto">
+          <a:xfrm>
+            <a:off x="3976587" y="4217859"/>
+            <a:ext cx="245561" cy="731512"/>
+          </a:xfrm>
+          <a:prstGeom prst="roundRect">
+            <a:avLst/>
+          </a:prstGeom>
+          <a:solidFill>
+            <a:schemeClr val="bg2"/>
+          </a:solidFill>
+          <a:ln>
+            <a:solidFill>
+              <a:schemeClr val="bg1"/>
+            </a:solidFill>
+            <a:prstDash val="solid"/>
+            <a:headEnd type="none" w="med" len="med"/>
+            <a:tailEnd type="none" w="med" len="med"/>
+          </a:ln>
+          <a:effectLst/>
+        </p:spPr>
+        <p:style>
+          <a:lnRef idx="1">
+            <a:schemeClr val="accent5"/>
+          </a:lnRef>
+          <a:fillRef idx="3">
+            <a:schemeClr val="accent5"/>
+          </a:fillRef>
+          <a:effectRef idx="2">
+            <a:schemeClr val="accent5"/>
+          </a:effectRef>
+          <a:fontRef idx="minor">
+            <a:schemeClr val="lt1"/>
+          </a:fontRef>
+        </p:style>
+        <p:txBody>
+          <a:bodyPr vert="horz" wrap="square" lIns="0" tIns="0" rIns="0" bIns="0" numCol="1" rtlCol="0" anchor="ctr" anchorCtr="0" compatLnSpc="1">
+            <a:prstTxWarp prst="textNoShape">
+              <a:avLst/>
+            </a:prstTxWarp>
+            <a:noAutofit/>
+          </a:bodyPr>
+          <a:lstStyle/>
+          <a:p>
+            <a:pPr algn="ctr" defTabSz="1219170" fontAlgn="base">
+              <a:lnSpc>
+                <a:spcPct val="90000"/>
+              </a:lnSpc>
+              <a:spcBef>
+                <a:spcPct val="0"/>
+              </a:spcBef>
+              <a:spcAft>
+                <a:spcPct val="0"/>
+              </a:spcAft>
+            </a:pPr>
+            <a:r>
+              <a:rPr lang="en-US" sz="1200" dirty="0">
+                <a:solidFill>
+                  <a:schemeClr val="bg1"/>
+                </a:solidFill>
+              </a:rPr>
+              <a:t>5</a:t>
+            </a:r>
+            <a:endParaRPr lang="en-US" sz="667" dirty="0">
+              <a:solidFill>
+                <a:schemeClr val="bg1"/>
+              </a:solidFill>
+            </a:endParaRPr>
+          </a:p>
+        </p:txBody>
+      </p:sp>
+      <p:sp>
+        <p:nvSpPr>
+          <p:cNvPr id="18" name="AutoShape 4">
+            <a:extLst>
+              <a:ext uri="{FF2B5EF4-FFF2-40B4-BE49-F238E27FC236}">
+                <a16:creationId xmlns:a16="http://schemas.microsoft.com/office/drawing/2014/main" id="{CDC99AA8-3A32-6E4A-99DE-489E3056BAE3}"/>
+              </a:ext>
+            </a:extLst>
+          </p:cNvPr>
+          <p:cNvSpPr>
+            <a:spLocks noChangeArrowheads="1"/>
+          </p:cNvSpPr>
+          <p:nvPr/>
+        </p:nvSpPr>
+        <p:spPr bwMode="auto">
+          <a:xfrm>
+            <a:off x="1899331" y="3925562"/>
+            <a:ext cx="3513917" cy="1348479"/>
+          </a:xfrm>
+          <a:prstGeom prst="roundRect">
+            <a:avLst>
+              <a:gd name="adj" fmla="val 7117"/>
+            </a:avLst>
+          </a:prstGeom>
+          <a:noFill/>
+          <a:ln w="12700">
+            <a:solidFill>
+              <a:schemeClr val="accent3"/>
+            </a:solidFill>
+            <a:prstDash val="dash"/>
+            <a:round/>
+            <a:headEnd/>
+            <a:tailEnd/>
+          </a:ln>
+        </p:spPr>
+        <p:txBody>
+          <a:bodyPr lIns="0" tIns="0" rIns="0" bIns="0" anchor="b" anchorCtr="1"/>
+          <a:lstStyle/>
+          <a:p>
+            <a:pPr algn="ctr"/>
+            <a:endParaRPr lang="en-US" sz="1333" dirty="0"/>
+          </a:p>
+        </p:txBody>
+      </p:sp>
+      <p:sp>
+        <p:nvSpPr>
+          <p:cNvPr id="20" name="TextBox 19">
+            <a:extLst>
+              <a:ext uri="{FF2B5EF4-FFF2-40B4-BE49-F238E27FC236}">
+                <a16:creationId xmlns:a16="http://schemas.microsoft.com/office/drawing/2014/main" id="{DBB9557F-8237-544F-8483-B618ED14A2EB}"/>
+              </a:ext>
+            </a:extLst>
+          </p:cNvPr>
+          <p:cNvSpPr txBox="1"/>
+          <p:nvPr/>
+        </p:nvSpPr>
+        <p:spPr>
+          <a:xfrm>
+            <a:off x="2700397" y="4904710"/>
+            <a:ext cx="1967270" cy="369332"/>
+          </a:xfrm>
+          <a:prstGeom prst="rect">
+            <a:avLst/>
+          </a:prstGeom>
+          <a:noFill/>
+        </p:spPr>
+        <p:txBody>
+          <a:bodyPr wrap="none" rtlCol="0">
+            <a:spAutoFit/>
+          </a:bodyPr>
+          <a:lstStyle/>
+          <a:p>
+            <a:r>
+              <a:rPr lang="en-US" dirty="0">
+                <a:solidFill>
+                  <a:schemeClr val="accent1">
+                    <a:lumMod val="25000"/>
+                  </a:schemeClr>
+                </a:solidFill>
+              </a:rPr>
+              <a:t>reeferTelemetries</a:t>
+            </a:r>
+          </a:p>
+        </p:txBody>
+      </p:sp>
+      <p:pic>
+        <p:nvPicPr>
+          <p:cNvPr id="22" name="Picture 21">
+            <a:extLst>
+              <a:ext uri="{FF2B5EF4-FFF2-40B4-BE49-F238E27FC236}">
+                <a16:creationId xmlns:a16="http://schemas.microsoft.com/office/drawing/2014/main" id="{1B16228E-748D-5644-91F6-79288C7462BE}"/>
+              </a:ext>
+            </a:extLst>
+          </p:cNvPr>
+          <p:cNvPicPr>
+            <a:picLocks noChangeAspect="1"/>
+          </p:cNvPicPr>
+          <p:nvPr/>
+        </p:nvPicPr>
+        <p:blipFill>
+          <a:blip r:embed="rId2">
+            <a:extLst>
+              <a:ext uri="{28A0092B-C50C-407E-A947-70E740481C1C}">
+                <a14:useLocalDpi xmlns:a14="http://schemas.microsoft.com/office/drawing/2010/main" val="0"/>
+              </a:ext>
+            </a:extLst>
+          </a:blip>
+          <a:stretch>
+            <a:fillRect/>
+          </a:stretch>
+        </p:blipFill>
+        <p:spPr>
+          <a:xfrm>
+            <a:off x="1904609" y="3930860"/>
+            <a:ext cx="523018" cy="690721"/>
+          </a:xfrm>
+          <a:prstGeom prst="rect">
+            <a:avLst/>
+          </a:prstGeom>
+        </p:spPr>
+      </p:pic>
+      <p:pic>
+        <p:nvPicPr>
+          <p:cNvPr id="24" name="Picture 40">
+            <a:extLst>
+              <a:ext uri="{FF2B5EF4-FFF2-40B4-BE49-F238E27FC236}">
+                <a16:creationId xmlns:a16="http://schemas.microsoft.com/office/drawing/2014/main" id="{E8EEB410-07EC-D848-92F0-6380D4A64C59}"/>
+              </a:ext>
+            </a:extLst>
+          </p:cNvPr>
+          <p:cNvPicPr>
+            <a:picLocks noChangeAspect="1"/>
+          </p:cNvPicPr>
+          <p:nvPr/>
+        </p:nvPicPr>
+        <p:blipFill>
+          <a:blip r:embed="rId3">
+            <a:extLst>
+              <a:ext uri="{28A0092B-C50C-407E-A947-70E740481C1C}">
+                <a14:useLocalDpi xmlns:a14="http://schemas.microsoft.com/office/drawing/2010/main" val="0"/>
+              </a:ext>
+            </a:extLst>
+          </a:blip>
+          <a:srcRect/>
+          <a:stretch>
+            <a:fillRect/>
+          </a:stretch>
+        </p:blipFill>
+        <p:spPr bwMode="auto">
+          <a:xfrm>
+            <a:off x="1366480" y="5093585"/>
+            <a:ext cx="1099134" cy="407338"/>
+          </a:xfrm>
+          <a:prstGeom prst="rect">
+            <a:avLst/>
+          </a:prstGeom>
+          <a:noFill/>
+          <a:ln>
+            <a:noFill/>
+          </a:ln>
+          <a:extLst>
+            <a:ext uri="{909E8E84-426E-40DD-AFC4-6F175D3DCCD1}">
+              <a14:hiddenFill xmlns:a14="http://schemas.microsoft.com/office/drawing/2010/main">
+                <a:solidFill>
+                  <a:srgbClr val="FFFFFF"/>
+                </a:solidFill>
+              </a14:hiddenFill>
+            </a:ext>
+            <a:ext uri="{91240B29-F687-4F45-9708-019B960494DF}">
+              <a14:hiddenLine xmlns:a14="http://schemas.microsoft.com/office/drawing/2010/main" w="9525">
+                <a:solidFill>
+                  <a:srgbClr val="000000"/>
+                </a:solidFill>
+                <a:miter lim="800000"/>
+                <a:headEnd/>
+                <a:tailEnd/>
+              </a14:hiddenLine>
+            </a:ext>
+          </a:extLst>
+        </p:spPr>
+      </p:pic>
+      <p:pic>
+        <p:nvPicPr>
+          <p:cNvPr id="25" name="Picture 40">
+            <a:extLst>
+              <a:ext uri="{FF2B5EF4-FFF2-40B4-BE49-F238E27FC236}">
+                <a16:creationId xmlns:a16="http://schemas.microsoft.com/office/drawing/2014/main" id="{6CF0C2DA-CD62-0F4A-B6D7-15B98EF785FA}"/>
+              </a:ext>
+            </a:extLst>
+          </p:cNvPr>
+          <p:cNvPicPr>
+            <a:picLocks noChangeAspect="1"/>
+          </p:cNvPicPr>
+          <p:nvPr/>
+        </p:nvPicPr>
+        <p:blipFill>
+          <a:blip r:embed="rId3">
+            <a:extLst>
+              <a:ext uri="{28A0092B-C50C-407E-A947-70E740481C1C}">
+                <a14:useLocalDpi xmlns:a14="http://schemas.microsoft.com/office/drawing/2010/main" val="0"/>
+              </a:ext>
+            </a:extLst>
+          </a:blip>
+          <a:srcRect/>
+          <a:stretch>
+            <a:fillRect/>
+          </a:stretch>
+        </p:blipFill>
+        <p:spPr bwMode="auto">
+          <a:xfrm>
+            <a:off x="116601" y="2734597"/>
+            <a:ext cx="1099134" cy="407338"/>
+          </a:xfrm>
+          <a:prstGeom prst="rect">
+            <a:avLst/>
+          </a:prstGeom>
+          <a:noFill/>
+          <a:ln>
+            <a:noFill/>
+          </a:ln>
+          <a:extLst>
+            <a:ext uri="{909E8E84-426E-40DD-AFC4-6F175D3DCCD1}">
+              <a14:hiddenFill xmlns:a14="http://schemas.microsoft.com/office/drawing/2010/main">
+                <a:solidFill>
+                  <a:srgbClr val="FFFFFF"/>
+                </a:solidFill>
+              </a14:hiddenFill>
+            </a:ext>
+            <a:ext uri="{91240B29-F687-4F45-9708-019B960494DF}">
+              <a14:hiddenLine xmlns:a14="http://schemas.microsoft.com/office/drawing/2010/main" w="9525">
+                <a:solidFill>
+                  <a:srgbClr val="000000"/>
+                </a:solidFill>
+                <a:miter lim="800000"/>
+                <a:headEnd/>
+                <a:tailEnd/>
+              </a14:hiddenLine>
+            </a:ext>
+          </a:extLst>
+        </p:spPr>
+      </p:pic>
+      <p:sp>
+        <p:nvSpPr>
+          <p:cNvPr id="27" name="Rounded Rectangle 26">
+            <a:extLst>
+              <a:ext uri="{FF2B5EF4-FFF2-40B4-BE49-F238E27FC236}">
+                <a16:creationId xmlns:a16="http://schemas.microsoft.com/office/drawing/2014/main" id="{E472D71D-D4D6-9743-8082-F5CD0C08D2B8}"/>
+              </a:ext>
+            </a:extLst>
+          </p:cNvPr>
+          <p:cNvSpPr/>
+          <p:nvPr/>
+        </p:nvSpPr>
+        <p:spPr>
+          <a:xfrm>
+            <a:off x="6455197" y="1357868"/>
+            <a:ext cx="1749097" cy="373542"/>
+          </a:xfrm>
+          <a:prstGeom prst="roundRect">
+            <a:avLst>
+              <a:gd name="adj" fmla="val 9717"/>
+            </a:avLst>
+          </a:prstGeom>
+          <a:noFill/>
+          <a:ln w="12700">
+            <a:solidFill>
+              <a:schemeClr val="tx2">
+                <a:lumMod val="50000"/>
+              </a:schemeClr>
+            </a:solidFill>
+          </a:ln>
+          <a:effectLst/>
+        </p:spPr>
+        <p:style>
+          <a:lnRef idx="1">
+            <a:schemeClr val="dk1"/>
+          </a:lnRef>
+          <a:fillRef idx="2">
+            <a:schemeClr val="dk1"/>
+          </a:fillRef>
+          <a:effectRef idx="1">
+            <a:schemeClr val="dk1"/>
+          </a:effectRef>
+          <a:fontRef idx="minor">
+            <a:schemeClr val="dk1"/>
+          </a:fontRef>
+        </p:style>
+        <p:txBody>
+          <a:bodyPr rot="0" spcFirstLastPara="0" vertOverflow="overflow" horzOverflow="overflow" vert="horz" wrap="square" lIns="0" tIns="0" rIns="0" bIns="0" numCol="1" spcCol="0" rtlCol="0" fromWordArt="0" anchor="t" anchorCtr="0" forceAA="0" compatLnSpc="1">
+            <a:prstTxWarp prst="textNoShape">
+              <a:avLst/>
+            </a:prstTxWarp>
+            <a:noAutofit/>
+          </a:bodyPr>
+          <a:lstStyle/>
+          <a:p>
+            <a:r>
+              <a:rPr lang="en-US" sz="1200" baseline="0" dirty="0">
+                <a:solidFill>
+                  <a:schemeClr val="tx1"/>
+                </a:solidFill>
+                <a:latin typeface="IBM Plex Sans" panose="020B0503050203000203" pitchFamily="34" charset="77"/>
+                <a:cs typeface="Arial"/>
+              </a:rPr>
+              <a:t>Kafka Consumer</a:t>
+            </a:r>
+          </a:p>
+        </p:txBody>
+      </p:sp>
+      <p:cxnSp>
+        <p:nvCxnSpPr>
+          <p:cNvPr id="46" name="Elbow Connector 45">
+            <a:extLst>
+              <a:ext uri="{FF2B5EF4-FFF2-40B4-BE49-F238E27FC236}">
+                <a16:creationId xmlns:a16="http://schemas.microsoft.com/office/drawing/2014/main" id="{B815F1F6-8EC9-A547-951A-6A6BA26A1B3E}"/>
+              </a:ext>
+            </a:extLst>
+          </p:cNvPr>
+          <p:cNvCxnSpPr>
+            <a:stCxn id="9" idx="3"/>
+            <a:endCxn id="15" idx="0"/>
+          </p:cNvCxnSpPr>
+          <p:nvPr/>
+        </p:nvCxnSpPr>
+        <p:spPr>
+          <a:xfrm>
+            <a:off x="2465614" y="2073727"/>
+            <a:ext cx="1633754" cy="2144132"/>
+          </a:xfrm>
+          <a:prstGeom prst="bentConnector2">
+            <a:avLst/>
+          </a:prstGeom>
+          <a:ln>
+            <a:solidFill>
+              <a:schemeClr val="accent6"/>
+            </a:solidFill>
+            <a:tailEnd type="triangle"/>
+          </a:ln>
+          <a:effectLst/>
+        </p:spPr>
+        <p:style>
+          <a:lnRef idx="2">
+            <a:schemeClr val="accent1"/>
+          </a:lnRef>
+          <a:fillRef idx="0">
+            <a:schemeClr val="accent1"/>
+          </a:fillRef>
+          <a:effectRef idx="1">
+            <a:schemeClr val="accent1"/>
+          </a:effectRef>
+          <a:fontRef idx="minor">
+            <a:schemeClr val="tx1"/>
+          </a:fontRef>
+        </p:style>
+      </p:cxnSp>
+      <p:sp>
+        <p:nvSpPr>
+          <p:cNvPr id="59" name="Can 58">
+            <a:extLst>
+              <a:ext uri="{FF2B5EF4-FFF2-40B4-BE49-F238E27FC236}">
+                <a16:creationId xmlns:a16="http://schemas.microsoft.com/office/drawing/2014/main" id="{BF8D5F17-7886-6A49-A326-AB3283F367DA}"/>
+              </a:ext>
+            </a:extLst>
+          </p:cNvPr>
+          <p:cNvSpPr/>
+          <p:nvPr/>
+        </p:nvSpPr>
+        <p:spPr>
+          <a:xfrm>
+            <a:off x="6215189" y="3898535"/>
+            <a:ext cx="895875" cy="695584"/>
+          </a:xfrm>
+          <a:prstGeom prst="can">
+            <a:avLst/>
+          </a:prstGeom>
+          <a:solidFill>
+            <a:schemeClr val="accent5">
+              <a:lumMod val="75000"/>
+            </a:schemeClr>
+          </a:solidFill>
+          <a:ln>
+            <a:noFill/>
+          </a:ln>
+        </p:spPr>
+        <p:style>
+          <a:lnRef idx="2">
+            <a:schemeClr val="accent1">
+              <a:shade val="50000"/>
+            </a:schemeClr>
+          </a:lnRef>
+          <a:fillRef idx="1">
+            <a:schemeClr val="accent1"/>
+          </a:fillRef>
+          <a:effectRef idx="0">
+            <a:schemeClr val="accent1"/>
+          </a:effectRef>
+          <a:fontRef idx="minor">
+            <a:schemeClr val="lt1"/>
+          </a:fontRef>
+        </p:style>
+        <p:txBody>
+          <a:bodyPr rtlCol="0" anchor="ctr"/>
+          <a:lstStyle/>
+          <a:p>
+            <a:pPr algn="ctr"/>
+            <a:r>
+              <a:rPr lang="en-US" sz="1000" dirty="0"/>
+              <a:t>Reefers Inventory</a:t>
+            </a:r>
+          </a:p>
+        </p:txBody>
+      </p:sp>
+      <p:cxnSp>
+        <p:nvCxnSpPr>
+          <p:cNvPr id="71" name="Elbow Connector 70">
+            <a:extLst>
+              <a:ext uri="{FF2B5EF4-FFF2-40B4-BE49-F238E27FC236}">
+                <a16:creationId xmlns:a16="http://schemas.microsoft.com/office/drawing/2014/main" id="{9B3950A4-1025-DB48-B886-5945ADD35206}"/>
+              </a:ext>
+            </a:extLst>
+          </p:cNvPr>
+          <p:cNvCxnSpPr>
+            <a:cxnSpLocks/>
+            <a:stCxn id="27" idx="1"/>
+            <a:endCxn id="10" idx="0"/>
+          </p:cNvCxnSpPr>
+          <p:nvPr/>
+        </p:nvCxnSpPr>
+        <p:spPr>
+          <a:xfrm rot="10800000" flipV="1">
+            <a:off x="2889775" y="1544639"/>
+            <a:ext cx="3565422" cy="2673220"/>
+          </a:xfrm>
+          <a:prstGeom prst="bentConnector2">
+            <a:avLst/>
+          </a:prstGeom>
+          <a:ln>
+            <a:solidFill>
+              <a:srgbClr val="7030A0"/>
+            </a:solidFill>
+            <a:tailEnd type="triangle"/>
+          </a:ln>
+          <a:effectLst/>
+        </p:spPr>
+        <p:style>
+          <a:lnRef idx="2">
+            <a:schemeClr val="accent1"/>
+          </a:lnRef>
+          <a:fillRef idx="0">
+            <a:schemeClr val="accent1"/>
+          </a:fillRef>
+          <a:effectRef idx="1">
+            <a:schemeClr val="accent1"/>
+          </a:effectRef>
+          <a:fontRef idx="minor">
+            <a:schemeClr val="tx1"/>
+          </a:fontRef>
+        </p:style>
+      </p:cxnSp>
+      <p:sp>
+        <p:nvSpPr>
+          <p:cNvPr id="45" name="Rounded Rectangle 44">
+            <a:extLst>
+              <a:ext uri="{FF2B5EF4-FFF2-40B4-BE49-F238E27FC236}">
+                <a16:creationId xmlns:a16="http://schemas.microsoft.com/office/drawing/2014/main" id="{F495E1A9-5EC6-5446-ACF5-3911A287BB83}"/>
+              </a:ext>
+            </a:extLst>
+          </p:cNvPr>
+          <p:cNvSpPr/>
+          <p:nvPr/>
+        </p:nvSpPr>
+        <p:spPr>
+          <a:xfrm>
+            <a:off x="6478199" y="1913633"/>
+            <a:ext cx="1749097" cy="373542"/>
+          </a:xfrm>
+          <a:prstGeom prst="roundRect">
+            <a:avLst>
+              <a:gd name="adj" fmla="val 9717"/>
+            </a:avLst>
+          </a:prstGeom>
+          <a:noFill/>
+          <a:ln w="12700">
+            <a:solidFill>
+              <a:schemeClr val="tx2">
+                <a:lumMod val="50000"/>
+              </a:schemeClr>
+            </a:solidFill>
+          </a:ln>
+          <a:effectLst/>
+        </p:spPr>
+        <p:style>
+          <a:lnRef idx="1">
+            <a:schemeClr val="dk1"/>
+          </a:lnRef>
+          <a:fillRef idx="2">
+            <a:schemeClr val="dk1"/>
+          </a:fillRef>
+          <a:effectRef idx="1">
+            <a:schemeClr val="dk1"/>
+          </a:effectRef>
+          <a:fontRef idx="minor">
+            <a:schemeClr val="dk1"/>
+          </a:fontRef>
+        </p:style>
+        <p:txBody>
+          <a:bodyPr rot="0" spcFirstLastPara="0" vertOverflow="overflow" horzOverflow="overflow" vert="horz" wrap="square" lIns="0" tIns="0" rIns="0" bIns="0" numCol="1" spcCol="0" rtlCol="0" fromWordArt="0" anchor="t" anchorCtr="0" forceAA="0" compatLnSpc="1">
+            <a:prstTxWarp prst="textNoShape">
+              <a:avLst/>
+            </a:prstTxWarp>
+            <a:noAutofit/>
+          </a:bodyPr>
+          <a:lstStyle/>
+          <a:p>
+            <a:r>
+              <a:rPr lang="en-US" sz="1200" baseline="0" dirty="0">
+                <a:solidFill>
+                  <a:schemeClr val="tx1"/>
+                </a:solidFill>
+                <a:latin typeface="IBM Plex Sans" panose="020B0503050203000203" pitchFamily="34" charset="77"/>
+                <a:cs typeface="Arial"/>
+              </a:rPr>
+              <a:t>Pandas DF</a:t>
+            </a:r>
+          </a:p>
+        </p:txBody>
+      </p:sp>
+      <p:sp>
+        <p:nvSpPr>
+          <p:cNvPr id="23" name="Can 22">
+            <a:extLst>
+              <a:ext uri="{FF2B5EF4-FFF2-40B4-BE49-F238E27FC236}">
+                <a16:creationId xmlns:a16="http://schemas.microsoft.com/office/drawing/2014/main" id="{E1EF536B-5978-0D45-B1D4-059E49B20183}"/>
+              </a:ext>
+            </a:extLst>
+          </p:cNvPr>
+          <p:cNvSpPr/>
+          <p:nvPr/>
+        </p:nvSpPr>
+        <p:spPr>
+          <a:xfrm>
+            <a:off x="7223460" y="3898535"/>
+            <a:ext cx="895875" cy="695584"/>
+          </a:xfrm>
+          <a:prstGeom prst="can">
+            <a:avLst/>
+          </a:prstGeom>
+          <a:solidFill>
+            <a:schemeClr val="accent5">
+              <a:lumMod val="75000"/>
+            </a:schemeClr>
+          </a:solidFill>
+          <a:ln>
+            <a:noFill/>
+          </a:ln>
+        </p:spPr>
+        <p:style>
+          <a:lnRef idx="2">
+            <a:schemeClr val="accent1">
+              <a:shade val="50000"/>
+            </a:schemeClr>
+          </a:lnRef>
+          <a:fillRef idx="1">
+            <a:schemeClr val="accent1"/>
+          </a:fillRef>
+          <a:effectRef idx="0">
+            <a:schemeClr val="accent1"/>
+          </a:effectRef>
+          <a:fontRef idx="minor">
+            <a:schemeClr val="lt1"/>
+          </a:fontRef>
+        </p:style>
+        <p:txBody>
+          <a:bodyPr rtlCol="0" anchor="ctr"/>
+          <a:lstStyle/>
+          <a:p>
+            <a:pPr algn="ctr"/>
+            <a:r>
+              <a:rPr lang="en-US" sz="1000" dirty="0"/>
+              <a:t>Products</a:t>
+            </a:r>
+          </a:p>
+        </p:txBody>
+      </p:sp>
+      <p:pic>
+        <p:nvPicPr>
+          <p:cNvPr id="26" name="Picture 25">
+            <a:extLst>
+              <a:ext uri="{FF2B5EF4-FFF2-40B4-BE49-F238E27FC236}">
+                <a16:creationId xmlns:a16="http://schemas.microsoft.com/office/drawing/2014/main" id="{509913A5-E445-C54D-8C8A-64EA88153B4B}"/>
+              </a:ext>
+            </a:extLst>
+          </p:cNvPr>
+          <p:cNvPicPr>
+            <a:picLocks noChangeAspect="1"/>
+          </p:cNvPicPr>
+          <p:nvPr/>
+        </p:nvPicPr>
+        <p:blipFill>
+          <a:blip r:embed="rId4"/>
+          <a:stretch>
+            <a:fillRect/>
+          </a:stretch>
+        </p:blipFill>
+        <p:spPr>
+          <a:xfrm>
+            <a:off x="8048469" y="4322790"/>
+            <a:ext cx="638156" cy="680700"/>
+          </a:xfrm>
+          <a:prstGeom prst="rect">
+            <a:avLst/>
+          </a:prstGeom>
+        </p:spPr>
+      </p:pic>
+    </p:spTree>
+    <p:extLst>
+      <p:ext uri="{BB962C8B-B14F-4D97-AF65-F5344CB8AC3E}">
+        <p14:creationId xmlns:p14="http://schemas.microsoft.com/office/powerpoint/2010/main" val="187512266"/>
+      </p:ext>
+    </p:extLst>
+  </p:cSld>
+  <p:clrMapOvr>
+    <a:masterClrMapping/>
+  </p:clrMapOvr>
+</p:sld>
+</file>
+
 <file path=ppt/slides/slide2.xml><?xml version="1.0" encoding="utf-8"?>
 <p:sld xmlns:a="http://schemas.openxmlformats.org/drawingml/2006/main" xmlns:r="http://schemas.openxmlformats.org/officeDocument/2006/relationships" xmlns:p="http://schemas.openxmlformats.org/presentationml/2006/main">
   <p:cSld>
@@ -9450,6 +10925,36 @@
           <a:xfrm>
             <a:off x="1123940" y="4575227"/>
             <a:ext cx="1195924" cy="361792"/>
+          </a:xfrm>
+          <a:prstGeom prst="rect">
+            <a:avLst/>
+          </a:prstGeom>
+        </p:spPr>
+      </p:pic>
+      <p:pic>
+        <p:nvPicPr>
+          <p:cNvPr id="24" name="Picture 23">
+            <a:extLst>
+              <a:ext uri="{FF2B5EF4-FFF2-40B4-BE49-F238E27FC236}">
+                <a16:creationId xmlns:a16="http://schemas.microsoft.com/office/drawing/2014/main" id="{D23490B7-7739-3A4D-8CCE-331B3ECBCFB8}"/>
+              </a:ext>
+            </a:extLst>
+          </p:cNvPr>
+          <p:cNvPicPr>
+            <a:picLocks noChangeAspect="1"/>
+          </p:cNvPicPr>
+          <p:nvPr/>
+        </p:nvPicPr>
+        <p:blipFill>
+          <a:blip r:embed="rId10"/>
+          <a:stretch>
+            <a:fillRect/>
+          </a:stretch>
+        </p:blipFill>
+        <p:spPr>
+          <a:xfrm flipV="1">
+            <a:off x="147562" y="1954047"/>
+            <a:ext cx="1344689" cy="880532"/>
           </a:xfrm>
           <a:prstGeom prst="rect">
             <a:avLst/>
@@ -11856,36 +13361,6 @@
           </a:prstGeom>
         </p:spPr>
       </p:pic>
-      <p:pic>
-        <p:nvPicPr>
-          <p:cNvPr id="10" name="Picture 9">
-            <a:extLst>
-              <a:ext uri="{FF2B5EF4-FFF2-40B4-BE49-F238E27FC236}">
-                <a16:creationId xmlns:a16="http://schemas.microsoft.com/office/drawing/2014/main" id="{4FF7CDD6-DEE4-4A47-A599-1E0576D6D906}"/>
-              </a:ext>
-            </a:extLst>
-          </p:cNvPr>
-          <p:cNvPicPr>
-            <a:picLocks noChangeAspect="1"/>
-          </p:cNvPicPr>
-          <p:nvPr/>
-        </p:nvPicPr>
-        <p:blipFill>
-          <a:blip r:embed="rId10"/>
-          <a:stretch>
-            <a:fillRect/>
-          </a:stretch>
-        </p:blipFill>
-        <p:spPr>
-          <a:xfrm>
-            <a:off x="1061125" y="2190079"/>
-            <a:ext cx="1176988" cy="238442"/>
-          </a:xfrm>
-          <a:prstGeom prst="rect">
-            <a:avLst/>
-          </a:prstGeom>
-        </p:spPr>
-      </p:pic>
       <p:sp>
         <p:nvSpPr>
           <p:cNvPr id="16" name="Can 15">
@@ -12096,7 +13571,7 @@
             <p:nvPr/>
           </p:nvPicPr>
           <p:blipFill>
-            <a:blip r:embed="rId11">
+            <a:blip r:embed="rId10">
               <a:extLst>
                 <a:ext uri="{28A0092B-C50C-407E-A947-70E740481C1C}">
                   <a14:useLocalDpi xmlns:a14="http://schemas.microsoft.com/office/drawing/2010/main" val="0"/>
@@ -12518,7 +13993,7 @@
           <p:nvPr/>
         </p:nvPicPr>
         <p:blipFill>
-          <a:blip r:embed="rId12"/>
+          <a:blip r:embed="rId11"/>
           <a:stretch>
             <a:fillRect/>
           </a:stretch>
@@ -12609,7 +14084,7 @@
           <p:nvPr/>
         </p:nvPicPr>
         <p:blipFill>
-          <a:blip r:embed="rId12"/>
+          <a:blip r:embed="rId11"/>
           <a:stretch>
             <a:fillRect/>
           </a:stretch>
@@ -13321,6 +14796,1550 @@
 </file>
 
 <file path=ppt/slides/slide5.xml><?xml version="1.0" encoding="utf-8"?>
+<p:sld xmlns:a="http://schemas.openxmlformats.org/drawingml/2006/main" xmlns:r="http://schemas.openxmlformats.org/officeDocument/2006/relationships" xmlns:p="http://schemas.openxmlformats.org/presentationml/2006/main">
+  <p:cSld>
+    <p:spTree>
+      <p:nvGrpSpPr>
+        <p:cNvPr id="1" name=""/>
+        <p:cNvGrpSpPr/>
+        <p:nvPr/>
+      </p:nvGrpSpPr>
+      <p:grpSpPr>
+        <a:xfrm>
+          <a:off x="0" y="0"/>
+          <a:ext cx="0" cy="0"/>
+          <a:chOff x="0" y="0"/>
+          <a:chExt cx="0" cy="0"/>
+        </a:xfrm>
+      </p:grpSpPr>
+      <p:sp>
+        <p:nvSpPr>
+          <p:cNvPr id="2" name="Title 1">
+            <a:extLst>
+              <a:ext uri="{FF2B5EF4-FFF2-40B4-BE49-F238E27FC236}">
+                <a16:creationId xmlns:a16="http://schemas.microsoft.com/office/drawing/2014/main" id="{2B3C093B-DB50-494E-8EB9-A5D4DC4AEF37}"/>
+              </a:ext>
+            </a:extLst>
+          </p:cNvPr>
+          <p:cNvSpPr>
+            <a:spLocks noGrp="1"/>
+          </p:cNvSpPr>
+          <p:nvPr>
+            <p:ph type="title"/>
+          </p:nvPr>
+        </p:nvSpPr>
+        <p:spPr/>
+        <p:txBody>
+          <a:bodyPr/>
+          <a:lstStyle/>
+          <a:p>
+            <a:r>
+              <a:rPr lang="en-US" dirty="0" err="1"/>
+              <a:t>Appsody</a:t>
+            </a:r>
+            <a:endParaRPr lang="en-US" dirty="0"/>
+          </a:p>
+        </p:txBody>
+      </p:sp>
+      <p:sp>
+        <p:nvSpPr>
+          <p:cNvPr id="4" name="Slide Number Placeholder 3">
+            <a:extLst>
+              <a:ext uri="{FF2B5EF4-FFF2-40B4-BE49-F238E27FC236}">
+                <a16:creationId xmlns:a16="http://schemas.microsoft.com/office/drawing/2014/main" id="{FB64EE56-7B66-9840-8080-61D448CD3BDC}"/>
+              </a:ext>
+            </a:extLst>
+          </p:cNvPr>
+          <p:cNvSpPr>
+            <a:spLocks noGrp="1"/>
+          </p:cNvSpPr>
+          <p:nvPr>
+            <p:ph type="sldNum" sz="quarter" idx="2"/>
+          </p:nvPr>
+        </p:nvSpPr>
+        <p:spPr/>
+        <p:txBody>
+          <a:bodyPr/>
+          <a:lstStyle/>
+          <a:p>
+            <a:fld id="{86CB4B4D-7CA3-9044-876B-883B54F8677D}" type="slidenum">
+              <a:rPr lang="en-US" smtClean="0"/>
+              <a:pPr/>
+              <a:t>5</a:t>
+            </a:fld>
+            <a:endParaRPr lang="en-US"/>
+          </a:p>
+        </p:txBody>
+      </p:sp>
+      <p:pic>
+        <p:nvPicPr>
+          <p:cNvPr id="5" name="Picture 4">
+            <a:extLst>
+              <a:ext uri="{FF2B5EF4-FFF2-40B4-BE49-F238E27FC236}">
+                <a16:creationId xmlns:a16="http://schemas.microsoft.com/office/drawing/2014/main" id="{AE5E0B24-EBCE-D544-9FF1-0EA91C995EFC}"/>
+              </a:ext>
+            </a:extLst>
+          </p:cNvPr>
+          <p:cNvPicPr>
+            <a:picLocks noChangeAspect="1"/>
+          </p:cNvPicPr>
+          <p:nvPr/>
+        </p:nvPicPr>
+        <p:blipFill>
+          <a:blip r:embed="rId3"/>
+          <a:stretch>
+            <a:fillRect/>
+          </a:stretch>
+        </p:blipFill>
+        <p:spPr>
+          <a:xfrm>
+            <a:off x="7234384" y="1866340"/>
+            <a:ext cx="1193999" cy="294089"/>
+          </a:xfrm>
+          <a:prstGeom prst="rect">
+            <a:avLst/>
+          </a:prstGeom>
+          <a:ln>
+            <a:solidFill>
+              <a:srgbClr val="FFC000"/>
+            </a:solidFill>
+          </a:ln>
+        </p:spPr>
+      </p:pic>
+      <p:sp>
+        <p:nvSpPr>
+          <p:cNvPr id="6" name="AutoShape 4">
+            <a:extLst>
+              <a:ext uri="{FF2B5EF4-FFF2-40B4-BE49-F238E27FC236}">
+                <a16:creationId xmlns:a16="http://schemas.microsoft.com/office/drawing/2014/main" id="{5F743630-E4B3-CA43-B61A-13D91058B8E4}"/>
+              </a:ext>
+            </a:extLst>
+          </p:cNvPr>
+          <p:cNvSpPr>
+            <a:spLocks noChangeArrowheads="1"/>
+          </p:cNvSpPr>
+          <p:nvPr/>
+        </p:nvSpPr>
+        <p:spPr bwMode="auto">
+          <a:xfrm>
+            <a:off x="6878845" y="1376647"/>
+            <a:ext cx="5029512" cy="2267701"/>
+          </a:xfrm>
+          <a:prstGeom prst="roundRect">
+            <a:avLst>
+              <a:gd name="adj" fmla="val 7117"/>
+            </a:avLst>
+          </a:prstGeom>
+          <a:noFill/>
+          <a:ln w="12700">
+            <a:solidFill>
+              <a:srgbClr val="5596E6">
+                <a:lumMod val="50000"/>
+              </a:srgbClr>
+            </a:solidFill>
+            <a:prstDash val="dash"/>
+            <a:round/>
+            <a:headEnd/>
+            <a:tailEnd/>
+          </a:ln>
+        </p:spPr>
+        <p:txBody>
+          <a:bodyPr lIns="0" tIns="0" rIns="0" bIns="0" anchor="b" anchorCtr="1"/>
+          <a:lstStyle/>
+          <a:p>
+            <a:pPr algn="ctr" defTabSz="1219170" eaLnBrk="1" fontAlgn="auto" hangingPunct="1">
+              <a:spcBef>
+                <a:spcPts val="0"/>
+              </a:spcBef>
+              <a:spcAft>
+                <a:spcPts val="0"/>
+              </a:spcAft>
+              <a:defRPr/>
+            </a:pPr>
+            <a:r>
+              <a:rPr lang="en-US" sz="1333" kern="0" dirty="0">
+                <a:solidFill>
+                  <a:srgbClr val="6D7777"/>
+                </a:solidFill>
+              </a:rPr>
+              <a:t>Cluster</a:t>
+            </a:r>
+          </a:p>
+        </p:txBody>
+      </p:sp>
+      <p:pic>
+        <p:nvPicPr>
+          <p:cNvPr id="7" name="Picture 6">
+            <a:extLst>
+              <a:ext uri="{FF2B5EF4-FFF2-40B4-BE49-F238E27FC236}">
+                <a16:creationId xmlns:a16="http://schemas.microsoft.com/office/drawing/2014/main" id="{B3E11AE6-2EF7-E44A-AE78-FEC901A39FF8}"/>
+              </a:ext>
+            </a:extLst>
+          </p:cNvPr>
+          <p:cNvPicPr>
+            <a:picLocks noChangeAspect="1"/>
+          </p:cNvPicPr>
+          <p:nvPr/>
+        </p:nvPicPr>
+        <p:blipFill>
+          <a:blip r:embed="rId4"/>
+          <a:stretch>
+            <a:fillRect/>
+          </a:stretch>
+        </p:blipFill>
+        <p:spPr>
+          <a:xfrm>
+            <a:off x="6716026" y="3429000"/>
+            <a:ext cx="325638" cy="354992"/>
+          </a:xfrm>
+          <a:prstGeom prst="rect">
+            <a:avLst/>
+          </a:prstGeom>
+        </p:spPr>
+      </p:pic>
+      <p:sp>
+        <p:nvSpPr>
+          <p:cNvPr id="8" name="AutoShape 4">
+            <a:extLst>
+              <a:ext uri="{FF2B5EF4-FFF2-40B4-BE49-F238E27FC236}">
+                <a16:creationId xmlns:a16="http://schemas.microsoft.com/office/drawing/2014/main" id="{70221B32-2764-974B-84E4-9E024DB35467}"/>
+              </a:ext>
+            </a:extLst>
+          </p:cNvPr>
+          <p:cNvSpPr>
+            <a:spLocks noChangeArrowheads="1"/>
+          </p:cNvSpPr>
+          <p:nvPr/>
+        </p:nvSpPr>
+        <p:spPr bwMode="auto">
+          <a:xfrm>
+            <a:off x="7041664" y="1696278"/>
+            <a:ext cx="4766024" cy="791979"/>
+          </a:xfrm>
+          <a:prstGeom prst="roundRect">
+            <a:avLst>
+              <a:gd name="adj" fmla="val 7117"/>
+            </a:avLst>
+          </a:prstGeom>
+          <a:noFill/>
+          <a:ln w="12700">
+            <a:solidFill>
+              <a:srgbClr val="5596E6">
+                <a:lumMod val="50000"/>
+              </a:srgbClr>
+            </a:solidFill>
+            <a:prstDash val="dash"/>
+            <a:round/>
+            <a:headEnd/>
+            <a:tailEnd/>
+          </a:ln>
+        </p:spPr>
+        <p:txBody>
+          <a:bodyPr lIns="0" tIns="0" rIns="0" bIns="0" anchor="b" anchorCtr="1"/>
+          <a:lstStyle/>
+          <a:p>
+            <a:pPr algn="ctr" defTabSz="1219170" eaLnBrk="1" fontAlgn="auto" hangingPunct="1">
+              <a:spcBef>
+                <a:spcPts val="0"/>
+              </a:spcBef>
+              <a:spcAft>
+                <a:spcPts val="0"/>
+              </a:spcAft>
+              <a:defRPr/>
+            </a:pPr>
+            <a:r>
+              <a:rPr lang="en-US" sz="1333" kern="0" dirty="0">
+                <a:solidFill>
+                  <a:srgbClr val="6D7777"/>
+                </a:solidFill>
+              </a:rPr>
+              <a:t>Namespace</a:t>
+            </a:r>
+          </a:p>
+        </p:txBody>
+      </p:sp>
+      <p:sp>
+        <p:nvSpPr>
+          <p:cNvPr id="9" name="AutoShape 4">
+            <a:extLst>
+              <a:ext uri="{FF2B5EF4-FFF2-40B4-BE49-F238E27FC236}">
+                <a16:creationId xmlns:a16="http://schemas.microsoft.com/office/drawing/2014/main" id="{5F139B5D-E68C-CC41-84B4-5F82BFC2EF57}"/>
+              </a:ext>
+            </a:extLst>
+          </p:cNvPr>
+          <p:cNvSpPr>
+            <a:spLocks noChangeArrowheads="1"/>
+          </p:cNvSpPr>
+          <p:nvPr/>
+        </p:nvSpPr>
+        <p:spPr bwMode="auto">
+          <a:xfrm>
+            <a:off x="283643" y="1376647"/>
+            <a:ext cx="5029512" cy="2267701"/>
+          </a:xfrm>
+          <a:prstGeom prst="roundRect">
+            <a:avLst>
+              <a:gd name="adj" fmla="val 7117"/>
+            </a:avLst>
+          </a:prstGeom>
+          <a:noFill/>
+          <a:ln w="12700">
+            <a:solidFill>
+              <a:srgbClr val="5596E6">
+                <a:lumMod val="50000"/>
+              </a:srgbClr>
+            </a:solidFill>
+            <a:prstDash val="dash"/>
+            <a:round/>
+            <a:headEnd/>
+            <a:tailEnd/>
+          </a:ln>
+        </p:spPr>
+        <p:txBody>
+          <a:bodyPr lIns="0" tIns="0" rIns="0" bIns="0" anchor="b" anchorCtr="1"/>
+          <a:lstStyle/>
+          <a:p>
+            <a:pPr algn="ctr" defTabSz="1219170" eaLnBrk="1" fontAlgn="auto" hangingPunct="1">
+              <a:spcBef>
+                <a:spcPts val="0"/>
+              </a:spcBef>
+              <a:spcAft>
+                <a:spcPts val="0"/>
+              </a:spcAft>
+              <a:defRPr/>
+            </a:pPr>
+            <a:r>
+              <a:rPr lang="en-US" sz="1333" kern="0" dirty="0">
+                <a:solidFill>
+                  <a:srgbClr val="6D7777"/>
+                </a:solidFill>
+              </a:rPr>
+              <a:t>Developer’s Workstation</a:t>
+            </a:r>
+          </a:p>
+        </p:txBody>
+      </p:sp>
+      <p:sp>
+        <p:nvSpPr>
+          <p:cNvPr id="10" name="Rectangle 9">
+            <a:extLst>
+              <a:ext uri="{FF2B5EF4-FFF2-40B4-BE49-F238E27FC236}">
+                <a16:creationId xmlns:a16="http://schemas.microsoft.com/office/drawing/2014/main" id="{55B72850-C717-0446-AD96-F0D117F493F0}"/>
+              </a:ext>
+            </a:extLst>
+          </p:cNvPr>
+          <p:cNvSpPr/>
+          <p:nvPr/>
+        </p:nvSpPr>
+        <p:spPr>
+          <a:xfrm>
+            <a:off x="552450" y="1866340"/>
+            <a:ext cx="914400" cy="914400"/>
+          </a:xfrm>
+          <a:prstGeom prst="rect">
+            <a:avLst/>
+          </a:prstGeom>
+          <a:solidFill>
+            <a:srgbClr val="5E9CE0"/>
+          </a:solidFill>
+          <a:ln>
+            <a:noFill/>
+          </a:ln>
+          <a:effectLst>
+            <a:outerShdw blurRad="50800" dist="38100" dir="5400000" algn="t" rotWithShape="0">
+              <a:schemeClr val="accent3">
+                <a:lumMod val="75000"/>
+                <a:alpha val="40000"/>
+              </a:schemeClr>
+            </a:outerShdw>
+          </a:effectLst>
+        </p:spPr>
+        <p:style>
+          <a:lnRef idx="2">
+            <a:schemeClr val="accent1">
+              <a:shade val="50000"/>
+            </a:schemeClr>
+          </a:lnRef>
+          <a:fillRef idx="1">
+            <a:schemeClr val="accent1"/>
+          </a:fillRef>
+          <a:effectRef idx="0">
+            <a:schemeClr val="accent1"/>
+          </a:effectRef>
+          <a:fontRef idx="minor">
+            <a:schemeClr val="lt1"/>
+          </a:fontRef>
+        </p:style>
+        <p:txBody>
+          <a:bodyPr rtlCol="0" anchor="ctr"/>
+          <a:lstStyle/>
+          <a:p>
+            <a:pPr algn="ctr"/>
+            <a:r>
+              <a:rPr lang="en-US" dirty="0"/>
+              <a:t>IDE</a:t>
+            </a:r>
+          </a:p>
+        </p:txBody>
+      </p:sp>
+      <p:pic>
+        <p:nvPicPr>
+          <p:cNvPr id="11" name="Picture 10">
+            <a:extLst>
+              <a:ext uri="{FF2B5EF4-FFF2-40B4-BE49-F238E27FC236}">
+                <a16:creationId xmlns:a16="http://schemas.microsoft.com/office/drawing/2014/main" id="{711DEC58-09C8-F247-AAD9-7DCD078E3425}"/>
+              </a:ext>
+            </a:extLst>
+          </p:cNvPr>
+          <p:cNvPicPr>
+            <a:picLocks noChangeAspect="1"/>
+          </p:cNvPicPr>
+          <p:nvPr/>
+        </p:nvPicPr>
+        <p:blipFill>
+          <a:blip r:embed="rId3"/>
+          <a:stretch>
+            <a:fillRect/>
+          </a:stretch>
+        </p:blipFill>
+        <p:spPr>
+          <a:xfrm>
+            <a:off x="890833" y="4524276"/>
+            <a:ext cx="1193999" cy="294089"/>
+          </a:xfrm>
+          <a:prstGeom prst="rect">
+            <a:avLst/>
+          </a:prstGeom>
+        </p:spPr>
+      </p:pic>
+      <p:sp>
+        <p:nvSpPr>
+          <p:cNvPr id="12" name="AutoShape 4">
+            <a:extLst>
+              <a:ext uri="{FF2B5EF4-FFF2-40B4-BE49-F238E27FC236}">
+                <a16:creationId xmlns:a16="http://schemas.microsoft.com/office/drawing/2014/main" id="{6F3DA76A-2B21-8049-8C7C-BC7B497D7B0D}"/>
+              </a:ext>
+            </a:extLst>
+          </p:cNvPr>
+          <p:cNvSpPr>
+            <a:spLocks noChangeArrowheads="1"/>
+          </p:cNvSpPr>
+          <p:nvPr/>
+        </p:nvSpPr>
+        <p:spPr bwMode="auto">
+          <a:xfrm>
+            <a:off x="757999" y="4357488"/>
+            <a:ext cx="4080800" cy="1349199"/>
+          </a:xfrm>
+          <a:prstGeom prst="roundRect">
+            <a:avLst>
+              <a:gd name="adj" fmla="val 7117"/>
+            </a:avLst>
+          </a:prstGeom>
+          <a:noFill/>
+          <a:ln w="12700">
+            <a:solidFill>
+              <a:srgbClr val="5596E6">
+                <a:lumMod val="50000"/>
+              </a:srgbClr>
+            </a:solidFill>
+            <a:prstDash val="dash"/>
+            <a:round/>
+            <a:headEnd/>
+            <a:tailEnd/>
+          </a:ln>
+        </p:spPr>
+        <p:txBody>
+          <a:bodyPr lIns="0" tIns="0" rIns="0" bIns="0" anchor="b" anchorCtr="1"/>
+          <a:lstStyle/>
+          <a:p>
+            <a:pPr algn="ctr" defTabSz="1219170" eaLnBrk="1" fontAlgn="auto" hangingPunct="1">
+              <a:spcBef>
+                <a:spcPts val="0"/>
+              </a:spcBef>
+              <a:spcAft>
+                <a:spcPts val="0"/>
+              </a:spcAft>
+              <a:defRPr/>
+            </a:pPr>
+            <a:r>
+              <a:rPr lang="en-US" sz="1333" kern="0" dirty="0" err="1">
+                <a:solidFill>
+                  <a:srgbClr val="6D7777"/>
+                </a:solidFill>
+              </a:rPr>
+              <a:t>Appsody</a:t>
+            </a:r>
+            <a:r>
+              <a:rPr lang="en-US" sz="1333" kern="0" dirty="0">
+                <a:solidFill>
+                  <a:srgbClr val="6D7777"/>
+                </a:solidFill>
+              </a:rPr>
+              <a:t> Repository</a:t>
+            </a:r>
+          </a:p>
+        </p:txBody>
+      </p:sp>
+      <p:sp>
+        <p:nvSpPr>
+          <p:cNvPr id="13" name="Rectangle 12">
+            <a:extLst>
+              <a:ext uri="{FF2B5EF4-FFF2-40B4-BE49-F238E27FC236}">
+                <a16:creationId xmlns:a16="http://schemas.microsoft.com/office/drawing/2014/main" id="{E8B6BB8C-110F-9442-999B-7A4AB9A9C79F}"/>
+              </a:ext>
+            </a:extLst>
+          </p:cNvPr>
+          <p:cNvSpPr/>
+          <p:nvPr/>
+        </p:nvSpPr>
+        <p:spPr>
+          <a:xfrm>
+            <a:off x="1130537" y="4944285"/>
+            <a:ext cx="954295" cy="437590"/>
+          </a:xfrm>
+          <a:prstGeom prst="rect">
+            <a:avLst/>
+          </a:prstGeom>
+          <a:solidFill>
+            <a:srgbClr val="7DB049"/>
+          </a:solidFill>
+          <a:ln>
+            <a:noFill/>
+          </a:ln>
+          <a:effectLst>
+            <a:outerShdw blurRad="50800" dist="38100" dir="5400000" algn="t" rotWithShape="0">
+              <a:schemeClr val="accent3">
+                <a:lumMod val="75000"/>
+                <a:alpha val="40000"/>
+              </a:schemeClr>
+            </a:outerShdw>
+          </a:effectLst>
+        </p:spPr>
+        <p:style>
+          <a:lnRef idx="2">
+            <a:schemeClr val="accent1">
+              <a:shade val="50000"/>
+            </a:schemeClr>
+          </a:lnRef>
+          <a:fillRef idx="1">
+            <a:schemeClr val="accent1"/>
+          </a:fillRef>
+          <a:effectRef idx="0">
+            <a:schemeClr val="accent1"/>
+          </a:effectRef>
+          <a:fontRef idx="minor">
+            <a:schemeClr val="lt1"/>
+          </a:fontRef>
+        </p:style>
+        <p:txBody>
+          <a:bodyPr rtlCol="0" anchor="ctr"/>
+          <a:lstStyle/>
+          <a:p>
+            <a:pPr algn="ctr"/>
+            <a:r>
+              <a:rPr lang="en-US" dirty="0"/>
+              <a:t>Stack</a:t>
+            </a:r>
+          </a:p>
+        </p:txBody>
+      </p:sp>
+      <p:sp>
+        <p:nvSpPr>
+          <p:cNvPr id="14" name="Rectangle 13">
+            <a:extLst>
+              <a:ext uri="{FF2B5EF4-FFF2-40B4-BE49-F238E27FC236}">
+                <a16:creationId xmlns:a16="http://schemas.microsoft.com/office/drawing/2014/main" id="{35FF4D85-6739-9340-BFF8-D823FA0EB3DD}"/>
+              </a:ext>
+            </a:extLst>
+          </p:cNvPr>
+          <p:cNvSpPr/>
+          <p:nvPr/>
+        </p:nvSpPr>
+        <p:spPr>
+          <a:xfrm>
+            <a:off x="2270148" y="4944285"/>
+            <a:ext cx="954295" cy="437590"/>
+          </a:xfrm>
+          <a:prstGeom prst="rect">
+            <a:avLst/>
+          </a:prstGeom>
+          <a:solidFill>
+            <a:srgbClr val="7DB049"/>
+          </a:solidFill>
+          <a:ln>
+            <a:noFill/>
+          </a:ln>
+          <a:effectLst>
+            <a:outerShdw blurRad="50800" dist="38100" dir="5400000" algn="t" rotWithShape="0">
+              <a:schemeClr val="accent3">
+                <a:lumMod val="75000"/>
+                <a:alpha val="40000"/>
+              </a:schemeClr>
+            </a:outerShdw>
+          </a:effectLst>
+        </p:spPr>
+        <p:style>
+          <a:lnRef idx="2">
+            <a:schemeClr val="accent1">
+              <a:shade val="50000"/>
+            </a:schemeClr>
+          </a:lnRef>
+          <a:fillRef idx="1">
+            <a:schemeClr val="accent1"/>
+          </a:fillRef>
+          <a:effectRef idx="0">
+            <a:schemeClr val="accent1"/>
+          </a:effectRef>
+          <a:fontRef idx="minor">
+            <a:schemeClr val="lt1"/>
+          </a:fontRef>
+        </p:style>
+        <p:txBody>
+          <a:bodyPr rtlCol="0" anchor="ctr"/>
+          <a:lstStyle/>
+          <a:p>
+            <a:pPr algn="ctr"/>
+            <a:r>
+              <a:rPr lang="en-US" dirty="0"/>
+              <a:t>Stack</a:t>
+            </a:r>
+          </a:p>
+        </p:txBody>
+      </p:sp>
+      <p:sp>
+        <p:nvSpPr>
+          <p:cNvPr id="15" name="Rectangle 14">
+            <a:extLst>
+              <a:ext uri="{FF2B5EF4-FFF2-40B4-BE49-F238E27FC236}">
+                <a16:creationId xmlns:a16="http://schemas.microsoft.com/office/drawing/2014/main" id="{F606EA5E-7343-1847-B44B-57804AFD1A57}"/>
+              </a:ext>
+            </a:extLst>
+          </p:cNvPr>
+          <p:cNvSpPr/>
+          <p:nvPr/>
+        </p:nvSpPr>
+        <p:spPr>
+          <a:xfrm>
+            <a:off x="3409759" y="4944285"/>
+            <a:ext cx="954295" cy="437590"/>
+          </a:xfrm>
+          <a:prstGeom prst="rect">
+            <a:avLst/>
+          </a:prstGeom>
+          <a:solidFill>
+            <a:srgbClr val="7DB049"/>
+          </a:solidFill>
+          <a:ln>
+            <a:noFill/>
+          </a:ln>
+          <a:effectLst>
+            <a:outerShdw blurRad="50800" dist="38100" dir="5400000" algn="t" rotWithShape="0">
+              <a:schemeClr val="accent3">
+                <a:lumMod val="75000"/>
+                <a:alpha val="40000"/>
+              </a:schemeClr>
+            </a:outerShdw>
+          </a:effectLst>
+        </p:spPr>
+        <p:style>
+          <a:lnRef idx="2">
+            <a:schemeClr val="accent1">
+              <a:shade val="50000"/>
+            </a:schemeClr>
+          </a:lnRef>
+          <a:fillRef idx="1">
+            <a:schemeClr val="accent1"/>
+          </a:fillRef>
+          <a:effectRef idx="0">
+            <a:schemeClr val="accent1"/>
+          </a:effectRef>
+          <a:fontRef idx="minor">
+            <a:schemeClr val="lt1"/>
+          </a:fontRef>
+        </p:style>
+        <p:txBody>
+          <a:bodyPr rtlCol="0" anchor="ctr"/>
+          <a:lstStyle/>
+          <a:p>
+            <a:pPr algn="ctr"/>
+            <a:r>
+              <a:rPr lang="en-US" dirty="0"/>
+              <a:t>Stack</a:t>
+            </a:r>
+          </a:p>
+        </p:txBody>
+      </p:sp>
+      <p:sp>
+        <p:nvSpPr>
+          <p:cNvPr id="16" name="Rectangle 15">
+            <a:extLst>
+              <a:ext uri="{FF2B5EF4-FFF2-40B4-BE49-F238E27FC236}">
+                <a16:creationId xmlns:a16="http://schemas.microsoft.com/office/drawing/2014/main" id="{7230E611-6C3A-5846-B57B-A7D1CB69489E}"/>
+              </a:ext>
+            </a:extLst>
+          </p:cNvPr>
+          <p:cNvSpPr/>
+          <p:nvPr/>
+        </p:nvSpPr>
+        <p:spPr>
+          <a:xfrm>
+            <a:off x="1735657" y="1866340"/>
+            <a:ext cx="1296883" cy="437590"/>
+          </a:xfrm>
+          <a:prstGeom prst="rect">
+            <a:avLst/>
+          </a:prstGeom>
+          <a:solidFill>
+            <a:schemeClr val="bg1">
+              <a:lumMod val="65000"/>
+            </a:schemeClr>
+          </a:solidFill>
+          <a:ln>
+            <a:noFill/>
+          </a:ln>
+          <a:effectLst>
+            <a:outerShdw blurRad="50800" dist="38100" dir="5400000" algn="t" rotWithShape="0">
+              <a:schemeClr val="accent3">
+                <a:lumMod val="75000"/>
+                <a:alpha val="40000"/>
+              </a:schemeClr>
+            </a:outerShdw>
+          </a:effectLst>
+        </p:spPr>
+        <p:style>
+          <a:lnRef idx="2">
+            <a:schemeClr val="accent1">
+              <a:shade val="50000"/>
+            </a:schemeClr>
+          </a:lnRef>
+          <a:fillRef idx="1">
+            <a:schemeClr val="accent1"/>
+          </a:fillRef>
+          <a:effectRef idx="0">
+            <a:schemeClr val="accent1"/>
+          </a:effectRef>
+          <a:fontRef idx="minor">
+            <a:schemeClr val="lt1"/>
+          </a:fontRef>
+        </p:style>
+        <p:txBody>
+          <a:bodyPr rtlCol="0" anchor="ctr"/>
+          <a:lstStyle/>
+          <a:p>
+            <a:pPr algn="ctr"/>
+            <a:r>
+              <a:rPr lang="en-US" sz="1400" dirty="0"/>
+              <a:t>App Based on Stack</a:t>
+            </a:r>
+          </a:p>
+        </p:txBody>
+      </p:sp>
+      <p:grpSp>
+        <p:nvGrpSpPr>
+          <p:cNvPr id="19" name="Group 18">
+            <a:extLst>
+              <a:ext uri="{FF2B5EF4-FFF2-40B4-BE49-F238E27FC236}">
+                <a16:creationId xmlns:a16="http://schemas.microsoft.com/office/drawing/2014/main" id="{C3E28F54-F2B0-6942-9661-1D9FCD98206B}"/>
+              </a:ext>
+            </a:extLst>
+          </p:cNvPr>
+          <p:cNvGrpSpPr/>
+          <p:nvPr/>
+        </p:nvGrpSpPr>
+        <p:grpSpPr>
+          <a:xfrm>
+            <a:off x="1009650" y="2839558"/>
+            <a:ext cx="1625147" cy="305022"/>
+            <a:chOff x="1735657" y="2622762"/>
+            <a:chExt cx="1625147" cy="305022"/>
+          </a:xfrm>
+        </p:grpSpPr>
+        <p:pic>
+          <p:nvPicPr>
+            <p:cNvPr id="17" name="Picture 16">
+              <a:extLst>
+                <a:ext uri="{FF2B5EF4-FFF2-40B4-BE49-F238E27FC236}">
+                  <a16:creationId xmlns:a16="http://schemas.microsoft.com/office/drawing/2014/main" id="{AF040D6B-B625-E747-B888-EB4321B78CD3}"/>
+                </a:ext>
+              </a:extLst>
+            </p:cNvPr>
+            <p:cNvPicPr>
+              <a:picLocks noChangeAspect="1"/>
+            </p:cNvPicPr>
+            <p:nvPr/>
+          </p:nvPicPr>
+          <p:blipFill>
+            <a:blip r:embed="rId3"/>
+            <a:stretch>
+              <a:fillRect/>
+            </a:stretch>
+          </p:blipFill>
+          <p:spPr>
+            <a:xfrm>
+              <a:off x="1735657" y="2633695"/>
+              <a:ext cx="1193999" cy="294089"/>
+            </a:xfrm>
+            <a:prstGeom prst="rect">
+              <a:avLst/>
+            </a:prstGeom>
+          </p:spPr>
+        </p:pic>
+        <p:sp>
+          <p:nvSpPr>
+            <p:cNvPr id="18" name="TextBox 17">
+              <a:extLst>
+                <a:ext uri="{FF2B5EF4-FFF2-40B4-BE49-F238E27FC236}">
+                  <a16:creationId xmlns:a16="http://schemas.microsoft.com/office/drawing/2014/main" id="{A8AEB8F3-CCC4-6745-9636-D61AE2F83BE0}"/>
+                </a:ext>
+              </a:extLst>
+            </p:cNvPr>
+            <p:cNvSpPr txBox="1"/>
+            <p:nvPr/>
+          </p:nvSpPr>
+          <p:spPr>
+            <a:xfrm>
+              <a:off x="2937290" y="2622762"/>
+              <a:ext cx="423514" cy="276999"/>
+            </a:xfrm>
+            <a:prstGeom prst="rect">
+              <a:avLst/>
+            </a:prstGeom>
+            <a:noFill/>
+          </p:spPr>
+          <p:txBody>
+            <a:bodyPr wrap="none" rtlCol="0">
+              <a:spAutoFit/>
+            </a:bodyPr>
+            <a:lstStyle/>
+            <a:p>
+              <a:r>
+                <a:rPr lang="en-US" sz="1200" dirty="0">
+                  <a:solidFill>
+                    <a:schemeClr val="accent1">
+                      <a:lumMod val="10000"/>
+                    </a:schemeClr>
+                  </a:solidFill>
+                </a:rPr>
+                <a:t>CLI</a:t>
+              </a:r>
+            </a:p>
+          </p:txBody>
+        </p:sp>
+      </p:grpSp>
+      <p:cxnSp>
+        <p:nvCxnSpPr>
+          <p:cNvPr id="21" name="Curved Connector 20">
+            <a:extLst>
+              <a:ext uri="{FF2B5EF4-FFF2-40B4-BE49-F238E27FC236}">
+                <a16:creationId xmlns:a16="http://schemas.microsoft.com/office/drawing/2014/main" id="{C0D9B876-5934-2946-8871-DCC20AA0F5D0}"/>
+              </a:ext>
+            </a:extLst>
+          </p:cNvPr>
+          <p:cNvCxnSpPr>
+            <a:endCxn id="8" idx="1"/>
+          </p:cNvCxnSpPr>
+          <p:nvPr/>
+        </p:nvCxnSpPr>
+        <p:spPr>
+          <a:xfrm flipV="1">
+            <a:off x="2798399" y="2092268"/>
+            <a:ext cx="4243265" cy="885789"/>
+          </a:xfrm>
+          <a:prstGeom prst="curvedConnector3">
+            <a:avLst/>
+          </a:prstGeom>
+          <a:ln>
+            <a:solidFill>
+              <a:schemeClr val="accent6"/>
+            </a:solidFill>
+            <a:tailEnd type="triangle"/>
+          </a:ln>
+          <a:effectLst/>
+        </p:spPr>
+        <p:style>
+          <a:lnRef idx="2">
+            <a:schemeClr val="accent1"/>
+          </a:lnRef>
+          <a:fillRef idx="0">
+            <a:schemeClr val="accent1"/>
+          </a:fillRef>
+          <a:effectRef idx="1">
+            <a:schemeClr val="accent1"/>
+          </a:effectRef>
+          <a:fontRef idx="minor">
+            <a:schemeClr val="tx1"/>
+          </a:fontRef>
+        </p:style>
+      </p:cxnSp>
+      <p:sp>
+        <p:nvSpPr>
+          <p:cNvPr id="22" name="Rectangle 21">
+            <a:extLst>
+              <a:ext uri="{FF2B5EF4-FFF2-40B4-BE49-F238E27FC236}">
+                <a16:creationId xmlns:a16="http://schemas.microsoft.com/office/drawing/2014/main" id="{DF96FCF8-F177-544B-BCF5-BB90899283E7}"/>
+              </a:ext>
+            </a:extLst>
+          </p:cNvPr>
+          <p:cNvSpPr/>
+          <p:nvPr/>
+        </p:nvSpPr>
+        <p:spPr>
+          <a:xfrm>
+            <a:off x="8791482" y="1794589"/>
+            <a:ext cx="1296883" cy="437590"/>
+          </a:xfrm>
+          <a:prstGeom prst="rect">
+            <a:avLst/>
+          </a:prstGeom>
+          <a:solidFill>
+            <a:schemeClr val="bg1">
+              <a:lumMod val="65000"/>
+            </a:schemeClr>
+          </a:solidFill>
+          <a:ln>
+            <a:noFill/>
+          </a:ln>
+          <a:effectLst>
+            <a:outerShdw blurRad="50800" dist="38100" dir="5400000" algn="t" rotWithShape="0">
+              <a:schemeClr val="accent3">
+                <a:lumMod val="75000"/>
+                <a:alpha val="40000"/>
+              </a:schemeClr>
+            </a:outerShdw>
+          </a:effectLst>
+        </p:spPr>
+        <p:style>
+          <a:lnRef idx="2">
+            <a:schemeClr val="accent1">
+              <a:shade val="50000"/>
+            </a:schemeClr>
+          </a:lnRef>
+          <a:fillRef idx="1">
+            <a:schemeClr val="accent1"/>
+          </a:fillRef>
+          <a:effectRef idx="0">
+            <a:schemeClr val="accent1"/>
+          </a:effectRef>
+          <a:fontRef idx="minor">
+            <a:schemeClr val="lt1"/>
+          </a:fontRef>
+        </p:style>
+        <p:txBody>
+          <a:bodyPr rtlCol="0" anchor="ctr"/>
+          <a:lstStyle/>
+          <a:p>
+            <a:pPr algn="ctr"/>
+            <a:r>
+              <a:rPr lang="en-US" sz="1400" dirty="0"/>
+              <a:t>App Container</a:t>
+            </a:r>
+          </a:p>
+        </p:txBody>
+      </p:sp>
+      <p:pic>
+        <p:nvPicPr>
+          <p:cNvPr id="23" name="Picture 40">
+            <a:extLst>
+              <a:ext uri="{FF2B5EF4-FFF2-40B4-BE49-F238E27FC236}">
+                <a16:creationId xmlns:a16="http://schemas.microsoft.com/office/drawing/2014/main" id="{80DA4971-75C8-C443-943C-E511B349DC32}"/>
+              </a:ext>
+            </a:extLst>
+          </p:cNvPr>
+          <p:cNvPicPr>
+            <a:picLocks noChangeAspect="1"/>
+          </p:cNvPicPr>
+          <p:nvPr/>
+        </p:nvPicPr>
+        <p:blipFill>
+          <a:blip r:embed="rId5">
+            <a:extLst>
+              <a:ext uri="{28A0092B-C50C-407E-A947-70E740481C1C}">
+                <a14:useLocalDpi xmlns:a14="http://schemas.microsoft.com/office/drawing/2010/main" val="0"/>
+              </a:ext>
+            </a:extLst>
+          </a:blip>
+          <a:srcRect/>
+          <a:stretch>
+            <a:fillRect/>
+          </a:stretch>
+        </p:blipFill>
+        <p:spPr bwMode="auto">
+          <a:xfrm>
+            <a:off x="9604819" y="2034486"/>
+            <a:ext cx="1032463" cy="382630"/>
+          </a:xfrm>
+          <a:prstGeom prst="rect">
+            <a:avLst/>
+          </a:prstGeom>
+          <a:noFill/>
+          <a:ln>
+            <a:noFill/>
+          </a:ln>
+          <a:extLst>
+            <a:ext uri="{909E8E84-426E-40DD-AFC4-6F175D3DCCD1}">
+              <a14:hiddenFill xmlns:a14="http://schemas.microsoft.com/office/drawing/2010/main">
+                <a:solidFill>
+                  <a:srgbClr val="FFFFFF"/>
+                </a:solidFill>
+              </a14:hiddenFill>
+            </a:ext>
+            <a:ext uri="{91240B29-F687-4F45-9708-019B960494DF}">
+              <a14:hiddenLine xmlns:a14="http://schemas.microsoft.com/office/drawing/2010/main" w="9525">
+                <a:solidFill>
+                  <a:srgbClr val="000000"/>
+                </a:solidFill>
+                <a:miter lim="800000"/>
+                <a:headEnd/>
+                <a:tailEnd/>
+              </a14:hiddenLine>
+            </a:ext>
+          </a:extLst>
+        </p:spPr>
+      </p:pic>
+      <p:sp>
+        <p:nvSpPr>
+          <p:cNvPr id="24" name="AutoShape 4">
+            <a:extLst>
+              <a:ext uri="{FF2B5EF4-FFF2-40B4-BE49-F238E27FC236}">
+                <a16:creationId xmlns:a16="http://schemas.microsoft.com/office/drawing/2014/main" id="{188EC634-82A3-8246-9DF1-4090C9CD0441}"/>
+              </a:ext>
+            </a:extLst>
+          </p:cNvPr>
+          <p:cNvSpPr>
+            <a:spLocks noChangeArrowheads="1"/>
+          </p:cNvSpPr>
+          <p:nvPr/>
+        </p:nvSpPr>
+        <p:spPr bwMode="auto">
+          <a:xfrm>
+            <a:off x="5625181" y="4357488"/>
+            <a:ext cx="3979638" cy="1349199"/>
+          </a:xfrm>
+          <a:prstGeom prst="roundRect">
+            <a:avLst>
+              <a:gd name="adj" fmla="val 7117"/>
+            </a:avLst>
+          </a:prstGeom>
+          <a:noFill/>
+          <a:ln w="12700">
+            <a:solidFill>
+              <a:srgbClr val="5596E6">
+                <a:lumMod val="50000"/>
+              </a:srgbClr>
+            </a:solidFill>
+            <a:prstDash val="dash"/>
+            <a:round/>
+            <a:headEnd/>
+            <a:tailEnd/>
+          </a:ln>
+        </p:spPr>
+        <p:txBody>
+          <a:bodyPr lIns="0" tIns="0" rIns="0" bIns="0" anchor="b" anchorCtr="1"/>
+          <a:lstStyle/>
+          <a:p>
+            <a:pPr algn="ctr" defTabSz="1219170" eaLnBrk="1" fontAlgn="auto" hangingPunct="1">
+              <a:spcBef>
+                <a:spcPts val="0"/>
+              </a:spcBef>
+              <a:spcAft>
+                <a:spcPts val="0"/>
+              </a:spcAft>
+              <a:defRPr/>
+            </a:pPr>
+            <a:r>
+              <a:rPr lang="en-US" sz="1333" kern="0" dirty="0">
+                <a:solidFill>
+                  <a:srgbClr val="6D7777"/>
+                </a:solidFill>
+              </a:rPr>
+              <a:t>Image Repository</a:t>
+            </a:r>
+          </a:p>
+        </p:txBody>
+      </p:sp>
+      <p:sp>
+        <p:nvSpPr>
+          <p:cNvPr id="25" name="Rectangle 24">
+            <a:extLst>
+              <a:ext uri="{FF2B5EF4-FFF2-40B4-BE49-F238E27FC236}">
+                <a16:creationId xmlns:a16="http://schemas.microsoft.com/office/drawing/2014/main" id="{FE978274-D862-344B-9880-9033C1BBD93D}"/>
+              </a:ext>
+            </a:extLst>
+          </p:cNvPr>
+          <p:cNvSpPr/>
+          <p:nvPr/>
+        </p:nvSpPr>
+        <p:spPr>
+          <a:xfrm>
+            <a:off x="6230403" y="4818365"/>
+            <a:ext cx="1296883" cy="437590"/>
+          </a:xfrm>
+          <a:prstGeom prst="rect">
+            <a:avLst/>
+          </a:prstGeom>
+          <a:solidFill>
+            <a:schemeClr val="bg1">
+              <a:lumMod val="65000"/>
+            </a:schemeClr>
+          </a:solidFill>
+          <a:ln>
+            <a:noFill/>
+          </a:ln>
+          <a:effectLst>
+            <a:outerShdw blurRad="50800" dist="38100" dir="5400000" algn="t" rotWithShape="0">
+              <a:schemeClr val="accent3">
+                <a:lumMod val="75000"/>
+                <a:alpha val="40000"/>
+              </a:schemeClr>
+            </a:outerShdw>
+          </a:effectLst>
+        </p:spPr>
+        <p:style>
+          <a:lnRef idx="2">
+            <a:schemeClr val="accent1">
+              <a:shade val="50000"/>
+            </a:schemeClr>
+          </a:lnRef>
+          <a:fillRef idx="1">
+            <a:schemeClr val="accent1"/>
+          </a:fillRef>
+          <a:effectRef idx="0">
+            <a:schemeClr val="accent1"/>
+          </a:effectRef>
+          <a:fontRef idx="minor">
+            <a:schemeClr val="lt1"/>
+          </a:fontRef>
+        </p:style>
+        <p:txBody>
+          <a:bodyPr rtlCol="0" anchor="ctr"/>
+          <a:lstStyle/>
+          <a:p>
+            <a:pPr algn="ctr"/>
+            <a:r>
+              <a:rPr lang="en-US" sz="1400" dirty="0"/>
+              <a:t>App Image</a:t>
+            </a:r>
+          </a:p>
+        </p:txBody>
+      </p:sp>
+      <p:cxnSp>
+        <p:nvCxnSpPr>
+          <p:cNvPr id="26" name="Curved Connector 25">
+            <a:extLst>
+              <a:ext uri="{FF2B5EF4-FFF2-40B4-BE49-F238E27FC236}">
+                <a16:creationId xmlns:a16="http://schemas.microsoft.com/office/drawing/2014/main" id="{9665A4AA-A1F7-1C4B-8754-6930DE8BCD81}"/>
+              </a:ext>
+            </a:extLst>
+          </p:cNvPr>
+          <p:cNvCxnSpPr>
+            <a:cxnSpLocks/>
+            <a:stCxn id="14" idx="0"/>
+            <a:endCxn id="16" idx="1"/>
+          </p:cNvCxnSpPr>
+          <p:nvPr/>
+        </p:nvCxnSpPr>
+        <p:spPr>
+          <a:xfrm rot="16200000" flipV="1">
+            <a:off x="811902" y="3008890"/>
+            <a:ext cx="2859150" cy="1011639"/>
+          </a:xfrm>
+          <a:prstGeom prst="curvedConnector4">
+            <a:avLst>
+              <a:gd name="adj1" fmla="val 46174"/>
+              <a:gd name="adj2" fmla="val 122597"/>
+            </a:avLst>
+          </a:prstGeom>
+          <a:ln>
+            <a:solidFill>
+              <a:schemeClr val="accent6"/>
+            </a:solidFill>
+            <a:tailEnd type="triangle"/>
+          </a:ln>
+          <a:effectLst/>
+        </p:spPr>
+        <p:style>
+          <a:lnRef idx="2">
+            <a:schemeClr val="accent1"/>
+          </a:lnRef>
+          <a:fillRef idx="0">
+            <a:schemeClr val="accent1"/>
+          </a:fillRef>
+          <a:effectRef idx="1">
+            <a:schemeClr val="accent1"/>
+          </a:effectRef>
+          <a:fontRef idx="minor">
+            <a:schemeClr val="tx1"/>
+          </a:fontRef>
+        </p:style>
+      </p:cxnSp>
+      <p:sp>
+        <p:nvSpPr>
+          <p:cNvPr id="29" name="Oval 28">
+            <a:extLst>
+              <a:ext uri="{FF2B5EF4-FFF2-40B4-BE49-F238E27FC236}">
+                <a16:creationId xmlns:a16="http://schemas.microsoft.com/office/drawing/2014/main" id="{653694A2-8D05-A64F-809C-7EA881DCDE5B}"/>
+              </a:ext>
+            </a:extLst>
+          </p:cNvPr>
+          <p:cNvSpPr/>
+          <p:nvPr/>
+        </p:nvSpPr>
+        <p:spPr>
+          <a:xfrm>
+            <a:off x="2241477" y="4010812"/>
+            <a:ext cx="338327" cy="338327"/>
+          </a:xfrm>
+          <a:prstGeom prst="ellipse">
+            <a:avLst/>
+          </a:prstGeom>
+          <a:solidFill>
+            <a:schemeClr val="tx2">
+              <a:lumMod val="75000"/>
+            </a:schemeClr>
+          </a:solidFill>
+          <a:ln>
+            <a:noFill/>
+          </a:ln>
+        </p:spPr>
+        <p:style>
+          <a:lnRef idx="2">
+            <a:schemeClr val="accent1">
+              <a:shade val="50000"/>
+            </a:schemeClr>
+          </a:lnRef>
+          <a:fillRef idx="1">
+            <a:schemeClr val="accent1"/>
+          </a:fillRef>
+          <a:effectRef idx="0">
+            <a:schemeClr val="accent1"/>
+          </a:effectRef>
+          <a:fontRef idx="minor">
+            <a:schemeClr val="lt1"/>
+          </a:fontRef>
+        </p:style>
+        <p:txBody>
+          <a:bodyPr rtlCol="0" anchor="ctr"/>
+          <a:lstStyle/>
+          <a:p>
+            <a:pPr algn="ctr"/>
+            <a:r>
+              <a:rPr lang="en-US" sz="1400" dirty="0"/>
+              <a:t>1</a:t>
+            </a:r>
+          </a:p>
+        </p:txBody>
+      </p:sp>
+      <p:cxnSp>
+        <p:nvCxnSpPr>
+          <p:cNvPr id="30" name="Curved Connector 29">
+            <a:extLst>
+              <a:ext uri="{FF2B5EF4-FFF2-40B4-BE49-F238E27FC236}">
+                <a16:creationId xmlns:a16="http://schemas.microsoft.com/office/drawing/2014/main" id="{DB901B72-743E-B949-820B-4A10C4E5D124}"/>
+              </a:ext>
+            </a:extLst>
+          </p:cNvPr>
+          <p:cNvCxnSpPr>
+            <a:cxnSpLocks/>
+            <a:stCxn id="18" idx="3"/>
+            <a:endCxn id="16" idx="0"/>
+          </p:cNvCxnSpPr>
+          <p:nvPr/>
+        </p:nvCxnSpPr>
+        <p:spPr>
+          <a:xfrm flipH="1" flipV="1">
+            <a:off x="2384099" y="1866340"/>
+            <a:ext cx="250698" cy="1111718"/>
+          </a:xfrm>
+          <a:prstGeom prst="curvedConnector4">
+            <a:avLst>
+              <a:gd name="adj1" fmla="val -249840"/>
+              <a:gd name="adj2" fmla="val 120563"/>
+            </a:avLst>
+          </a:prstGeom>
+          <a:ln>
+            <a:solidFill>
+              <a:schemeClr val="accent6"/>
+            </a:solidFill>
+            <a:tailEnd type="triangle"/>
+          </a:ln>
+          <a:effectLst/>
+        </p:spPr>
+        <p:style>
+          <a:lnRef idx="2">
+            <a:schemeClr val="accent1"/>
+          </a:lnRef>
+          <a:fillRef idx="0">
+            <a:schemeClr val="accent1"/>
+          </a:fillRef>
+          <a:effectRef idx="1">
+            <a:schemeClr val="accent1"/>
+          </a:effectRef>
+          <a:fontRef idx="minor">
+            <a:schemeClr val="tx1"/>
+          </a:fontRef>
+        </p:style>
+      </p:cxnSp>
+      <p:sp>
+        <p:nvSpPr>
+          <p:cNvPr id="33" name="Oval 32">
+            <a:extLst>
+              <a:ext uri="{FF2B5EF4-FFF2-40B4-BE49-F238E27FC236}">
+                <a16:creationId xmlns:a16="http://schemas.microsoft.com/office/drawing/2014/main" id="{01B75278-451F-1141-AEAC-9E804061C7CE}"/>
+              </a:ext>
+            </a:extLst>
+          </p:cNvPr>
+          <p:cNvSpPr/>
+          <p:nvPr/>
+        </p:nvSpPr>
+        <p:spPr>
+          <a:xfrm>
+            <a:off x="3117777" y="1572412"/>
+            <a:ext cx="338327" cy="338327"/>
+          </a:xfrm>
+          <a:prstGeom prst="ellipse">
+            <a:avLst/>
+          </a:prstGeom>
+          <a:solidFill>
+            <a:schemeClr val="tx2">
+              <a:lumMod val="75000"/>
+            </a:schemeClr>
+          </a:solidFill>
+          <a:ln>
+            <a:noFill/>
+          </a:ln>
+        </p:spPr>
+        <p:style>
+          <a:lnRef idx="2">
+            <a:schemeClr val="accent1">
+              <a:shade val="50000"/>
+            </a:schemeClr>
+          </a:lnRef>
+          <a:fillRef idx="1">
+            <a:schemeClr val="accent1"/>
+          </a:fillRef>
+          <a:effectRef idx="0">
+            <a:schemeClr val="accent1"/>
+          </a:effectRef>
+          <a:fontRef idx="minor">
+            <a:schemeClr val="lt1"/>
+          </a:fontRef>
+        </p:style>
+        <p:txBody>
+          <a:bodyPr rtlCol="0" anchor="ctr"/>
+          <a:lstStyle/>
+          <a:p>
+            <a:pPr algn="ctr"/>
+            <a:r>
+              <a:rPr lang="en-US" sz="1400" dirty="0"/>
+              <a:t>2</a:t>
+            </a:r>
+          </a:p>
+        </p:txBody>
+      </p:sp>
+      <p:sp>
+        <p:nvSpPr>
+          <p:cNvPr id="34" name="Oval 33">
+            <a:extLst>
+              <a:ext uri="{FF2B5EF4-FFF2-40B4-BE49-F238E27FC236}">
+                <a16:creationId xmlns:a16="http://schemas.microsoft.com/office/drawing/2014/main" id="{9D801898-E5A5-7649-ACBD-D30357EF6BED}"/>
+              </a:ext>
+            </a:extLst>
+          </p:cNvPr>
+          <p:cNvSpPr/>
+          <p:nvPr/>
+        </p:nvSpPr>
+        <p:spPr>
+          <a:xfrm>
+            <a:off x="5626971" y="1778217"/>
+            <a:ext cx="338327" cy="338327"/>
+          </a:xfrm>
+          <a:prstGeom prst="ellipse">
+            <a:avLst/>
+          </a:prstGeom>
+          <a:solidFill>
+            <a:schemeClr val="tx2">
+              <a:lumMod val="75000"/>
+            </a:schemeClr>
+          </a:solidFill>
+          <a:ln>
+            <a:noFill/>
+          </a:ln>
+        </p:spPr>
+        <p:style>
+          <a:lnRef idx="2">
+            <a:schemeClr val="accent1">
+              <a:shade val="50000"/>
+            </a:schemeClr>
+          </a:lnRef>
+          <a:fillRef idx="1">
+            <a:schemeClr val="accent1"/>
+          </a:fillRef>
+          <a:effectRef idx="0">
+            <a:schemeClr val="accent1"/>
+          </a:effectRef>
+          <a:fontRef idx="minor">
+            <a:schemeClr val="lt1"/>
+          </a:fontRef>
+        </p:style>
+        <p:txBody>
+          <a:bodyPr rtlCol="0" anchor="ctr"/>
+          <a:lstStyle/>
+          <a:p>
+            <a:pPr algn="ctr"/>
+            <a:r>
+              <a:rPr lang="en-US" sz="1400" dirty="0"/>
+              <a:t>3</a:t>
+            </a:r>
+          </a:p>
+        </p:txBody>
+      </p:sp>
+      <p:cxnSp>
+        <p:nvCxnSpPr>
+          <p:cNvPr id="35" name="Curved Connector 34">
+            <a:extLst>
+              <a:ext uri="{FF2B5EF4-FFF2-40B4-BE49-F238E27FC236}">
+                <a16:creationId xmlns:a16="http://schemas.microsoft.com/office/drawing/2014/main" id="{E4693512-BC4E-064C-9884-BD8A6CD5F463}"/>
+              </a:ext>
+            </a:extLst>
+          </p:cNvPr>
+          <p:cNvCxnSpPr>
+            <a:cxnSpLocks/>
+            <a:stCxn id="5" idx="2"/>
+            <a:endCxn id="25" idx="0"/>
+          </p:cNvCxnSpPr>
+          <p:nvPr/>
+        </p:nvCxnSpPr>
+        <p:spPr>
+          <a:xfrm rot="5400000">
+            <a:off x="6026147" y="3013128"/>
+            <a:ext cx="2657936" cy="952539"/>
+          </a:xfrm>
+          <a:prstGeom prst="curvedConnector3">
+            <a:avLst>
+              <a:gd name="adj1" fmla="val 50000"/>
+            </a:avLst>
+          </a:prstGeom>
+          <a:ln>
+            <a:solidFill>
+              <a:schemeClr val="accent6"/>
+            </a:solidFill>
+            <a:tailEnd type="triangle"/>
+          </a:ln>
+          <a:effectLst/>
+        </p:spPr>
+        <p:style>
+          <a:lnRef idx="2">
+            <a:schemeClr val="accent1"/>
+          </a:lnRef>
+          <a:fillRef idx="0">
+            <a:schemeClr val="accent1"/>
+          </a:fillRef>
+          <a:effectRef idx="1">
+            <a:schemeClr val="accent1"/>
+          </a:effectRef>
+          <a:fontRef idx="minor">
+            <a:schemeClr val="tx1"/>
+          </a:fontRef>
+        </p:style>
+      </p:cxnSp>
+      <p:cxnSp>
+        <p:nvCxnSpPr>
+          <p:cNvPr id="38" name="Curved Connector 37">
+            <a:extLst>
+              <a:ext uri="{FF2B5EF4-FFF2-40B4-BE49-F238E27FC236}">
+                <a16:creationId xmlns:a16="http://schemas.microsoft.com/office/drawing/2014/main" id="{B031EFB6-9792-D84D-8DBF-FBA017642DD4}"/>
+              </a:ext>
+            </a:extLst>
+          </p:cNvPr>
+          <p:cNvCxnSpPr>
+            <a:cxnSpLocks/>
+            <a:stCxn id="25" idx="3"/>
+            <a:endCxn id="22" idx="2"/>
+          </p:cNvCxnSpPr>
+          <p:nvPr/>
+        </p:nvCxnSpPr>
+        <p:spPr>
+          <a:xfrm flipV="1">
+            <a:off x="7527286" y="2232179"/>
+            <a:ext cx="1912638" cy="2804981"/>
+          </a:xfrm>
+          <a:prstGeom prst="curvedConnector2">
+            <a:avLst/>
+          </a:prstGeom>
+          <a:ln>
+            <a:solidFill>
+              <a:schemeClr val="accent6"/>
+            </a:solidFill>
+            <a:tailEnd type="triangle"/>
+          </a:ln>
+          <a:effectLst/>
+        </p:spPr>
+        <p:style>
+          <a:lnRef idx="2">
+            <a:schemeClr val="accent1"/>
+          </a:lnRef>
+          <a:fillRef idx="0">
+            <a:schemeClr val="accent1"/>
+          </a:fillRef>
+          <a:effectRef idx="1">
+            <a:schemeClr val="accent1"/>
+          </a:effectRef>
+          <a:fontRef idx="minor">
+            <a:schemeClr val="tx1"/>
+          </a:fontRef>
+        </p:style>
+      </p:cxnSp>
+      <p:pic>
+        <p:nvPicPr>
+          <p:cNvPr id="41" name="Picture 40">
+            <a:extLst>
+              <a:ext uri="{FF2B5EF4-FFF2-40B4-BE49-F238E27FC236}">
+                <a16:creationId xmlns:a16="http://schemas.microsoft.com/office/drawing/2014/main" id="{0E951F03-2830-5D4C-B187-9E41A0AC71C3}"/>
+              </a:ext>
+            </a:extLst>
+          </p:cNvPr>
+          <p:cNvPicPr>
+            <a:picLocks noChangeAspect="1"/>
+          </p:cNvPicPr>
+          <p:nvPr/>
+        </p:nvPicPr>
+        <p:blipFill>
+          <a:blip r:embed="rId3"/>
+          <a:stretch>
+            <a:fillRect/>
+          </a:stretch>
+        </p:blipFill>
+        <p:spPr>
+          <a:xfrm>
+            <a:off x="3541341" y="1494109"/>
+            <a:ext cx="1193999" cy="294089"/>
+          </a:xfrm>
+          <a:prstGeom prst="rect">
+            <a:avLst/>
+          </a:prstGeom>
+          <a:ln>
+            <a:solidFill>
+              <a:srgbClr val="FFC000"/>
+            </a:solidFill>
+          </a:ln>
+        </p:spPr>
+      </p:pic>
+    </p:spTree>
+    <p:extLst>
+      <p:ext uri="{BB962C8B-B14F-4D97-AF65-F5344CB8AC3E}">
+        <p14:creationId xmlns:p14="http://schemas.microsoft.com/office/powerpoint/2010/main" val="2209636817"/>
+      </p:ext>
+    </p:extLst>
+  </p:cSld>
+  <p:clrMapOvr>
+    <a:masterClrMapping/>
+  </p:clrMapOvr>
+  <p:transition spd="med"/>
+</p:sld>
+</file>
+
+<file path=ppt/slides/slide6.xml><?xml version="1.0" encoding="utf-8"?>
 <p:sld xmlns:a="http://schemas.openxmlformats.org/drawingml/2006/main" xmlns:r="http://schemas.openxmlformats.org/officeDocument/2006/relationships" xmlns:p="http://schemas.openxmlformats.org/presentationml/2006/main">
   <p:cSld>
     <p:spTree>
@@ -14496,7 +17515,7 @@
             <a:effectLst/>
             <a:extLst>
               <a:ext uri="{C572A759-6A51-4108-AA02-DFA0A04FC94B}">
-                <ma14:wrappingTextBoxFlag xmlns:ma14="http://schemas.microsoft.com/office/mac/drawingml/2011/main" xmlns="" val="1"/>
+                <ma14:wrappingTextBoxFlag xmlns="" xmlns:ma14="http://schemas.microsoft.com/office/mac/drawingml/2011/main" val="1"/>
               </a:ext>
             </a:extLst>
           </p:spPr>
@@ -16626,7 +19645,7 @@
             <a:effectLst/>
             <a:extLst>
               <a:ext uri="{C572A759-6A51-4108-AA02-DFA0A04FC94B}">
-                <ma14:wrappingTextBoxFlag xmlns:ma14="http://schemas.microsoft.com/office/mac/drawingml/2011/main" xmlns="" val="1"/>
+                <ma14:wrappingTextBoxFlag xmlns="" xmlns:ma14="http://schemas.microsoft.com/office/mac/drawingml/2011/main" val="1"/>
               </a:ext>
             </a:extLst>
           </p:spPr>
@@ -18245,7 +21264,7 @@
 </p:sld>
 </file>
 
-<file path=ppt/slides/slide6.xml><?xml version="1.0" encoding="utf-8"?>
+<file path=ppt/slides/slide7.xml><?xml version="1.0" encoding="utf-8"?>
 <p:sld xmlns:a="http://schemas.openxmlformats.org/drawingml/2006/main" xmlns:r="http://schemas.openxmlformats.org/officeDocument/2006/relationships" xmlns:p="http://schemas.openxmlformats.org/presentationml/2006/main">
   <p:cSld>
     <p:spTree>
@@ -18475,7 +21494,7 @@
                 </a:solidFill>
               </a:rPr>
               <a:pPr/>
-              <a:t>6</a:t>
+              <a:t>7</a:t>
             </a:fld>
             <a:endParaRPr lang="en-US">
               <a:solidFill>
@@ -21557,7 +24576,7 @@
 </p:sld>
 </file>
 
-<file path=ppt/slides/slide7.xml><?xml version="1.0" encoding="utf-8"?>
+<file path=ppt/slides/slide8.xml><?xml version="1.0" encoding="utf-8"?>
 <p:sld xmlns:a="http://schemas.openxmlformats.org/drawingml/2006/main" xmlns:r="http://schemas.openxmlformats.org/officeDocument/2006/relationships" xmlns:p="http://schemas.openxmlformats.org/presentationml/2006/main">
   <p:cSld>
     <p:spTree>
@@ -21787,7 +24806,7 @@
                 </a:solidFill>
               </a:rPr>
               <a:pPr/>
-              <a:t>7</a:t>
+              <a:t>8</a:t>
             </a:fld>
             <a:endParaRPr lang="en-US">
               <a:solidFill>
@@ -24869,7 +27888,7 @@
 </p:sld>
 </file>
 
-<file path=ppt/slides/slide8.xml><?xml version="1.0" encoding="utf-8"?>
+<file path=ppt/slides/slide9.xml><?xml version="1.0" encoding="utf-8"?>
 <p:sld xmlns:a="http://schemas.openxmlformats.org/drawingml/2006/main" xmlns:r="http://schemas.openxmlformats.org/officeDocument/2006/relationships" xmlns:p="http://schemas.openxmlformats.org/presentationml/2006/main">
   <p:cSld>
     <p:spTree>
@@ -24944,7 +27963,7 @@
           <a:p>
             <a:fld id="{C565C23E-6D76-459C-BC14-A9049E4EE889}" type="slidenum">
               <a:rPr lang="en-US" smtClean="0"/>
-              <a:t>8</a:t>
+              <a:t>9</a:t>
             </a:fld>
             <a:endParaRPr lang="en-US"/>
           </a:p>
@@ -26658,1383 +29677,6 @@
     <p:extLst>
       <p:ext uri="{BB962C8B-B14F-4D97-AF65-F5344CB8AC3E}">
         <p14:creationId xmlns:p14="http://schemas.microsoft.com/office/powerpoint/2010/main" val="3696044975"/>
-      </p:ext>
-    </p:extLst>
-  </p:cSld>
-  <p:clrMapOvr>
-    <a:masterClrMapping/>
-  </p:clrMapOvr>
-</p:sld>
-</file>
-
-<file path=ppt/slides/slide9.xml><?xml version="1.0" encoding="utf-8"?>
-<p:sld xmlns:a="http://schemas.openxmlformats.org/drawingml/2006/main" xmlns:r="http://schemas.openxmlformats.org/officeDocument/2006/relationships" xmlns:p="http://schemas.openxmlformats.org/presentationml/2006/main">
-  <p:cSld>
-    <p:spTree>
-      <p:nvGrpSpPr>
-        <p:cNvPr id="1" name=""/>
-        <p:cNvGrpSpPr/>
-        <p:nvPr/>
-      </p:nvGrpSpPr>
-      <p:grpSpPr>
-        <a:xfrm>
-          <a:off x="0" y="0"/>
-          <a:ext cx="0" cy="0"/>
-          <a:chOff x="0" y="0"/>
-          <a:chExt cx="0" cy="0"/>
-        </a:xfrm>
-      </p:grpSpPr>
-      <p:sp>
-        <p:nvSpPr>
-          <p:cNvPr id="2" name="Title 1">
-            <a:extLst>
-              <a:ext uri="{FF2B5EF4-FFF2-40B4-BE49-F238E27FC236}">
-                <a16:creationId xmlns:a16="http://schemas.microsoft.com/office/drawing/2014/main" id="{83D72B5A-D2BF-0F41-AB02-0E3504265F76}"/>
-              </a:ext>
-            </a:extLst>
-          </p:cNvPr>
-          <p:cNvSpPr>
-            <a:spLocks noGrp="1"/>
-          </p:cNvSpPr>
-          <p:nvPr>
-            <p:ph type="title"/>
-          </p:nvPr>
-        </p:nvSpPr>
-        <p:spPr>
-          <a:xfrm>
-            <a:off x="288633" y="208582"/>
-            <a:ext cx="10515600" cy="521140"/>
-          </a:xfrm>
-        </p:spPr>
-        <p:txBody>
-          <a:bodyPr>
-            <a:normAutofit/>
-          </a:bodyPr>
-          <a:lstStyle/>
-          <a:p>
-            <a:r>
-              <a:rPr lang="en-US" sz="2400" dirty="0"/>
-              <a:t>Event Stream As Event Store for ML</a:t>
-            </a:r>
-          </a:p>
-        </p:txBody>
-      </p:sp>
-      <p:sp>
-        <p:nvSpPr>
-          <p:cNvPr id="4" name="Slide Number Placeholder 3">
-            <a:extLst>
-              <a:ext uri="{FF2B5EF4-FFF2-40B4-BE49-F238E27FC236}">
-                <a16:creationId xmlns:a16="http://schemas.microsoft.com/office/drawing/2014/main" id="{B1D66A27-027F-EA4A-B9BD-D02849496229}"/>
-              </a:ext>
-            </a:extLst>
-          </p:cNvPr>
-          <p:cNvSpPr>
-            <a:spLocks noGrp="1"/>
-          </p:cNvSpPr>
-          <p:nvPr>
-            <p:ph type="sldNum" sz="quarter" idx="12"/>
-          </p:nvPr>
-        </p:nvSpPr>
-        <p:spPr/>
-        <p:txBody>
-          <a:bodyPr/>
-          <a:lstStyle/>
-          <a:p>
-            <a:fld id="{C565C23E-6D76-459C-BC14-A9049E4EE889}" type="slidenum">
-              <a:rPr lang="en-US" smtClean="0"/>
-              <a:t>9</a:t>
-            </a:fld>
-            <a:endParaRPr lang="en-US"/>
-          </a:p>
-        </p:txBody>
-      </p:sp>
-      <p:sp>
-        <p:nvSpPr>
-          <p:cNvPr id="6" name="Rectangle 5">
-            <a:extLst>
-              <a:ext uri="{FF2B5EF4-FFF2-40B4-BE49-F238E27FC236}">
-                <a16:creationId xmlns:a16="http://schemas.microsoft.com/office/drawing/2014/main" id="{B53C0033-8D9E-604C-9B28-5FDD36C6C800}"/>
-              </a:ext>
-            </a:extLst>
-          </p:cNvPr>
-          <p:cNvSpPr/>
-          <p:nvPr/>
-        </p:nvSpPr>
-        <p:spPr>
-          <a:xfrm>
-            <a:off x="6118016" y="1168380"/>
-            <a:ext cx="3362160" cy="1973555"/>
-          </a:xfrm>
-          <a:prstGeom prst="rect">
-            <a:avLst/>
-          </a:prstGeom>
-          <a:noFill/>
-          <a:ln>
-            <a:prstDash val="dash"/>
-          </a:ln>
-        </p:spPr>
-        <p:style>
-          <a:lnRef idx="2">
-            <a:schemeClr val="accent1">
-              <a:shade val="50000"/>
-            </a:schemeClr>
-          </a:lnRef>
-          <a:fillRef idx="1">
-            <a:schemeClr val="accent1"/>
-          </a:fillRef>
-          <a:effectRef idx="0">
-            <a:schemeClr val="accent1"/>
-          </a:effectRef>
-          <a:fontRef idx="minor">
-            <a:schemeClr val="lt1"/>
-          </a:fontRef>
-        </p:style>
-        <p:txBody>
-          <a:bodyPr rtlCol="0" anchor="b"/>
-          <a:lstStyle/>
-          <a:p>
-            <a:pPr algn="ctr"/>
-            <a:r>
-              <a:rPr lang="en-US" sz="1200" dirty="0">
-                <a:solidFill>
-                  <a:schemeClr val="tx1"/>
-                </a:solidFill>
-              </a:rPr>
-              <a:t>ML Environment</a:t>
-            </a:r>
-          </a:p>
-        </p:txBody>
-      </p:sp>
-      <p:sp>
-        <p:nvSpPr>
-          <p:cNvPr id="8" name="Rectangle 7">
-            <a:extLst>
-              <a:ext uri="{FF2B5EF4-FFF2-40B4-BE49-F238E27FC236}">
-                <a16:creationId xmlns:a16="http://schemas.microsoft.com/office/drawing/2014/main" id="{FB63688E-FF28-D746-AC3D-3D2EFBDE0655}"/>
-              </a:ext>
-            </a:extLst>
-          </p:cNvPr>
-          <p:cNvSpPr/>
-          <p:nvPr/>
-        </p:nvSpPr>
-        <p:spPr>
-          <a:xfrm>
-            <a:off x="642258" y="1282632"/>
-            <a:ext cx="2008413" cy="1655634"/>
-          </a:xfrm>
-          <a:prstGeom prst="rect">
-            <a:avLst/>
-          </a:prstGeom>
-          <a:noFill/>
-          <a:ln>
-            <a:solidFill>
-              <a:schemeClr val="accent3"/>
-            </a:solidFill>
-            <a:prstDash val="dash"/>
-          </a:ln>
-        </p:spPr>
-        <p:style>
-          <a:lnRef idx="2">
-            <a:schemeClr val="accent1">
-              <a:shade val="50000"/>
-            </a:schemeClr>
-          </a:lnRef>
-          <a:fillRef idx="1">
-            <a:schemeClr val="accent1"/>
-          </a:fillRef>
-          <a:effectRef idx="0">
-            <a:schemeClr val="accent1"/>
-          </a:effectRef>
-          <a:fontRef idx="minor">
-            <a:schemeClr val="lt1"/>
-          </a:fontRef>
-        </p:style>
-        <p:txBody>
-          <a:bodyPr rtlCol="0" anchor="b"/>
-          <a:lstStyle/>
-          <a:p>
-            <a:pPr algn="ctr"/>
-            <a:r>
-              <a:rPr lang="en-US" sz="1200" dirty="0">
-                <a:solidFill>
-                  <a:schemeClr val="tx1"/>
-                </a:solidFill>
-              </a:rPr>
-              <a:t>Python</a:t>
-            </a:r>
-          </a:p>
-        </p:txBody>
-      </p:sp>
-      <p:sp>
-        <p:nvSpPr>
-          <p:cNvPr id="9" name="Rectangle 8">
-            <a:extLst>
-              <a:ext uri="{FF2B5EF4-FFF2-40B4-BE49-F238E27FC236}">
-                <a16:creationId xmlns:a16="http://schemas.microsoft.com/office/drawing/2014/main" id="{F1EEF6CD-0322-394A-87BF-5379FE8EE999}"/>
-              </a:ext>
-            </a:extLst>
-          </p:cNvPr>
-          <p:cNvSpPr/>
-          <p:nvPr/>
-        </p:nvSpPr>
-        <p:spPr>
-          <a:xfrm>
-            <a:off x="762000" y="1616527"/>
-            <a:ext cx="1703614" cy="914400"/>
-          </a:xfrm>
-          <a:prstGeom prst="rect">
-            <a:avLst/>
-          </a:prstGeom>
-          <a:solidFill>
-            <a:schemeClr val="accent5">
-              <a:lumMod val="75000"/>
-            </a:schemeClr>
-          </a:solidFill>
-        </p:spPr>
-        <p:style>
-          <a:lnRef idx="2">
-            <a:schemeClr val="accent1">
-              <a:shade val="50000"/>
-            </a:schemeClr>
-          </a:lnRef>
-          <a:fillRef idx="1">
-            <a:schemeClr val="accent1"/>
-          </a:fillRef>
-          <a:effectRef idx="0">
-            <a:schemeClr val="accent1"/>
-          </a:effectRef>
-          <a:fontRef idx="minor">
-            <a:schemeClr val="lt1"/>
-          </a:fontRef>
-        </p:style>
-        <p:txBody>
-          <a:bodyPr rtlCol="0" anchor="ctr"/>
-          <a:lstStyle/>
-          <a:p>
-            <a:pPr algn="ctr"/>
-            <a:r>
-              <a:rPr lang="en-US" sz="1400" dirty="0"/>
-              <a:t>Simulator</a:t>
-            </a:r>
-          </a:p>
-        </p:txBody>
-      </p:sp>
-      <p:sp>
-        <p:nvSpPr>
-          <p:cNvPr id="10" name="Rounded Rectangle 9">
-            <a:extLst>
-              <a:ext uri="{FF2B5EF4-FFF2-40B4-BE49-F238E27FC236}">
-                <a16:creationId xmlns:a16="http://schemas.microsoft.com/office/drawing/2014/main" id="{0BA597E7-00D6-7F44-9C30-03D1F5A01FB4}"/>
-              </a:ext>
-            </a:extLst>
-          </p:cNvPr>
-          <p:cNvSpPr/>
-          <p:nvPr/>
-        </p:nvSpPr>
-        <p:spPr bwMode="auto">
-          <a:xfrm>
-            <a:off x="2766994" y="4217859"/>
-            <a:ext cx="245561" cy="731512"/>
-          </a:xfrm>
-          <a:prstGeom prst="roundRect">
-            <a:avLst/>
-          </a:prstGeom>
-          <a:solidFill>
-            <a:schemeClr val="bg2"/>
-          </a:solidFill>
-          <a:ln>
-            <a:solidFill>
-              <a:schemeClr val="bg1"/>
-            </a:solidFill>
-            <a:prstDash val="solid"/>
-            <a:headEnd type="none" w="med" len="med"/>
-            <a:tailEnd type="none" w="med" len="med"/>
-          </a:ln>
-          <a:effectLst/>
-        </p:spPr>
-        <p:style>
-          <a:lnRef idx="1">
-            <a:schemeClr val="accent5"/>
-          </a:lnRef>
-          <a:fillRef idx="3">
-            <a:schemeClr val="accent5"/>
-          </a:fillRef>
-          <a:effectRef idx="2">
-            <a:schemeClr val="accent5"/>
-          </a:effectRef>
-          <a:fontRef idx="minor">
-            <a:schemeClr val="lt1"/>
-          </a:fontRef>
-        </p:style>
-        <p:txBody>
-          <a:bodyPr vert="horz" wrap="square" lIns="0" tIns="0" rIns="0" bIns="0" numCol="1" rtlCol="0" anchor="ctr" anchorCtr="0" compatLnSpc="1">
-            <a:prstTxWarp prst="textNoShape">
-              <a:avLst/>
-            </a:prstTxWarp>
-            <a:noAutofit/>
-          </a:bodyPr>
-          <a:lstStyle/>
-          <a:p>
-            <a:pPr algn="ctr" defTabSz="1219170" fontAlgn="base">
-              <a:lnSpc>
-                <a:spcPct val="90000"/>
-              </a:lnSpc>
-              <a:spcBef>
-                <a:spcPct val="0"/>
-              </a:spcBef>
-              <a:spcAft>
-                <a:spcPct val="0"/>
-              </a:spcAft>
-            </a:pPr>
-            <a:r>
-              <a:rPr lang="en-US" sz="1200" dirty="0">
-                <a:solidFill>
-                  <a:schemeClr val="bg1"/>
-                </a:solidFill>
-              </a:rPr>
-              <a:t>0</a:t>
-            </a:r>
-            <a:endParaRPr lang="en-US" sz="667" dirty="0">
-              <a:solidFill>
-                <a:schemeClr val="bg1"/>
-              </a:solidFill>
-            </a:endParaRPr>
-          </a:p>
-        </p:txBody>
-      </p:sp>
-      <p:sp>
-        <p:nvSpPr>
-          <p:cNvPr id="11" name="Rounded Rectangle 10">
-            <a:extLst>
-              <a:ext uri="{FF2B5EF4-FFF2-40B4-BE49-F238E27FC236}">
-                <a16:creationId xmlns:a16="http://schemas.microsoft.com/office/drawing/2014/main" id="{3F8CBAEE-0098-D148-A196-E5AD2B6787B8}"/>
-              </a:ext>
-            </a:extLst>
-          </p:cNvPr>
-          <p:cNvSpPr/>
-          <p:nvPr/>
-        </p:nvSpPr>
-        <p:spPr bwMode="auto">
-          <a:xfrm>
-            <a:off x="3010831" y="4217859"/>
-            <a:ext cx="245561" cy="731512"/>
-          </a:xfrm>
-          <a:prstGeom prst="roundRect">
-            <a:avLst/>
-          </a:prstGeom>
-          <a:solidFill>
-            <a:schemeClr val="bg2"/>
-          </a:solidFill>
-          <a:ln>
-            <a:solidFill>
-              <a:schemeClr val="bg1"/>
-            </a:solidFill>
-            <a:prstDash val="solid"/>
-            <a:headEnd type="none" w="med" len="med"/>
-            <a:tailEnd type="none" w="med" len="med"/>
-          </a:ln>
-          <a:effectLst/>
-        </p:spPr>
-        <p:style>
-          <a:lnRef idx="1">
-            <a:schemeClr val="accent5"/>
-          </a:lnRef>
-          <a:fillRef idx="3">
-            <a:schemeClr val="accent5"/>
-          </a:fillRef>
-          <a:effectRef idx="2">
-            <a:schemeClr val="accent5"/>
-          </a:effectRef>
-          <a:fontRef idx="minor">
-            <a:schemeClr val="lt1"/>
-          </a:fontRef>
-        </p:style>
-        <p:txBody>
-          <a:bodyPr vert="horz" wrap="square" lIns="0" tIns="0" rIns="0" bIns="0" numCol="1" rtlCol="0" anchor="ctr" anchorCtr="0" compatLnSpc="1">
-            <a:prstTxWarp prst="textNoShape">
-              <a:avLst/>
-            </a:prstTxWarp>
-            <a:noAutofit/>
-          </a:bodyPr>
-          <a:lstStyle/>
-          <a:p>
-            <a:pPr algn="ctr" defTabSz="1219170" fontAlgn="base">
-              <a:lnSpc>
-                <a:spcPct val="90000"/>
-              </a:lnSpc>
-              <a:spcBef>
-                <a:spcPct val="0"/>
-              </a:spcBef>
-              <a:spcAft>
-                <a:spcPct val="0"/>
-              </a:spcAft>
-            </a:pPr>
-            <a:r>
-              <a:rPr lang="en-US" sz="1200" dirty="0">
-                <a:solidFill>
-                  <a:schemeClr val="bg1"/>
-                </a:solidFill>
-              </a:rPr>
-              <a:t>1</a:t>
-            </a:r>
-            <a:endParaRPr lang="en-US" sz="667" dirty="0">
-              <a:solidFill>
-                <a:schemeClr val="bg1"/>
-              </a:solidFill>
-            </a:endParaRPr>
-          </a:p>
-        </p:txBody>
-      </p:sp>
-      <p:sp>
-        <p:nvSpPr>
-          <p:cNvPr id="12" name="Rounded Rectangle 11">
-            <a:extLst>
-              <a:ext uri="{FF2B5EF4-FFF2-40B4-BE49-F238E27FC236}">
-                <a16:creationId xmlns:a16="http://schemas.microsoft.com/office/drawing/2014/main" id="{F2989703-2F49-5647-B6D8-F7993E04EAE4}"/>
-              </a:ext>
-            </a:extLst>
-          </p:cNvPr>
-          <p:cNvSpPr/>
-          <p:nvPr/>
-        </p:nvSpPr>
-        <p:spPr bwMode="auto">
-          <a:xfrm>
-            <a:off x="3256393" y="4217859"/>
-            <a:ext cx="245561" cy="731512"/>
-          </a:xfrm>
-          <a:prstGeom prst="roundRect">
-            <a:avLst/>
-          </a:prstGeom>
-          <a:solidFill>
-            <a:schemeClr val="bg2"/>
-          </a:solidFill>
-          <a:ln>
-            <a:solidFill>
-              <a:schemeClr val="bg1"/>
-            </a:solidFill>
-            <a:prstDash val="solid"/>
-            <a:headEnd type="none" w="med" len="med"/>
-            <a:tailEnd type="none" w="med" len="med"/>
-          </a:ln>
-          <a:effectLst/>
-        </p:spPr>
-        <p:style>
-          <a:lnRef idx="1">
-            <a:schemeClr val="accent5"/>
-          </a:lnRef>
-          <a:fillRef idx="3">
-            <a:schemeClr val="accent5"/>
-          </a:fillRef>
-          <a:effectRef idx="2">
-            <a:schemeClr val="accent5"/>
-          </a:effectRef>
-          <a:fontRef idx="minor">
-            <a:schemeClr val="lt1"/>
-          </a:fontRef>
-        </p:style>
-        <p:txBody>
-          <a:bodyPr vert="horz" wrap="square" lIns="0" tIns="0" rIns="0" bIns="0" numCol="1" rtlCol="0" anchor="ctr" anchorCtr="0" compatLnSpc="1">
-            <a:prstTxWarp prst="textNoShape">
-              <a:avLst/>
-            </a:prstTxWarp>
-            <a:noAutofit/>
-          </a:bodyPr>
-          <a:lstStyle/>
-          <a:p>
-            <a:pPr algn="ctr" defTabSz="1219170" fontAlgn="base">
-              <a:lnSpc>
-                <a:spcPct val="90000"/>
-              </a:lnSpc>
-              <a:spcBef>
-                <a:spcPct val="0"/>
-              </a:spcBef>
-              <a:spcAft>
-                <a:spcPct val="0"/>
-              </a:spcAft>
-            </a:pPr>
-            <a:r>
-              <a:rPr lang="en-US" sz="1200" dirty="0">
-                <a:solidFill>
-                  <a:schemeClr val="bg1"/>
-                </a:solidFill>
-              </a:rPr>
-              <a:t>2</a:t>
-            </a:r>
-            <a:endParaRPr lang="en-US" sz="667" dirty="0">
-              <a:solidFill>
-                <a:schemeClr val="bg1"/>
-              </a:solidFill>
-            </a:endParaRPr>
-          </a:p>
-        </p:txBody>
-      </p:sp>
-      <p:sp>
-        <p:nvSpPr>
-          <p:cNvPr id="13" name="Rounded Rectangle 12">
-            <a:extLst>
-              <a:ext uri="{FF2B5EF4-FFF2-40B4-BE49-F238E27FC236}">
-                <a16:creationId xmlns:a16="http://schemas.microsoft.com/office/drawing/2014/main" id="{54F04F52-1698-E54E-8D5D-3991A0424611}"/>
-              </a:ext>
-            </a:extLst>
-          </p:cNvPr>
-          <p:cNvSpPr/>
-          <p:nvPr/>
-        </p:nvSpPr>
-        <p:spPr bwMode="auto">
-          <a:xfrm>
-            <a:off x="3500230" y="4217859"/>
-            <a:ext cx="245561" cy="731512"/>
-          </a:xfrm>
-          <a:prstGeom prst="roundRect">
-            <a:avLst/>
-          </a:prstGeom>
-          <a:solidFill>
-            <a:schemeClr val="bg2"/>
-          </a:solidFill>
-          <a:ln>
-            <a:solidFill>
-              <a:schemeClr val="bg1"/>
-            </a:solidFill>
-            <a:prstDash val="solid"/>
-            <a:headEnd type="none" w="med" len="med"/>
-            <a:tailEnd type="none" w="med" len="med"/>
-          </a:ln>
-          <a:effectLst/>
-        </p:spPr>
-        <p:style>
-          <a:lnRef idx="1">
-            <a:schemeClr val="accent5"/>
-          </a:lnRef>
-          <a:fillRef idx="3">
-            <a:schemeClr val="accent5"/>
-          </a:fillRef>
-          <a:effectRef idx="2">
-            <a:schemeClr val="accent5"/>
-          </a:effectRef>
-          <a:fontRef idx="minor">
-            <a:schemeClr val="lt1"/>
-          </a:fontRef>
-        </p:style>
-        <p:txBody>
-          <a:bodyPr vert="horz" wrap="square" lIns="0" tIns="0" rIns="0" bIns="0" numCol="1" rtlCol="0" anchor="ctr" anchorCtr="0" compatLnSpc="1">
-            <a:prstTxWarp prst="textNoShape">
-              <a:avLst/>
-            </a:prstTxWarp>
-            <a:noAutofit/>
-          </a:bodyPr>
-          <a:lstStyle/>
-          <a:p>
-            <a:pPr algn="ctr" defTabSz="1219170" fontAlgn="base">
-              <a:lnSpc>
-                <a:spcPct val="90000"/>
-              </a:lnSpc>
-              <a:spcBef>
-                <a:spcPct val="0"/>
-              </a:spcBef>
-              <a:spcAft>
-                <a:spcPct val="0"/>
-              </a:spcAft>
-            </a:pPr>
-            <a:r>
-              <a:rPr lang="en-US" sz="1200" dirty="0">
-                <a:solidFill>
-                  <a:schemeClr val="bg1"/>
-                </a:solidFill>
-              </a:rPr>
-              <a:t>3</a:t>
-            </a:r>
-            <a:endParaRPr lang="en-US" sz="667" dirty="0">
-              <a:solidFill>
-                <a:schemeClr val="bg1"/>
-              </a:solidFill>
-            </a:endParaRPr>
-          </a:p>
-        </p:txBody>
-      </p:sp>
-      <p:sp>
-        <p:nvSpPr>
-          <p:cNvPr id="14" name="Rounded Rectangle 13">
-            <a:extLst>
-              <a:ext uri="{FF2B5EF4-FFF2-40B4-BE49-F238E27FC236}">
-                <a16:creationId xmlns:a16="http://schemas.microsoft.com/office/drawing/2014/main" id="{3890F22B-7831-CC45-9E84-2F465C403BBE}"/>
-              </a:ext>
-            </a:extLst>
-          </p:cNvPr>
-          <p:cNvSpPr/>
-          <p:nvPr/>
-        </p:nvSpPr>
-        <p:spPr bwMode="auto">
-          <a:xfrm>
-            <a:off x="3745791" y="4217859"/>
-            <a:ext cx="245561" cy="731512"/>
-          </a:xfrm>
-          <a:prstGeom prst="roundRect">
-            <a:avLst/>
-          </a:prstGeom>
-          <a:solidFill>
-            <a:schemeClr val="bg2"/>
-          </a:solidFill>
-          <a:ln>
-            <a:solidFill>
-              <a:schemeClr val="bg1"/>
-            </a:solidFill>
-            <a:prstDash val="solid"/>
-            <a:headEnd type="none" w="med" len="med"/>
-            <a:tailEnd type="none" w="med" len="med"/>
-          </a:ln>
-          <a:effectLst/>
-        </p:spPr>
-        <p:style>
-          <a:lnRef idx="1">
-            <a:schemeClr val="accent5"/>
-          </a:lnRef>
-          <a:fillRef idx="3">
-            <a:schemeClr val="accent5"/>
-          </a:fillRef>
-          <a:effectRef idx="2">
-            <a:schemeClr val="accent5"/>
-          </a:effectRef>
-          <a:fontRef idx="minor">
-            <a:schemeClr val="lt1"/>
-          </a:fontRef>
-        </p:style>
-        <p:txBody>
-          <a:bodyPr vert="horz" wrap="square" lIns="0" tIns="0" rIns="0" bIns="0" numCol="1" rtlCol="0" anchor="ctr" anchorCtr="0" compatLnSpc="1">
-            <a:prstTxWarp prst="textNoShape">
-              <a:avLst/>
-            </a:prstTxWarp>
-            <a:noAutofit/>
-          </a:bodyPr>
-          <a:lstStyle/>
-          <a:p>
-            <a:pPr algn="ctr" defTabSz="1219170" fontAlgn="base">
-              <a:lnSpc>
-                <a:spcPct val="90000"/>
-              </a:lnSpc>
-              <a:spcBef>
-                <a:spcPct val="0"/>
-              </a:spcBef>
-              <a:spcAft>
-                <a:spcPct val="0"/>
-              </a:spcAft>
-            </a:pPr>
-            <a:r>
-              <a:rPr lang="en-US" sz="1200" dirty="0">
-                <a:solidFill>
-                  <a:schemeClr val="bg1"/>
-                </a:solidFill>
-              </a:rPr>
-              <a:t>4</a:t>
-            </a:r>
-            <a:endParaRPr lang="en-US" sz="667" dirty="0">
-              <a:solidFill>
-                <a:schemeClr val="bg1"/>
-              </a:solidFill>
-            </a:endParaRPr>
-          </a:p>
-        </p:txBody>
-      </p:sp>
-      <p:sp>
-        <p:nvSpPr>
-          <p:cNvPr id="15" name="Rounded Rectangle 14">
-            <a:extLst>
-              <a:ext uri="{FF2B5EF4-FFF2-40B4-BE49-F238E27FC236}">
-                <a16:creationId xmlns:a16="http://schemas.microsoft.com/office/drawing/2014/main" id="{EED12008-2192-5048-99A3-CAFBD4DFB3A8}"/>
-              </a:ext>
-            </a:extLst>
-          </p:cNvPr>
-          <p:cNvSpPr/>
-          <p:nvPr/>
-        </p:nvSpPr>
-        <p:spPr bwMode="auto">
-          <a:xfrm>
-            <a:off x="3976587" y="4217859"/>
-            <a:ext cx="245561" cy="731512"/>
-          </a:xfrm>
-          <a:prstGeom prst="roundRect">
-            <a:avLst/>
-          </a:prstGeom>
-          <a:solidFill>
-            <a:schemeClr val="bg2"/>
-          </a:solidFill>
-          <a:ln>
-            <a:solidFill>
-              <a:schemeClr val="bg1"/>
-            </a:solidFill>
-            <a:prstDash val="solid"/>
-            <a:headEnd type="none" w="med" len="med"/>
-            <a:tailEnd type="none" w="med" len="med"/>
-          </a:ln>
-          <a:effectLst/>
-        </p:spPr>
-        <p:style>
-          <a:lnRef idx="1">
-            <a:schemeClr val="accent5"/>
-          </a:lnRef>
-          <a:fillRef idx="3">
-            <a:schemeClr val="accent5"/>
-          </a:fillRef>
-          <a:effectRef idx="2">
-            <a:schemeClr val="accent5"/>
-          </a:effectRef>
-          <a:fontRef idx="minor">
-            <a:schemeClr val="lt1"/>
-          </a:fontRef>
-        </p:style>
-        <p:txBody>
-          <a:bodyPr vert="horz" wrap="square" lIns="0" tIns="0" rIns="0" bIns="0" numCol="1" rtlCol="0" anchor="ctr" anchorCtr="0" compatLnSpc="1">
-            <a:prstTxWarp prst="textNoShape">
-              <a:avLst/>
-            </a:prstTxWarp>
-            <a:noAutofit/>
-          </a:bodyPr>
-          <a:lstStyle/>
-          <a:p>
-            <a:pPr algn="ctr" defTabSz="1219170" fontAlgn="base">
-              <a:lnSpc>
-                <a:spcPct val="90000"/>
-              </a:lnSpc>
-              <a:spcBef>
-                <a:spcPct val="0"/>
-              </a:spcBef>
-              <a:spcAft>
-                <a:spcPct val="0"/>
-              </a:spcAft>
-            </a:pPr>
-            <a:r>
-              <a:rPr lang="en-US" sz="1200" dirty="0">
-                <a:solidFill>
-                  <a:schemeClr val="bg1"/>
-                </a:solidFill>
-              </a:rPr>
-              <a:t>5</a:t>
-            </a:r>
-            <a:endParaRPr lang="en-US" sz="667" dirty="0">
-              <a:solidFill>
-                <a:schemeClr val="bg1"/>
-              </a:solidFill>
-            </a:endParaRPr>
-          </a:p>
-        </p:txBody>
-      </p:sp>
-      <p:sp>
-        <p:nvSpPr>
-          <p:cNvPr id="18" name="AutoShape 4">
-            <a:extLst>
-              <a:ext uri="{FF2B5EF4-FFF2-40B4-BE49-F238E27FC236}">
-                <a16:creationId xmlns:a16="http://schemas.microsoft.com/office/drawing/2014/main" id="{CDC99AA8-3A32-6E4A-99DE-489E3056BAE3}"/>
-              </a:ext>
-            </a:extLst>
-          </p:cNvPr>
-          <p:cNvSpPr>
-            <a:spLocks noChangeArrowheads="1"/>
-          </p:cNvSpPr>
-          <p:nvPr/>
-        </p:nvSpPr>
-        <p:spPr bwMode="auto">
-          <a:xfrm>
-            <a:off x="1899331" y="3925562"/>
-            <a:ext cx="3513917" cy="1348479"/>
-          </a:xfrm>
-          <a:prstGeom prst="roundRect">
-            <a:avLst>
-              <a:gd name="adj" fmla="val 7117"/>
-            </a:avLst>
-          </a:prstGeom>
-          <a:noFill/>
-          <a:ln w="12700">
-            <a:solidFill>
-              <a:schemeClr val="accent3"/>
-            </a:solidFill>
-            <a:prstDash val="dash"/>
-            <a:round/>
-            <a:headEnd/>
-            <a:tailEnd/>
-          </a:ln>
-        </p:spPr>
-        <p:txBody>
-          <a:bodyPr lIns="0" tIns="0" rIns="0" bIns="0" anchor="b" anchorCtr="1"/>
-          <a:lstStyle/>
-          <a:p>
-            <a:pPr algn="ctr"/>
-            <a:endParaRPr lang="en-US" sz="1333" dirty="0"/>
-          </a:p>
-        </p:txBody>
-      </p:sp>
-      <p:sp>
-        <p:nvSpPr>
-          <p:cNvPr id="20" name="TextBox 19">
-            <a:extLst>
-              <a:ext uri="{FF2B5EF4-FFF2-40B4-BE49-F238E27FC236}">
-                <a16:creationId xmlns:a16="http://schemas.microsoft.com/office/drawing/2014/main" id="{DBB9557F-8237-544F-8483-B618ED14A2EB}"/>
-              </a:ext>
-            </a:extLst>
-          </p:cNvPr>
-          <p:cNvSpPr txBox="1"/>
-          <p:nvPr/>
-        </p:nvSpPr>
-        <p:spPr>
-          <a:xfrm>
-            <a:off x="2700397" y="4904710"/>
-            <a:ext cx="1967270" cy="369332"/>
-          </a:xfrm>
-          <a:prstGeom prst="rect">
-            <a:avLst/>
-          </a:prstGeom>
-          <a:noFill/>
-        </p:spPr>
-        <p:txBody>
-          <a:bodyPr wrap="none" rtlCol="0">
-            <a:spAutoFit/>
-          </a:bodyPr>
-          <a:lstStyle/>
-          <a:p>
-            <a:r>
-              <a:rPr lang="en-US" dirty="0">
-                <a:solidFill>
-                  <a:schemeClr val="accent1">
-                    <a:lumMod val="25000"/>
-                  </a:schemeClr>
-                </a:solidFill>
-              </a:rPr>
-              <a:t>reeferTelemetries</a:t>
-            </a:r>
-          </a:p>
-        </p:txBody>
-      </p:sp>
-      <p:pic>
-        <p:nvPicPr>
-          <p:cNvPr id="22" name="Picture 21">
-            <a:extLst>
-              <a:ext uri="{FF2B5EF4-FFF2-40B4-BE49-F238E27FC236}">
-                <a16:creationId xmlns:a16="http://schemas.microsoft.com/office/drawing/2014/main" id="{1B16228E-748D-5644-91F6-79288C7462BE}"/>
-              </a:ext>
-            </a:extLst>
-          </p:cNvPr>
-          <p:cNvPicPr>
-            <a:picLocks noChangeAspect="1"/>
-          </p:cNvPicPr>
-          <p:nvPr/>
-        </p:nvPicPr>
-        <p:blipFill>
-          <a:blip r:embed="rId2">
-            <a:extLst>
-              <a:ext uri="{28A0092B-C50C-407E-A947-70E740481C1C}">
-                <a14:useLocalDpi xmlns:a14="http://schemas.microsoft.com/office/drawing/2010/main" val="0"/>
-              </a:ext>
-            </a:extLst>
-          </a:blip>
-          <a:stretch>
-            <a:fillRect/>
-          </a:stretch>
-        </p:blipFill>
-        <p:spPr>
-          <a:xfrm>
-            <a:off x="1904609" y="3930860"/>
-            <a:ext cx="523018" cy="690721"/>
-          </a:xfrm>
-          <a:prstGeom prst="rect">
-            <a:avLst/>
-          </a:prstGeom>
-        </p:spPr>
-      </p:pic>
-      <p:pic>
-        <p:nvPicPr>
-          <p:cNvPr id="24" name="Picture 40">
-            <a:extLst>
-              <a:ext uri="{FF2B5EF4-FFF2-40B4-BE49-F238E27FC236}">
-                <a16:creationId xmlns:a16="http://schemas.microsoft.com/office/drawing/2014/main" id="{E8EEB410-07EC-D848-92F0-6380D4A64C59}"/>
-              </a:ext>
-            </a:extLst>
-          </p:cNvPr>
-          <p:cNvPicPr>
-            <a:picLocks noChangeAspect="1"/>
-          </p:cNvPicPr>
-          <p:nvPr/>
-        </p:nvPicPr>
-        <p:blipFill>
-          <a:blip r:embed="rId3">
-            <a:extLst>
-              <a:ext uri="{28A0092B-C50C-407E-A947-70E740481C1C}">
-                <a14:useLocalDpi xmlns:a14="http://schemas.microsoft.com/office/drawing/2010/main" val="0"/>
-              </a:ext>
-            </a:extLst>
-          </a:blip>
-          <a:srcRect/>
-          <a:stretch>
-            <a:fillRect/>
-          </a:stretch>
-        </p:blipFill>
-        <p:spPr bwMode="auto">
-          <a:xfrm>
-            <a:off x="1366480" y="5093585"/>
-            <a:ext cx="1099134" cy="407338"/>
-          </a:xfrm>
-          <a:prstGeom prst="rect">
-            <a:avLst/>
-          </a:prstGeom>
-          <a:noFill/>
-          <a:ln>
-            <a:noFill/>
-          </a:ln>
-          <a:extLst>
-            <a:ext uri="{909E8E84-426E-40DD-AFC4-6F175D3DCCD1}">
-              <a14:hiddenFill xmlns:a14="http://schemas.microsoft.com/office/drawing/2010/main">
-                <a:solidFill>
-                  <a:srgbClr val="FFFFFF"/>
-                </a:solidFill>
-              </a14:hiddenFill>
-            </a:ext>
-            <a:ext uri="{91240B29-F687-4F45-9708-019B960494DF}">
-              <a14:hiddenLine xmlns:a14="http://schemas.microsoft.com/office/drawing/2010/main" w="9525">
-                <a:solidFill>
-                  <a:srgbClr val="000000"/>
-                </a:solidFill>
-                <a:miter lim="800000"/>
-                <a:headEnd/>
-                <a:tailEnd/>
-              </a14:hiddenLine>
-            </a:ext>
-          </a:extLst>
-        </p:spPr>
-      </p:pic>
-      <p:pic>
-        <p:nvPicPr>
-          <p:cNvPr id="25" name="Picture 40">
-            <a:extLst>
-              <a:ext uri="{FF2B5EF4-FFF2-40B4-BE49-F238E27FC236}">
-                <a16:creationId xmlns:a16="http://schemas.microsoft.com/office/drawing/2014/main" id="{6CF0C2DA-CD62-0F4A-B6D7-15B98EF785FA}"/>
-              </a:ext>
-            </a:extLst>
-          </p:cNvPr>
-          <p:cNvPicPr>
-            <a:picLocks noChangeAspect="1"/>
-          </p:cNvPicPr>
-          <p:nvPr/>
-        </p:nvPicPr>
-        <p:blipFill>
-          <a:blip r:embed="rId3">
-            <a:extLst>
-              <a:ext uri="{28A0092B-C50C-407E-A947-70E740481C1C}">
-                <a14:useLocalDpi xmlns:a14="http://schemas.microsoft.com/office/drawing/2010/main" val="0"/>
-              </a:ext>
-            </a:extLst>
-          </a:blip>
-          <a:srcRect/>
-          <a:stretch>
-            <a:fillRect/>
-          </a:stretch>
-        </p:blipFill>
-        <p:spPr bwMode="auto">
-          <a:xfrm>
-            <a:off x="116601" y="2734597"/>
-            <a:ext cx="1099134" cy="407338"/>
-          </a:xfrm>
-          <a:prstGeom prst="rect">
-            <a:avLst/>
-          </a:prstGeom>
-          <a:noFill/>
-          <a:ln>
-            <a:noFill/>
-          </a:ln>
-          <a:extLst>
-            <a:ext uri="{909E8E84-426E-40DD-AFC4-6F175D3DCCD1}">
-              <a14:hiddenFill xmlns:a14="http://schemas.microsoft.com/office/drawing/2010/main">
-                <a:solidFill>
-                  <a:srgbClr val="FFFFFF"/>
-                </a:solidFill>
-              </a14:hiddenFill>
-            </a:ext>
-            <a:ext uri="{91240B29-F687-4F45-9708-019B960494DF}">
-              <a14:hiddenLine xmlns:a14="http://schemas.microsoft.com/office/drawing/2010/main" w="9525">
-                <a:solidFill>
-                  <a:srgbClr val="000000"/>
-                </a:solidFill>
-                <a:miter lim="800000"/>
-                <a:headEnd/>
-                <a:tailEnd/>
-              </a14:hiddenLine>
-            </a:ext>
-          </a:extLst>
-        </p:spPr>
-      </p:pic>
-      <p:sp>
-        <p:nvSpPr>
-          <p:cNvPr id="27" name="Rounded Rectangle 26">
-            <a:extLst>
-              <a:ext uri="{FF2B5EF4-FFF2-40B4-BE49-F238E27FC236}">
-                <a16:creationId xmlns:a16="http://schemas.microsoft.com/office/drawing/2014/main" id="{E472D71D-D4D6-9743-8082-F5CD0C08D2B8}"/>
-              </a:ext>
-            </a:extLst>
-          </p:cNvPr>
-          <p:cNvSpPr/>
-          <p:nvPr/>
-        </p:nvSpPr>
-        <p:spPr>
-          <a:xfrm>
-            <a:off x="6455197" y="1357868"/>
-            <a:ext cx="1749097" cy="373542"/>
-          </a:xfrm>
-          <a:prstGeom prst="roundRect">
-            <a:avLst>
-              <a:gd name="adj" fmla="val 9717"/>
-            </a:avLst>
-          </a:prstGeom>
-          <a:noFill/>
-          <a:ln w="12700">
-            <a:solidFill>
-              <a:schemeClr val="tx2">
-                <a:lumMod val="50000"/>
-              </a:schemeClr>
-            </a:solidFill>
-          </a:ln>
-          <a:effectLst/>
-        </p:spPr>
-        <p:style>
-          <a:lnRef idx="1">
-            <a:schemeClr val="dk1"/>
-          </a:lnRef>
-          <a:fillRef idx="2">
-            <a:schemeClr val="dk1"/>
-          </a:fillRef>
-          <a:effectRef idx="1">
-            <a:schemeClr val="dk1"/>
-          </a:effectRef>
-          <a:fontRef idx="minor">
-            <a:schemeClr val="dk1"/>
-          </a:fontRef>
-        </p:style>
-        <p:txBody>
-          <a:bodyPr rot="0" spcFirstLastPara="0" vertOverflow="overflow" horzOverflow="overflow" vert="horz" wrap="square" lIns="0" tIns="0" rIns="0" bIns="0" numCol="1" spcCol="0" rtlCol="0" fromWordArt="0" anchor="t" anchorCtr="0" forceAA="0" compatLnSpc="1">
-            <a:prstTxWarp prst="textNoShape">
-              <a:avLst/>
-            </a:prstTxWarp>
-            <a:noAutofit/>
-          </a:bodyPr>
-          <a:lstStyle/>
-          <a:p>
-            <a:r>
-              <a:rPr lang="en-US" sz="1200" baseline="0" dirty="0">
-                <a:solidFill>
-                  <a:schemeClr val="tx1"/>
-                </a:solidFill>
-                <a:latin typeface="IBM Plex Sans" panose="020B0503050203000203" pitchFamily="34" charset="77"/>
-                <a:cs typeface="Arial"/>
-              </a:rPr>
-              <a:t>Kafka Consumer</a:t>
-            </a:r>
-          </a:p>
-        </p:txBody>
-      </p:sp>
-      <p:cxnSp>
-        <p:nvCxnSpPr>
-          <p:cNvPr id="46" name="Elbow Connector 45">
-            <a:extLst>
-              <a:ext uri="{FF2B5EF4-FFF2-40B4-BE49-F238E27FC236}">
-                <a16:creationId xmlns:a16="http://schemas.microsoft.com/office/drawing/2014/main" id="{B815F1F6-8EC9-A547-951A-6A6BA26A1B3E}"/>
-              </a:ext>
-            </a:extLst>
-          </p:cNvPr>
-          <p:cNvCxnSpPr>
-            <a:stCxn id="9" idx="3"/>
-            <a:endCxn id="15" idx="0"/>
-          </p:cNvCxnSpPr>
-          <p:nvPr/>
-        </p:nvCxnSpPr>
-        <p:spPr>
-          <a:xfrm>
-            <a:off x="2465614" y="2073727"/>
-            <a:ext cx="1633754" cy="2144132"/>
-          </a:xfrm>
-          <a:prstGeom prst="bentConnector2">
-            <a:avLst/>
-          </a:prstGeom>
-          <a:ln>
-            <a:solidFill>
-              <a:schemeClr val="accent6"/>
-            </a:solidFill>
-            <a:tailEnd type="triangle"/>
-          </a:ln>
-          <a:effectLst/>
-        </p:spPr>
-        <p:style>
-          <a:lnRef idx="2">
-            <a:schemeClr val="accent1"/>
-          </a:lnRef>
-          <a:fillRef idx="0">
-            <a:schemeClr val="accent1"/>
-          </a:fillRef>
-          <a:effectRef idx="1">
-            <a:schemeClr val="accent1"/>
-          </a:effectRef>
-          <a:fontRef idx="minor">
-            <a:schemeClr val="tx1"/>
-          </a:fontRef>
-        </p:style>
-      </p:cxnSp>
-      <p:sp>
-        <p:nvSpPr>
-          <p:cNvPr id="59" name="Can 58">
-            <a:extLst>
-              <a:ext uri="{FF2B5EF4-FFF2-40B4-BE49-F238E27FC236}">
-                <a16:creationId xmlns:a16="http://schemas.microsoft.com/office/drawing/2014/main" id="{BF8D5F17-7886-6A49-A326-AB3283F367DA}"/>
-              </a:ext>
-            </a:extLst>
-          </p:cNvPr>
-          <p:cNvSpPr/>
-          <p:nvPr/>
-        </p:nvSpPr>
-        <p:spPr>
-          <a:xfrm>
-            <a:off x="6215189" y="3898535"/>
-            <a:ext cx="895875" cy="695584"/>
-          </a:xfrm>
-          <a:prstGeom prst="can">
-            <a:avLst/>
-          </a:prstGeom>
-          <a:solidFill>
-            <a:schemeClr val="accent5">
-              <a:lumMod val="75000"/>
-            </a:schemeClr>
-          </a:solidFill>
-          <a:ln>
-            <a:noFill/>
-          </a:ln>
-        </p:spPr>
-        <p:style>
-          <a:lnRef idx="2">
-            <a:schemeClr val="accent1">
-              <a:shade val="50000"/>
-            </a:schemeClr>
-          </a:lnRef>
-          <a:fillRef idx="1">
-            <a:schemeClr val="accent1"/>
-          </a:fillRef>
-          <a:effectRef idx="0">
-            <a:schemeClr val="accent1"/>
-          </a:effectRef>
-          <a:fontRef idx="minor">
-            <a:schemeClr val="lt1"/>
-          </a:fontRef>
-        </p:style>
-        <p:txBody>
-          <a:bodyPr rtlCol="0" anchor="ctr"/>
-          <a:lstStyle/>
-          <a:p>
-            <a:pPr algn="ctr"/>
-            <a:r>
-              <a:rPr lang="en-US" sz="1000" dirty="0"/>
-              <a:t>Reefers Inventory</a:t>
-            </a:r>
-          </a:p>
-        </p:txBody>
-      </p:sp>
-      <p:cxnSp>
-        <p:nvCxnSpPr>
-          <p:cNvPr id="71" name="Elbow Connector 70">
-            <a:extLst>
-              <a:ext uri="{FF2B5EF4-FFF2-40B4-BE49-F238E27FC236}">
-                <a16:creationId xmlns:a16="http://schemas.microsoft.com/office/drawing/2014/main" id="{9B3950A4-1025-DB48-B886-5945ADD35206}"/>
-              </a:ext>
-            </a:extLst>
-          </p:cNvPr>
-          <p:cNvCxnSpPr>
-            <a:cxnSpLocks/>
-            <a:stCxn id="27" idx="1"/>
-            <a:endCxn id="10" idx="0"/>
-          </p:cNvCxnSpPr>
-          <p:nvPr/>
-        </p:nvCxnSpPr>
-        <p:spPr>
-          <a:xfrm rot="10800000" flipV="1">
-            <a:off x="2889775" y="1544639"/>
-            <a:ext cx="3565422" cy="2673220"/>
-          </a:xfrm>
-          <a:prstGeom prst="bentConnector2">
-            <a:avLst/>
-          </a:prstGeom>
-          <a:ln>
-            <a:solidFill>
-              <a:srgbClr val="7030A0"/>
-            </a:solidFill>
-            <a:tailEnd type="triangle"/>
-          </a:ln>
-          <a:effectLst/>
-        </p:spPr>
-        <p:style>
-          <a:lnRef idx="2">
-            <a:schemeClr val="accent1"/>
-          </a:lnRef>
-          <a:fillRef idx="0">
-            <a:schemeClr val="accent1"/>
-          </a:fillRef>
-          <a:effectRef idx="1">
-            <a:schemeClr val="accent1"/>
-          </a:effectRef>
-          <a:fontRef idx="minor">
-            <a:schemeClr val="tx1"/>
-          </a:fontRef>
-        </p:style>
-      </p:cxnSp>
-      <p:sp>
-        <p:nvSpPr>
-          <p:cNvPr id="45" name="Rounded Rectangle 44">
-            <a:extLst>
-              <a:ext uri="{FF2B5EF4-FFF2-40B4-BE49-F238E27FC236}">
-                <a16:creationId xmlns:a16="http://schemas.microsoft.com/office/drawing/2014/main" id="{F495E1A9-5EC6-5446-ACF5-3911A287BB83}"/>
-              </a:ext>
-            </a:extLst>
-          </p:cNvPr>
-          <p:cNvSpPr/>
-          <p:nvPr/>
-        </p:nvSpPr>
-        <p:spPr>
-          <a:xfrm>
-            <a:off x="6478199" y="1913633"/>
-            <a:ext cx="1749097" cy="373542"/>
-          </a:xfrm>
-          <a:prstGeom prst="roundRect">
-            <a:avLst>
-              <a:gd name="adj" fmla="val 9717"/>
-            </a:avLst>
-          </a:prstGeom>
-          <a:noFill/>
-          <a:ln w="12700">
-            <a:solidFill>
-              <a:schemeClr val="tx2">
-                <a:lumMod val="50000"/>
-              </a:schemeClr>
-            </a:solidFill>
-          </a:ln>
-          <a:effectLst/>
-        </p:spPr>
-        <p:style>
-          <a:lnRef idx="1">
-            <a:schemeClr val="dk1"/>
-          </a:lnRef>
-          <a:fillRef idx="2">
-            <a:schemeClr val="dk1"/>
-          </a:fillRef>
-          <a:effectRef idx="1">
-            <a:schemeClr val="dk1"/>
-          </a:effectRef>
-          <a:fontRef idx="minor">
-            <a:schemeClr val="dk1"/>
-          </a:fontRef>
-        </p:style>
-        <p:txBody>
-          <a:bodyPr rot="0" spcFirstLastPara="0" vertOverflow="overflow" horzOverflow="overflow" vert="horz" wrap="square" lIns="0" tIns="0" rIns="0" bIns="0" numCol="1" spcCol="0" rtlCol="0" fromWordArt="0" anchor="t" anchorCtr="0" forceAA="0" compatLnSpc="1">
-            <a:prstTxWarp prst="textNoShape">
-              <a:avLst/>
-            </a:prstTxWarp>
-            <a:noAutofit/>
-          </a:bodyPr>
-          <a:lstStyle/>
-          <a:p>
-            <a:r>
-              <a:rPr lang="en-US" sz="1200" baseline="0" dirty="0">
-                <a:solidFill>
-                  <a:schemeClr val="tx1"/>
-                </a:solidFill>
-                <a:latin typeface="IBM Plex Sans" panose="020B0503050203000203" pitchFamily="34" charset="77"/>
-                <a:cs typeface="Arial"/>
-              </a:rPr>
-              <a:t>Pandas DF</a:t>
-            </a:r>
-          </a:p>
-        </p:txBody>
-      </p:sp>
-      <p:sp>
-        <p:nvSpPr>
-          <p:cNvPr id="23" name="Can 22">
-            <a:extLst>
-              <a:ext uri="{FF2B5EF4-FFF2-40B4-BE49-F238E27FC236}">
-                <a16:creationId xmlns:a16="http://schemas.microsoft.com/office/drawing/2014/main" id="{E1EF536B-5978-0D45-B1D4-059E49B20183}"/>
-              </a:ext>
-            </a:extLst>
-          </p:cNvPr>
-          <p:cNvSpPr/>
-          <p:nvPr/>
-        </p:nvSpPr>
-        <p:spPr>
-          <a:xfrm>
-            <a:off x="7223460" y="3898535"/>
-            <a:ext cx="895875" cy="695584"/>
-          </a:xfrm>
-          <a:prstGeom prst="can">
-            <a:avLst/>
-          </a:prstGeom>
-          <a:solidFill>
-            <a:schemeClr val="accent5">
-              <a:lumMod val="75000"/>
-            </a:schemeClr>
-          </a:solidFill>
-          <a:ln>
-            <a:noFill/>
-          </a:ln>
-        </p:spPr>
-        <p:style>
-          <a:lnRef idx="2">
-            <a:schemeClr val="accent1">
-              <a:shade val="50000"/>
-            </a:schemeClr>
-          </a:lnRef>
-          <a:fillRef idx="1">
-            <a:schemeClr val="accent1"/>
-          </a:fillRef>
-          <a:effectRef idx="0">
-            <a:schemeClr val="accent1"/>
-          </a:effectRef>
-          <a:fontRef idx="minor">
-            <a:schemeClr val="lt1"/>
-          </a:fontRef>
-        </p:style>
-        <p:txBody>
-          <a:bodyPr rtlCol="0" anchor="ctr"/>
-          <a:lstStyle/>
-          <a:p>
-            <a:pPr algn="ctr"/>
-            <a:r>
-              <a:rPr lang="en-US" sz="1000" dirty="0"/>
-              <a:t>Products</a:t>
-            </a:r>
-          </a:p>
-        </p:txBody>
-      </p:sp>
-      <p:pic>
-        <p:nvPicPr>
-          <p:cNvPr id="26" name="Picture 25">
-            <a:extLst>
-              <a:ext uri="{FF2B5EF4-FFF2-40B4-BE49-F238E27FC236}">
-                <a16:creationId xmlns:a16="http://schemas.microsoft.com/office/drawing/2014/main" id="{509913A5-E445-C54D-8C8A-64EA88153B4B}"/>
-              </a:ext>
-            </a:extLst>
-          </p:cNvPr>
-          <p:cNvPicPr>
-            <a:picLocks noChangeAspect="1"/>
-          </p:cNvPicPr>
-          <p:nvPr/>
-        </p:nvPicPr>
-        <p:blipFill>
-          <a:blip r:embed="rId4"/>
-          <a:stretch>
-            <a:fillRect/>
-          </a:stretch>
-        </p:blipFill>
-        <p:spPr>
-          <a:xfrm>
-            <a:off x="8048469" y="4322790"/>
-            <a:ext cx="638156" cy="680700"/>
-          </a:xfrm>
-          <a:prstGeom prst="rect">
-            <a:avLst/>
-          </a:prstGeom>
-        </p:spPr>
-      </p:pic>
-    </p:spTree>
-    <p:extLst>
-      <p:ext uri="{BB962C8B-B14F-4D97-AF65-F5344CB8AC3E}">
-        <p14:creationId xmlns:p14="http://schemas.microsoft.com/office/powerpoint/2010/main" val="187512266"/>
       </p:ext>
     </p:extLst>
   </p:cSld>

</xml_diff>

<commit_message>
work on simulator code, and document how to build simulator
</commit_message>
<xml_diff>
--- a/docs/diagrams.pptx
+++ b/docs/diagrams.pptx
@@ -282,7 +282,7 @@
               <a:pPr>
                 <a:defRPr/>
               </a:pPr>
-              <a:t>1/6/20</a:t>
+              <a:t>1/7/20</a:t>
             </a:fld>
             <a:endParaRPr lang="en-US" dirty="0"/>
           </a:p>
@@ -13830,12 +13830,72 @@
           </a:p>
         </p:txBody>
       </p:sp>
+      <p:pic>
+        <p:nvPicPr>
+          <p:cNvPr id="6" name="Picture 5">
+            <a:extLst>
+              <a:ext uri="{FF2B5EF4-FFF2-40B4-BE49-F238E27FC236}">
+                <a16:creationId xmlns:a16="http://schemas.microsoft.com/office/drawing/2014/main" id="{07AC0BFF-594E-D943-9423-6F5BB0B092D4}"/>
+              </a:ext>
+            </a:extLst>
+          </p:cNvPr>
+          <p:cNvPicPr>
+            <a:picLocks noChangeAspect="1"/>
+          </p:cNvPicPr>
+          <p:nvPr/>
+        </p:nvPicPr>
+        <p:blipFill>
+          <a:blip r:embed="rId2"/>
+          <a:stretch>
+            <a:fillRect/>
+          </a:stretch>
+        </p:blipFill>
+        <p:spPr>
+          <a:xfrm>
+            <a:off x="2590800" y="5476455"/>
+            <a:ext cx="388273" cy="354992"/>
+          </a:xfrm>
+          <a:prstGeom prst="rect">
+            <a:avLst/>
+          </a:prstGeom>
+        </p:spPr>
+      </p:pic>
+      <p:pic>
+        <p:nvPicPr>
+          <p:cNvPr id="7" name="Picture 6">
+            <a:extLst>
+              <a:ext uri="{FF2B5EF4-FFF2-40B4-BE49-F238E27FC236}">
+                <a16:creationId xmlns:a16="http://schemas.microsoft.com/office/drawing/2014/main" id="{34E902ED-15BC-414A-8ABD-63DB888CC4B7}"/>
+              </a:ext>
+            </a:extLst>
+          </p:cNvPr>
+          <p:cNvPicPr>
+            <a:picLocks noChangeAspect="1"/>
+          </p:cNvPicPr>
+          <p:nvPr/>
+        </p:nvPicPr>
+        <p:blipFill>
+          <a:blip r:embed="rId3"/>
+          <a:stretch>
+            <a:fillRect/>
+          </a:stretch>
+        </p:blipFill>
+        <p:spPr>
+          <a:xfrm>
+            <a:off x="6225398" y="5425002"/>
+            <a:ext cx="459096" cy="393976"/>
+          </a:xfrm>
+          <a:prstGeom prst="rect">
+            <a:avLst/>
+          </a:prstGeom>
+        </p:spPr>
+      </p:pic>
       <p:sp>
         <p:nvSpPr>
-          <p:cNvPr id="5" name="AutoShape 4">
-            <a:extLst>
-              <a:ext uri="{FF2B5EF4-FFF2-40B4-BE49-F238E27FC236}">
-                <a16:creationId xmlns:a16="http://schemas.microsoft.com/office/drawing/2014/main" id="{684E09B8-BBC1-064E-8FF3-CD8302D16690}"/>
+          <p:cNvPr id="11" name="AutoShape 4">
+            <a:extLst>
+              <a:ext uri="{FF2B5EF4-FFF2-40B4-BE49-F238E27FC236}">
+                <a16:creationId xmlns:a16="http://schemas.microsoft.com/office/drawing/2014/main" id="{C64ABD7E-5043-7340-8CC0-841277EF50A1}"/>
               </a:ext>
             </a:extLst>
           </p:cNvPr>
@@ -13846,8 +13906,8 @@
         </p:nvSpPr>
         <p:spPr bwMode="auto">
           <a:xfrm>
-            <a:off x="2645950" y="5150367"/>
-            <a:ext cx="4770849" cy="680686"/>
+            <a:off x="2668344" y="3448935"/>
+            <a:ext cx="4097228" cy="2382118"/>
           </a:xfrm>
           <a:prstGeom prst="roundRect">
             <a:avLst>
@@ -13886,127 +13946,6 @@
                   <a:srgbClr val="6D7777"/>
                 </a:solidFill>
               </a:rPr>
-              <a:t>Infrastructure</a:t>
-            </a:r>
-          </a:p>
-        </p:txBody>
-      </p:sp>
-      <p:pic>
-        <p:nvPicPr>
-          <p:cNvPr id="6" name="Picture 5">
-            <a:extLst>
-              <a:ext uri="{FF2B5EF4-FFF2-40B4-BE49-F238E27FC236}">
-                <a16:creationId xmlns:a16="http://schemas.microsoft.com/office/drawing/2014/main" id="{07AC0BFF-594E-D943-9423-6F5BB0B092D4}"/>
-              </a:ext>
-            </a:extLst>
-          </p:cNvPr>
-          <p:cNvPicPr>
-            <a:picLocks noChangeAspect="1"/>
-          </p:cNvPicPr>
-          <p:nvPr/>
-        </p:nvPicPr>
-        <p:blipFill>
-          <a:blip r:embed="rId2"/>
-          <a:stretch>
-            <a:fillRect/>
-          </a:stretch>
-        </p:blipFill>
-        <p:spPr>
-          <a:xfrm>
-            <a:off x="4030042" y="5259975"/>
-            <a:ext cx="388273" cy="354992"/>
-          </a:xfrm>
-          <a:prstGeom prst="rect">
-            <a:avLst/>
-          </a:prstGeom>
-        </p:spPr>
-      </p:pic>
-      <p:pic>
-        <p:nvPicPr>
-          <p:cNvPr id="7" name="Picture 6">
-            <a:extLst>
-              <a:ext uri="{FF2B5EF4-FFF2-40B4-BE49-F238E27FC236}">
-                <a16:creationId xmlns:a16="http://schemas.microsoft.com/office/drawing/2014/main" id="{34E902ED-15BC-414A-8ABD-63DB888CC4B7}"/>
-              </a:ext>
-            </a:extLst>
-          </p:cNvPr>
-          <p:cNvPicPr>
-            <a:picLocks noChangeAspect="1"/>
-          </p:cNvPicPr>
-          <p:nvPr/>
-        </p:nvPicPr>
-        <p:blipFill>
-          <a:blip r:embed="rId3"/>
-          <a:stretch>
-            <a:fillRect/>
-          </a:stretch>
-        </p:blipFill>
-        <p:spPr>
-          <a:xfrm>
-            <a:off x="5688009" y="5259975"/>
-            <a:ext cx="459096" cy="393976"/>
-          </a:xfrm>
-          <a:prstGeom prst="rect">
-            <a:avLst/>
-          </a:prstGeom>
-        </p:spPr>
-      </p:pic>
-      <p:sp>
-        <p:nvSpPr>
-          <p:cNvPr id="11" name="AutoShape 4">
-            <a:extLst>
-              <a:ext uri="{FF2B5EF4-FFF2-40B4-BE49-F238E27FC236}">
-                <a16:creationId xmlns:a16="http://schemas.microsoft.com/office/drawing/2014/main" id="{C64ABD7E-5043-7340-8CC0-841277EF50A1}"/>
-              </a:ext>
-            </a:extLst>
-          </p:cNvPr>
-          <p:cNvSpPr>
-            <a:spLocks noChangeArrowheads="1"/>
-          </p:cNvSpPr>
-          <p:nvPr/>
-        </p:nvSpPr>
-        <p:spPr bwMode="auto">
-          <a:xfrm>
-            <a:off x="2645950" y="3448935"/>
-            <a:ext cx="4770849" cy="1396809"/>
-          </a:xfrm>
-          <a:prstGeom prst="roundRect">
-            <a:avLst>
-              <a:gd name="adj" fmla="val 7117"/>
-            </a:avLst>
-          </a:prstGeom>
-          <a:noFill/>
-          <a:ln w="12700">
-            <a:solidFill>
-              <a:srgbClr val="5596E6">
-                <a:lumMod val="50000"/>
-              </a:srgbClr>
-            </a:solidFill>
-            <a:prstDash val="dash"/>
-            <a:round/>
-            <a:headEnd/>
-            <a:tailEnd/>
-          </a:ln>
-        </p:spPr>
-        <p:txBody>
-          <a:bodyPr lIns="0" tIns="0" rIns="0" bIns="0" anchor="b" anchorCtr="1"/>
-          <a:lstStyle/>
-          <a:p>
-            <a:pPr algn="ctr" defTabSz="1219170" eaLnBrk="1" fontAlgn="auto" hangingPunct="1">
-              <a:spcBef>
-                <a:spcPts val="0"/>
-              </a:spcBef>
-              <a:spcAft>
-                <a:spcPts val="0"/>
-              </a:spcAft>
-              <a:defRPr/>
-            </a:pPr>
-            <a:r>
-              <a:rPr lang="en-US" sz="1333" kern="0" dirty="0">
-                <a:solidFill>
-                  <a:srgbClr val="6D7777"/>
-                </a:solidFill>
-              </a:rPr>
               <a:t>Cloud Pak</a:t>
             </a:r>
           </a:p>
@@ -14034,8 +13973,8 @@
         </p:blipFill>
         <p:spPr>
           <a:xfrm>
-            <a:off x="4081744" y="3679244"/>
-            <a:ext cx="673143" cy="879207"/>
+            <a:off x="7197388" y="3716209"/>
+            <a:ext cx="667636" cy="872014"/>
           </a:xfrm>
           <a:prstGeom prst="rect">
             <a:avLst/>
@@ -14064,7 +14003,7 @@
         </p:blipFill>
         <p:spPr>
           <a:xfrm>
-            <a:off x="3088358" y="3679245"/>
+            <a:off x="2944665" y="3679245"/>
             <a:ext cx="790605" cy="879207"/>
           </a:xfrm>
           <a:prstGeom prst="rect">
@@ -14086,7 +14025,7 @@
         </p:nvSpPr>
         <p:spPr>
           <a:xfrm>
-            <a:off x="4803212" y="2189569"/>
+            <a:off x="4444513" y="2178376"/>
             <a:ext cx="1176988" cy="493916"/>
           </a:xfrm>
           <a:prstGeom prst="rect">
@@ -14164,8 +14103,8 @@
         </p:nvSpPr>
         <p:spPr bwMode="auto">
           <a:xfrm>
-            <a:off x="2590800" y="1738123"/>
-            <a:ext cx="4825999" cy="1396809"/>
+            <a:off x="2232101" y="1726930"/>
+            <a:ext cx="5873931" cy="1396809"/>
           </a:xfrm>
           <a:prstGeom prst="roundRect">
             <a:avLst>
@@ -14231,7 +14170,7 @@
         </p:blipFill>
         <p:spPr>
           <a:xfrm>
-            <a:off x="4955677" y="3679244"/>
+            <a:off x="4811984" y="3679244"/>
             <a:ext cx="872059" cy="879207"/>
           </a:xfrm>
           <a:prstGeom prst="rect">
@@ -14253,7 +14192,7 @@
         </p:nvSpPr>
         <p:spPr>
           <a:xfrm>
-            <a:off x="6096000" y="2179222"/>
+            <a:off x="5737301" y="2168029"/>
             <a:ext cx="1176988" cy="493916"/>
           </a:xfrm>
           <a:prstGeom prst="rect">
@@ -14329,7 +14268,7 @@
         </p:nvSpPr>
         <p:spPr>
           <a:xfrm>
-            <a:off x="3483660" y="2179222"/>
+            <a:off x="3124961" y="2168029"/>
             <a:ext cx="1176988" cy="493916"/>
           </a:xfrm>
           <a:prstGeom prst="rect">
@@ -14386,7 +14325,7 @@
                 </a:solidFill>
                 <a:latin typeface="Arial"/>
               </a:rPr>
-              <a:t>Scoring MS</a:t>
+              <a:t>Scoring Agent</a:t>
             </a:r>
           </a:p>
         </p:txBody>
@@ -14405,7 +14344,7 @@
         </p:nvSpPr>
         <p:spPr>
           <a:xfrm>
-            <a:off x="2645950" y="1818852"/>
+            <a:off x="2287251" y="1807659"/>
             <a:ext cx="789271" cy="1214657"/>
           </a:xfrm>
           <a:prstGeom prst="rect">
@@ -14489,12 +14428,15 @@
         </p:blipFill>
         <p:spPr>
           <a:xfrm>
-            <a:off x="5973911" y="3679244"/>
+            <a:off x="3813687" y="3679244"/>
             <a:ext cx="940075" cy="879207"/>
           </a:xfrm>
           <a:prstGeom prst="rect">
             <a:avLst/>
           </a:prstGeom>
+          <a:solidFill>
+            <a:srgbClr val="0076FF"/>
+          </a:solidFill>
         </p:spPr>
       </p:pic>
       <p:sp>
@@ -14648,6 +14590,284 @@
           </a:prstGeom>
         </p:spPr>
       </p:pic>
+      <p:sp>
+        <p:nvSpPr>
+          <p:cNvPr id="8" name="Rectangle 7">
+            <a:extLst>
+              <a:ext uri="{FF2B5EF4-FFF2-40B4-BE49-F238E27FC236}">
+                <a16:creationId xmlns:a16="http://schemas.microsoft.com/office/drawing/2014/main" id="{78618C6E-B5CD-6C48-8919-34C3FC3874F5}"/>
+              </a:ext>
+            </a:extLst>
+          </p:cNvPr>
+          <p:cNvSpPr/>
+          <p:nvPr/>
+        </p:nvSpPr>
+        <p:spPr>
+          <a:xfrm>
+            <a:off x="5739193" y="3692240"/>
+            <a:ext cx="872060" cy="895983"/>
+          </a:xfrm>
+          <a:prstGeom prst="rect">
+            <a:avLst/>
+          </a:prstGeom>
+          <a:solidFill>
+            <a:srgbClr val="0076FF"/>
+          </a:solidFill>
+          <a:ln>
+            <a:noFill/>
+          </a:ln>
+        </p:spPr>
+        <p:style>
+          <a:lnRef idx="2">
+            <a:schemeClr val="accent1">
+              <a:shade val="50000"/>
+            </a:schemeClr>
+          </a:lnRef>
+          <a:fillRef idx="1">
+            <a:schemeClr val="accent1"/>
+          </a:fillRef>
+          <a:effectRef idx="0">
+            <a:schemeClr val="accent1"/>
+          </a:effectRef>
+          <a:fontRef idx="minor">
+            <a:schemeClr val="lt1"/>
+          </a:fontRef>
+        </p:style>
+        <p:txBody>
+          <a:bodyPr rtlCol="0" anchor="b"/>
+          <a:lstStyle/>
+          <a:p>
+            <a:pPr algn="ctr"/>
+            <a:r>
+              <a:rPr lang="en-US" sz="900" dirty="0">
+                <a:solidFill>
+                  <a:schemeClr val="bg1"/>
+                </a:solidFill>
+              </a:rPr>
+              <a:t>MCM</a:t>
+            </a:r>
+          </a:p>
+        </p:txBody>
+      </p:sp>
+      <p:sp>
+        <p:nvSpPr>
+          <p:cNvPr id="9" name="Hexagon 8">
+            <a:extLst>
+              <a:ext uri="{FF2B5EF4-FFF2-40B4-BE49-F238E27FC236}">
+                <a16:creationId xmlns:a16="http://schemas.microsoft.com/office/drawing/2014/main" id="{935AE278-206C-CC47-BD89-EF0717D01791}"/>
+              </a:ext>
+            </a:extLst>
+          </p:cNvPr>
+          <p:cNvSpPr/>
+          <p:nvPr/>
+        </p:nvSpPr>
+        <p:spPr>
+          <a:xfrm>
+            <a:off x="5907010" y="3759261"/>
+            <a:ext cx="471385" cy="522463"/>
+          </a:xfrm>
+          <a:prstGeom prst="hexagon">
+            <a:avLst/>
+          </a:prstGeom>
+          <a:noFill/>
+          <a:ln w="9525">
+            <a:solidFill>
+              <a:schemeClr val="bg1"/>
+            </a:solidFill>
+          </a:ln>
+        </p:spPr>
+        <p:style>
+          <a:lnRef idx="2">
+            <a:schemeClr val="accent1">
+              <a:shade val="50000"/>
+            </a:schemeClr>
+          </a:lnRef>
+          <a:fillRef idx="1">
+            <a:schemeClr val="accent1"/>
+          </a:fillRef>
+          <a:effectRef idx="0">
+            <a:schemeClr val="accent1"/>
+          </a:effectRef>
+          <a:fontRef idx="minor">
+            <a:schemeClr val="lt1"/>
+          </a:fontRef>
+        </p:style>
+        <p:txBody>
+          <a:bodyPr rtlCol="0" anchor="ctr"/>
+          <a:lstStyle/>
+          <a:p>
+            <a:pPr algn="ctr"/>
+            <a:endParaRPr lang="en-US"/>
+          </a:p>
+        </p:txBody>
+      </p:sp>
+      <p:sp>
+        <p:nvSpPr>
+          <p:cNvPr id="25" name="AutoShape 4">
+            <a:extLst>
+              <a:ext uri="{FF2B5EF4-FFF2-40B4-BE49-F238E27FC236}">
+                <a16:creationId xmlns:a16="http://schemas.microsoft.com/office/drawing/2014/main" id="{25A1A6CF-BEC6-5743-B48E-1442104E1CA2}"/>
+              </a:ext>
+            </a:extLst>
+          </p:cNvPr>
+          <p:cNvSpPr>
+            <a:spLocks noChangeArrowheads="1"/>
+          </p:cNvSpPr>
+          <p:nvPr/>
+        </p:nvSpPr>
+        <p:spPr bwMode="auto">
+          <a:xfrm>
+            <a:off x="6861199" y="3448935"/>
+            <a:ext cx="1244833" cy="2382118"/>
+          </a:xfrm>
+          <a:prstGeom prst="roundRect">
+            <a:avLst>
+              <a:gd name="adj" fmla="val 7117"/>
+            </a:avLst>
+          </a:prstGeom>
+          <a:noFill/>
+          <a:ln w="12700">
+            <a:solidFill>
+              <a:srgbClr val="5596E6">
+                <a:lumMod val="50000"/>
+              </a:srgbClr>
+            </a:solidFill>
+            <a:prstDash val="dash"/>
+            <a:round/>
+            <a:headEnd/>
+            <a:tailEnd/>
+          </a:ln>
+        </p:spPr>
+        <p:txBody>
+          <a:bodyPr lIns="0" tIns="0" rIns="0" bIns="0" anchor="b" anchorCtr="1"/>
+          <a:lstStyle/>
+          <a:p>
+            <a:pPr algn="ctr" defTabSz="1219170" eaLnBrk="1" fontAlgn="auto" hangingPunct="1">
+              <a:spcBef>
+                <a:spcPts val="0"/>
+              </a:spcBef>
+              <a:spcAft>
+                <a:spcPts val="0"/>
+              </a:spcAft>
+              <a:defRPr/>
+            </a:pPr>
+            <a:r>
+              <a:rPr lang="en-US" sz="1333" kern="0" dirty="0">
+                <a:solidFill>
+                  <a:srgbClr val="6D7777"/>
+                </a:solidFill>
+              </a:rPr>
+              <a:t>Cloud Pak</a:t>
+            </a:r>
+          </a:p>
+        </p:txBody>
+      </p:sp>
+      <p:pic>
+        <p:nvPicPr>
+          <p:cNvPr id="26" name="Picture 25">
+            <a:extLst>
+              <a:ext uri="{FF2B5EF4-FFF2-40B4-BE49-F238E27FC236}">
+                <a16:creationId xmlns:a16="http://schemas.microsoft.com/office/drawing/2014/main" id="{CCA4C1A5-3EDC-0A42-8A1E-6AAAF8D1AB7B}"/>
+              </a:ext>
+            </a:extLst>
+          </p:cNvPr>
+          <p:cNvPicPr>
+            <a:picLocks noChangeAspect="1"/>
+          </p:cNvPicPr>
+          <p:nvPr/>
+        </p:nvPicPr>
+        <p:blipFill>
+          <a:blip r:embed="rId2"/>
+          <a:stretch>
+            <a:fillRect/>
+          </a:stretch>
+        </p:blipFill>
+        <p:spPr>
+          <a:xfrm>
+            <a:off x="6769758" y="5583377"/>
+            <a:ext cx="292646" cy="267562"/>
+          </a:xfrm>
+          <a:prstGeom prst="rect">
+            <a:avLst/>
+          </a:prstGeom>
+        </p:spPr>
+      </p:pic>
+      <p:sp>
+        <p:nvSpPr>
+          <p:cNvPr id="27" name="Rectangle 26">
+            <a:extLst>
+              <a:ext uri="{FF2B5EF4-FFF2-40B4-BE49-F238E27FC236}">
+                <a16:creationId xmlns:a16="http://schemas.microsoft.com/office/drawing/2014/main" id="{F9DCE707-5773-2140-B55A-25773FA76FC6}"/>
+              </a:ext>
+            </a:extLst>
+          </p:cNvPr>
+          <p:cNvSpPr/>
+          <p:nvPr/>
+        </p:nvSpPr>
+        <p:spPr>
+          <a:xfrm>
+            <a:off x="7030089" y="2178376"/>
+            <a:ext cx="982749" cy="493916"/>
+          </a:xfrm>
+          <a:prstGeom prst="rect">
+            <a:avLst/>
+          </a:prstGeom>
+          <a:solidFill>
+            <a:schemeClr val="bg1">
+              <a:lumMod val="65000"/>
+            </a:schemeClr>
+          </a:solidFill>
+          <a:ln>
+            <a:noFill/>
+          </a:ln>
+          <a:effectLst>
+            <a:outerShdw blurRad="50800" dist="38100" dir="5400000" algn="t" rotWithShape="0">
+              <a:prstClr val="black">
+                <a:alpha val="40000"/>
+              </a:prstClr>
+            </a:outerShdw>
+          </a:effectLst>
+        </p:spPr>
+        <p:style>
+          <a:lnRef idx="2">
+            <a:schemeClr val="accent1">
+              <a:shade val="50000"/>
+            </a:schemeClr>
+          </a:lnRef>
+          <a:fillRef idx="1">
+            <a:schemeClr val="accent1"/>
+          </a:fillRef>
+          <a:effectRef idx="0">
+            <a:schemeClr val="accent1"/>
+          </a:effectRef>
+          <a:fontRef idx="minor">
+            <a:schemeClr val="lt1"/>
+          </a:fontRef>
+        </p:style>
+        <p:txBody>
+          <a:bodyPr rtlCol="0" anchor="ctr"/>
+          <a:lstStyle/>
+          <a:p>
+            <a:pPr algn="ctr" defTabSz="914377" eaLnBrk="1" fontAlgn="auto" hangingPunct="1">
+              <a:spcBef>
+                <a:spcPts val="0"/>
+              </a:spcBef>
+              <a:spcAft>
+                <a:spcPts val="0"/>
+              </a:spcAft>
+            </a:pPr>
+            <a:r>
+              <a:rPr lang="en-US" sz="1100" dirty="0">
+                <a:solidFill>
+                  <a:schemeClr val="bg1"/>
+                </a:solidFill>
+                <a:latin typeface="Arial"/>
+              </a:rPr>
+              <a:t>Predictive service</a:t>
+            </a:r>
+          </a:p>
+        </p:txBody>
+      </p:sp>
     </p:spTree>
     <p:extLst>
       <p:ext uri="{BB962C8B-B14F-4D97-AF65-F5344CB8AC3E}">
@@ -21202,7 +21422,7 @@
             <a:effectLst/>
             <a:extLst>
               <a:ext uri="{C572A759-6A51-4108-AA02-DFA0A04FC94B}">
-                <ma14:wrappingTextBoxFlag xmlns:ma14="http://schemas.microsoft.com/office/mac/drawingml/2011/main" xmlns="" val="1"/>
+                <ma14:wrappingTextBoxFlag xmlns="" xmlns:ma14="http://schemas.microsoft.com/office/mac/drawingml/2011/main" val="1"/>
               </a:ext>
             </a:extLst>
           </p:spPr>
@@ -23332,7 +23552,7 @@
             <a:effectLst/>
             <a:extLst>
               <a:ext uri="{C572A759-6A51-4108-AA02-DFA0A04FC94B}">
-                <ma14:wrappingTextBoxFlag xmlns:ma14="http://schemas.microsoft.com/office/mac/drawingml/2011/main" xmlns="" val="1"/>
+                <ma14:wrappingTextBoxFlag xmlns="" xmlns:ma14="http://schemas.microsoft.com/office/mac/drawingml/2011/main" val="1"/>
               </a:ext>
             </a:extLst>
           </p:spPr>

</xml_diff>